<commit_message>
Working on the setup portion
Will finish each section on the appropriate system
</commit_message>
<xml_diff>
--- a/course/0 - Setup/Setup.pptx
+++ b/course/0 - Setup/Setup.pptx
@@ -5,11 +5,17 @@
     <p:sldMasterId id="2147483648" r:id="rId1"/>
   </p:sldMasterIdLst>
   <p:notesMasterIdLst>
-    <p:notesMasterId r:id="rId4"/>
+    <p:notesMasterId r:id="rId10"/>
   </p:notesMasterIdLst>
   <p:sldIdLst>
     <p:sldId id="256" r:id="rId2"/>
     <p:sldId id="257" r:id="rId3"/>
+    <p:sldId id="258" r:id="rId4"/>
+    <p:sldId id="262" r:id="rId5"/>
+    <p:sldId id="263" r:id="rId6"/>
+    <p:sldId id="259" r:id="rId7"/>
+    <p:sldId id="260" r:id="rId8"/>
+    <p:sldId id="261" r:id="rId9"/>
   </p:sldIdLst>
   <p:sldSz cx="9144000" cy="6858000" type="screen4x3"/>
   <p:notesSz cx="6858000" cy="9144000"/>
@@ -108,6 +114,24 @@
       </a:defRPr>
     </a:lvl9pPr>
   </p:defaultTextStyle>
+  <p:extLst>
+    <p:ext uri="{521415D9-36F7-43E2-AB2F-B90AF26B5E84}">
+      <p14:sectionLst xmlns:p14="http://schemas.microsoft.com/office/powerpoint/2010/main">
+        <p14:section name="Default Section" id="{189D08AB-3ED4-AF4C-8427-9A2242C46576}">
+          <p14:sldIdLst>
+            <p14:sldId id="256"/>
+            <p14:sldId id="257"/>
+            <p14:sldId id="258"/>
+            <p14:sldId id="262"/>
+            <p14:sldId id="263"/>
+            <p14:sldId id="259"/>
+            <p14:sldId id="260"/>
+            <p14:sldId id="261"/>
+          </p14:sldIdLst>
+        </p14:section>
+      </p14:sectionLst>
+    </p:ext>
+  </p:extLst>
 </p:presentation>
 </file>
 
@@ -628,6 +652,449 @@
     <p:extLst>
       <p:ext uri="{BB962C8B-B14F-4D97-AF65-F5344CB8AC3E}">
         <p14:creationId xmlns:p14="http://schemas.microsoft.com/office/powerpoint/2010/main" val="1602954234"/>
+      </p:ext>
+    </p:extLst>
+  </p:cSld>
+  <p:clrMapOvr>
+    <a:masterClrMapping/>
+  </p:clrMapOvr>
+</p:notes>
+</file>
+
+<file path=ppt/notesSlides/notesSlide3.xml><?xml version="1.0" encoding="utf-8"?>
+<p:notes xmlns:a="http://schemas.openxmlformats.org/drawingml/2006/main" xmlns:r="http://schemas.openxmlformats.org/officeDocument/2006/relationships" xmlns:p="http://schemas.openxmlformats.org/presentationml/2006/main">
+  <p:cSld>
+    <p:spTree>
+      <p:nvGrpSpPr>
+        <p:cNvPr id="1" name=""/>
+        <p:cNvGrpSpPr/>
+        <p:nvPr/>
+      </p:nvGrpSpPr>
+      <p:grpSpPr>
+        <a:xfrm>
+          <a:off x="0" y="0"/>
+          <a:ext cx="0" cy="0"/>
+          <a:chOff x="0" y="0"/>
+          <a:chExt cx="0" cy="0"/>
+        </a:xfrm>
+      </p:grpSpPr>
+      <p:sp>
+        <p:nvSpPr>
+          <p:cNvPr id="2" name="Slide Image Placeholder 1"/>
+          <p:cNvSpPr>
+            <a:spLocks noGrp="1" noRot="1" noChangeAspect="1"/>
+          </p:cNvSpPr>
+          <p:nvPr>
+            <p:ph type="sldImg"/>
+          </p:nvPr>
+        </p:nvSpPr>
+        <p:spPr/>
+      </p:sp>
+      <p:sp>
+        <p:nvSpPr>
+          <p:cNvPr id="3" name="Notes Placeholder 2"/>
+          <p:cNvSpPr>
+            <a:spLocks noGrp="1"/>
+          </p:cNvSpPr>
+          <p:nvPr>
+            <p:ph type="body" idx="1"/>
+          </p:nvPr>
+        </p:nvSpPr>
+        <p:spPr/>
+        <p:txBody>
+          <a:bodyPr/>
+          <a:lstStyle/>
+          <a:p>
+            <a:endParaRPr lang="en-US" dirty="0"/>
+          </a:p>
+        </p:txBody>
+      </p:sp>
+      <p:sp>
+        <p:nvSpPr>
+          <p:cNvPr id="4" name="Slide Number Placeholder 3"/>
+          <p:cNvSpPr>
+            <a:spLocks noGrp="1"/>
+          </p:cNvSpPr>
+          <p:nvPr>
+            <p:ph type="sldNum" sz="quarter" idx="10"/>
+          </p:nvPr>
+        </p:nvSpPr>
+        <p:spPr/>
+        <p:txBody>
+          <a:bodyPr/>
+          <a:lstStyle/>
+          <a:p>
+            <a:fld id="{84A452C3-0BE2-3E46-BBC2-652C991B87BC}" type="slidenum">
+              <a:rPr lang="en-US" smtClean="0"/>
+              <a:t>3</a:t>
+            </a:fld>
+            <a:endParaRPr lang="en-US"/>
+          </a:p>
+        </p:txBody>
+      </p:sp>
+    </p:spTree>
+    <p:extLst>
+      <p:ext uri="{BB962C8B-B14F-4D97-AF65-F5344CB8AC3E}">
+        <p14:creationId xmlns:p14="http://schemas.microsoft.com/office/powerpoint/2010/main" val="2137996786"/>
+      </p:ext>
+    </p:extLst>
+  </p:cSld>
+  <p:clrMapOvr>
+    <a:masterClrMapping/>
+  </p:clrMapOvr>
+</p:notes>
+</file>
+
+<file path=ppt/notesSlides/notesSlide4.xml><?xml version="1.0" encoding="utf-8"?>
+<p:notes xmlns:a="http://schemas.openxmlformats.org/drawingml/2006/main" xmlns:r="http://schemas.openxmlformats.org/officeDocument/2006/relationships" xmlns:p="http://schemas.openxmlformats.org/presentationml/2006/main">
+  <p:cSld>
+    <p:spTree>
+      <p:nvGrpSpPr>
+        <p:cNvPr id="1" name=""/>
+        <p:cNvGrpSpPr/>
+        <p:nvPr/>
+      </p:nvGrpSpPr>
+      <p:grpSpPr>
+        <a:xfrm>
+          <a:off x="0" y="0"/>
+          <a:ext cx="0" cy="0"/>
+          <a:chOff x="0" y="0"/>
+          <a:chExt cx="0" cy="0"/>
+        </a:xfrm>
+      </p:grpSpPr>
+      <p:sp>
+        <p:nvSpPr>
+          <p:cNvPr id="2" name="Slide Image Placeholder 1"/>
+          <p:cNvSpPr>
+            <a:spLocks noGrp="1" noRot="1" noChangeAspect="1"/>
+          </p:cNvSpPr>
+          <p:nvPr>
+            <p:ph type="sldImg"/>
+          </p:nvPr>
+        </p:nvSpPr>
+        <p:spPr/>
+      </p:sp>
+      <p:sp>
+        <p:nvSpPr>
+          <p:cNvPr id="3" name="Notes Placeholder 2"/>
+          <p:cNvSpPr>
+            <a:spLocks noGrp="1"/>
+          </p:cNvSpPr>
+          <p:nvPr>
+            <p:ph type="body" idx="1"/>
+          </p:nvPr>
+        </p:nvSpPr>
+        <p:spPr/>
+        <p:txBody>
+          <a:bodyPr/>
+          <a:lstStyle/>
+          <a:p>
+            <a:r>
+              <a:rPr lang="en-US" dirty="0" smtClean="0"/>
+              <a:t>Needs nothing installed – download, unzip, and run</a:t>
+            </a:r>
+            <a:endParaRPr lang="en-US" dirty="0"/>
+          </a:p>
+        </p:txBody>
+      </p:sp>
+      <p:sp>
+        <p:nvSpPr>
+          <p:cNvPr id="4" name="Slide Number Placeholder 3"/>
+          <p:cNvSpPr>
+            <a:spLocks noGrp="1"/>
+          </p:cNvSpPr>
+          <p:nvPr>
+            <p:ph type="sldNum" sz="quarter" idx="10"/>
+          </p:nvPr>
+        </p:nvSpPr>
+        <p:spPr/>
+        <p:txBody>
+          <a:bodyPr/>
+          <a:lstStyle/>
+          <a:p>
+            <a:fld id="{84A452C3-0BE2-3E46-BBC2-652C991B87BC}" type="slidenum">
+              <a:rPr lang="en-US" smtClean="0"/>
+              <a:t>4</a:t>
+            </a:fld>
+            <a:endParaRPr lang="en-US"/>
+          </a:p>
+        </p:txBody>
+      </p:sp>
+    </p:spTree>
+    <p:extLst>
+      <p:ext uri="{BB962C8B-B14F-4D97-AF65-F5344CB8AC3E}">
+        <p14:creationId xmlns:p14="http://schemas.microsoft.com/office/powerpoint/2010/main" val="1122006803"/>
+      </p:ext>
+    </p:extLst>
+  </p:cSld>
+  <p:clrMapOvr>
+    <a:masterClrMapping/>
+  </p:clrMapOvr>
+</p:notes>
+</file>
+
+<file path=ppt/notesSlides/notesSlide5.xml><?xml version="1.0" encoding="utf-8"?>
+<p:notes xmlns:a="http://schemas.openxmlformats.org/drawingml/2006/main" xmlns:r="http://schemas.openxmlformats.org/officeDocument/2006/relationships" xmlns:p="http://schemas.openxmlformats.org/presentationml/2006/main">
+  <p:cSld>
+    <p:spTree>
+      <p:nvGrpSpPr>
+        <p:cNvPr id="1" name=""/>
+        <p:cNvGrpSpPr/>
+        <p:nvPr/>
+      </p:nvGrpSpPr>
+      <p:grpSpPr>
+        <a:xfrm>
+          <a:off x="0" y="0"/>
+          <a:ext cx="0" cy="0"/>
+          <a:chOff x="0" y="0"/>
+          <a:chExt cx="0" cy="0"/>
+        </a:xfrm>
+      </p:grpSpPr>
+      <p:sp>
+        <p:nvSpPr>
+          <p:cNvPr id="2" name="Slide Image Placeholder 1"/>
+          <p:cNvSpPr>
+            <a:spLocks noGrp="1" noRot="1" noChangeAspect="1"/>
+          </p:cNvSpPr>
+          <p:nvPr>
+            <p:ph type="sldImg"/>
+          </p:nvPr>
+        </p:nvSpPr>
+        <p:spPr/>
+      </p:sp>
+      <p:sp>
+        <p:nvSpPr>
+          <p:cNvPr id="3" name="Notes Placeholder 2"/>
+          <p:cNvSpPr>
+            <a:spLocks noGrp="1"/>
+          </p:cNvSpPr>
+          <p:nvPr>
+            <p:ph type="body" idx="1"/>
+          </p:nvPr>
+        </p:nvSpPr>
+        <p:spPr/>
+        <p:txBody>
+          <a:bodyPr/>
+          <a:lstStyle/>
+          <a:p>
+            <a:endParaRPr lang="en-US" dirty="0"/>
+          </a:p>
+        </p:txBody>
+      </p:sp>
+      <p:sp>
+        <p:nvSpPr>
+          <p:cNvPr id="4" name="Slide Number Placeholder 3"/>
+          <p:cNvSpPr>
+            <a:spLocks noGrp="1"/>
+          </p:cNvSpPr>
+          <p:nvPr>
+            <p:ph type="sldNum" sz="quarter" idx="10"/>
+          </p:nvPr>
+        </p:nvSpPr>
+        <p:spPr/>
+        <p:txBody>
+          <a:bodyPr/>
+          <a:lstStyle/>
+          <a:p>
+            <a:fld id="{84A452C3-0BE2-3E46-BBC2-652C991B87BC}" type="slidenum">
+              <a:rPr lang="en-US" smtClean="0"/>
+              <a:t>6</a:t>
+            </a:fld>
+            <a:endParaRPr lang="en-US"/>
+          </a:p>
+        </p:txBody>
+      </p:sp>
+    </p:spTree>
+    <p:extLst>
+      <p:ext uri="{BB962C8B-B14F-4D97-AF65-F5344CB8AC3E}">
+        <p14:creationId xmlns:p14="http://schemas.microsoft.com/office/powerpoint/2010/main" val="4222441541"/>
+      </p:ext>
+    </p:extLst>
+  </p:cSld>
+  <p:clrMapOvr>
+    <a:masterClrMapping/>
+  </p:clrMapOvr>
+</p:notes>
+</file>
+
+<file path=ppt/notesSlides/notesSlide6.xml><?xml version="1.0" encoding="utf-8"?>
+<p:notes xmlns:a="http://schemas.openxmlformats.org/drawingml/2006/main" xmlns:r="http://schemas.openxmlformats.org/officeDocument/2006/relationships" xmlns:p="http://schemas.openxmlformats.org/presentationml/2006/main">
+  <p:cSld>
+    <p:spTree>
+      <p:nvGrpSpPr>
+        <p:cNvPr id="1" name=""/>
+        <p:cNvGrpSpPr/>
+        <p:nvPr/>
+      </p:nvGrpSpPr>
+      <p:grpSpPr>
+        <a:xfrm>
+          <a:off x="0" y="0"/>
+          <a:ext cx="0" cy="0"/>
+          <a:chOff x="0" y="0"/>
+          <a:chExt cx="0" cy="0"/>
+        </a:xfrm>
+      </p:grpSpPr>
+      <p:sp>
+        <p:nvSpPr>
+          <p:cNvPr id="2" name="Slide Image Placeholder 1"/>
+          <p:cNvSpPr>
+            <a:spLocks noGrp="1" noRot="1" noChangeAspect="1"/>
+          </p:cNvSpPr>
+          <p:nvPr>
+            <p:ph type="sldImg"/>
+          </p:nvPr>
+        </p:nvSpPr>
+        <p:spPr/>
+      </p:sp>
+      <p:sp>
+        <p:nvSpPr>
+          <p:cNvPr id="3" name="Notes Placeholder 2"/>
+          <p:cNvSpPr>
+            <a:spLocks noGrp="1"/>
+          </p:cNvSpPr>
+          <p:nvPr>
+            <p:ph type="body" idx="1"/>
+          </p:nvPr>
+        </p:nvSpPr>
+        <p:spPr/>
+        <p:txBody>
+          <a:bodyPr/>
+          <a:lstStyle/>
+          <a:p>
+            <a:r>
+              <a:rPr lang="en-US" dirty="0" smtClean="0"/>
+              <a:t>Although</a:t>
+            </a:r>
+            <a:r>
+              <a:rPr lang="en-US" baseline="0" dirty="0" smtClean="0"/>
+              <a:t> we will be using komodo edit in examples any text editor you already use should be fine if it has syntax highlighting for </a:t>
+            </a:r>
+            <a:r>
+              <a:rPr lang="en-US" baseline="0" dirty="0" err="1" smtClean="0"/>
+              <a:t>php</a:t>
+            </a:r>
+            <a:endParaRPr lang="en-US" baseline="0" dirty="0" smtClean="0"/>
+          </a:p>
+          <a:p>
+            <a:r>
+              <a:rPr lang="en-US" baseline="0" dirty="0" smtClean="0"/>
+              <a:t>this includes vim</a:t>
+            </a:r>
+            <a:endParaRPr lang="en-US" dirty="0"/>
+          </a:p>
+        </p:txBody>
+      </p:sp>
+      <p:sp>
+        <p:nvSpPr>
+          <p:cNvPr id="4" name="Slide Number Placeholder 3"/>
+          <p:cNvSpPr>
+            <a:spLocks noGrp="1"/>
+          </p:cNvSpPr>
+          <p:nvPr>
+            <p:ph type="sldNum" sz="quarter" idx="10"/>
+          </p:nvPr>
+        </p:nvSpPr>
+        <p:spPr/>
+        <p:txBody>
+          <a:bodyPr/>
+          <a:lstStyle/>
+          <a:p>
+            <a:fld id="{84A452C3-0BE2-3E46-BBC2-652C991B87BC}" type="slidenum">
+              <a:rPr lang="en-US" smtClean="0"/>
+              <a:t>7</a:t>
+            </a:fld>
+            <a:endParaRPr lang="en-US"/>
+          </a:p>
+        </p:txBody>
+      </p:sp>
+    </p:spTree>
+    <p:extLst>
+      <p:ext uri="{BB962C8B-B14F-4D97-AF65-F5344CB8AC3E}">
+        <p14:creationId xmlns:p14="http://schemas.microsoft.com/office/powerpoint/2010/main" val="2170865128"/>
+      </p:ext>
+    </p:extLst>
+  </p:cSld>
+  <p:clrMapOvr>
+    <a:masterClrMapping/>
+  </p:clrMapOvr>
+</p:notes>
+</file>
+
+<file path=ppt/notesSlides/notesSlide7.xml><?xml version="1.0" encoding="utf-8"?>
+<p:notes xmlns:a="http://schemas.openxmlformats.org/drawingml/2006/main" xmlns:r="http://schemas.openxmlformats.org/officeDocument/2006/relationships" xmlns:p="http://schemas.openxmlformats.org/presentationml/2006/main">
+  <p:cSld>
+    <p:spTree>
+      <p:nvGrpSpPr>
+        <p:cNvPr id="1" name=""/>
+        <p:cNvGrpSpPr/>
+        <p:nvPr/>
+      </p:nvGrpSpPr>
+      <p:grpSpPr>
+        <a:xfrm>
+          <a:off x="0" y="0"/>
+          <a:ext cx="0" cy="0"/>
+          <a:chOff x="0" y="0"/>
+          <a:chExt cx="0" cy="0"/>
+        </a:xfrm>
+      </p:grpSpPr>
+      <p:sp>
+        <p:nvSpPr>
+          <p:cNvPr id="2" name="Slide Image Placeholder 1"/>
+          <p:cNvSpPr>
+            <a:spLocks noGrp="1" noRot="1" noChangeAspect="1"/>
+          </p:cNvSpPr>
+          <p:nvPr>
+            <p:ph type="sldImg"/>
+          </p:nvPr>
+        </p:nvSpPr>
+        <p:spPr/>
+      </p:sp>
+      <p:sp>
+        <p:nvSpPr>
+          <p:cNvPr id="3" name="Notes Placeholder 2"/>
+          <p:cNvSpPr>
+            <a:spLocks noGrp="1"/>
+          </p:cNvSpPr>
+          <p:nvPr>
+            <p:ph type="body" idx="1"/>
+          </p:nvPr>
+        </p:nvSpPr>
+        <p:spPr/>
+        <p:txBody>
+          <a:bodyPr/>
+          <a:lstStyle/>
+          <a:p>
+            <a:endParaRPr lang="en-US" dirty="0"/>
+          </a:p>
+        </p:txBody>
+      </p:sp>
+      <p:sp>
+        <p:nvSpPr>
+          <p:cNvPr id="4" name="Slide Number Placeholder 3"/>
+          <p:cNvSpPr>
+            <a:spLocks noGrp="1"/>
+          </p:cNvSpPr>
+          <p:nvPr>
+            <p:ph type="sldNum" sz="quarter" idx="10"/>
+          </p:nvPr>
+        </p:nvSpPr>
+        <p:spPr/>
+        <p:txBody>
+          <a:bodyPr/>
+          <a:lstStyle/>
+          <a:p>
+            <a:fld id="{84A452C3-0BE2-3E46-BBC2-652C991B87BC}" type="slidenum">
+              <a:rPr lang="en-US" smtClean="0"/>
+              <a:t>8</a:t>
+            </a:fld>
+            <a:endParaRPr lang="en-US"/>
+          </a:p>
+        </p:txBody>
+      </p:sp>
+    </p:spTree>
+    <p:extLst>
+      <p:ext uri="{BB962C8B-B14F-4D97-AF65-F5344CB8AC3E}">
+        <p14:creationId xmlns:p14="http://schemas.microsoft.com/office/powerpoint/2010/main" val="2541437675"/>
       </p:ext>
     </p:extLst>
   </p:cSld>
@@ -3758,6 +4225,620 @@
     <p:extLst>
       <p:ext uri="{BB962C8B-B14F-4D97-AF65-F5344CB8AC3E}">
         <p14:creationId xmlns:p14="http://schemas.microsoft.com/office/powerpoint/2010/main" val="719899088"/>
+      </p:ext>
+    </p:extLst>
+  </p:cSld>
+  <p:clrMapOvr>
+    <a:masterClrMapping/>
+  </p:clrMapOvr>
+</p:sld>
+</file>
+
+<file path=ppt/slides/slide3.xml><?xml version="1.0" encoding="utf-8"?>
+<p:sld xmlns:a="http://schemas.openxmlformats.org/drawingml/2006/main" xmlns:r="http://schemas.openxmlformats.org/officeDocument/2006/relationships" xmlns:p="http://schemas.openxmlformats.org/presentationml/2006/main">
+  <p:cSld>
+    <p:spTree>
+      <p:nvGrpSpPr>
+        <p:cNvPr id="1" name=""/>
+        <p:cNvGrpSpPr/>
+        <p:nvPr/>
+      </p:nvGrpSpPr>
+      <p:grpSpPr>
+        <a:xfrm>
+          <a:off x="0" y="0"/>
+          <a:ext cx="0" cy="0"/>
+          <a:chOff x="0" y="0"/>
+          <a:chExt cx="0" cy="0"/>
+        </a:xfrm>
+      </p:grpSpPr>
+      <p:sp>
+        <p:nvSpPr>
+          <p:cNvPr id="2" name="Title 1"/>
+          <p:cNvSpPr>
+            <a:spLocks noGrp="1"/>
+          </p:cNvSpPr>
+          <p:nvPr>
+            <p:ph type="title"/>
+          </p:nvPr>
+        </p:nvSpPr>
+        <p:spPr/>
+        <p:txBody>
+          <a:bodyPr/>
+          <a:lstStyle/>
+          <a:p>
+            <a:r>
+              <a:rPr lang="en-US" dirty="0" smtClean="0"/>
+              <a:t>Windows</a:t>
+            </a:r>
+            <a:endParaRPr lang="en-US" dirty="0"/>
+          </a:p>
+        </p:txBody>
+      </p:sp>
+      <p:pic>
+        <p:nvPicPr>
+          <p:cNvPr id="4" name="Content Placeholder 3" descr="Windows_logo_-_2012.png"/>
+          <p:cNvPicPr>
+            <a:picLocks noGrp="1" noChangeAspect="1"/>
+          </p:cNvPicPr>
+          <p:nvPr>
+            <p:ph idx="1"/>
+          </p:nvPr>
+        </p:nvPicPr>
+        <p:blipFill>
+          <a:blip r:embed="rId3">
+            <a:extLst>
+              <a:ext uri="{28A0092B-C50C-407E-A947-70E740481C1C}">
+                <a14:useLocalDpi xmlns:a14="http://schemas.microsoft.com/office/drawing/2010/main" val="0"/>
+              </a:ext>
+            </a:extLst>
+          </a:blip>
+          <a:srcRect l="-49674" r="-49674"/>
+          <a:stretch>
+            <a:fillRect/>
+          </a:stretch>
+        </p:blipFill>
+        <p:spPr/>
+      </p:pic>
+    </p:spTree>
+    <p:extLst>
+      <p:ext uri="{BB962C8B-B14F-4D97-AF65-F5344CB8AC3E}">
+        <p14:creationId xmlns:p14="http://schemas.microsoft.com/office/powerpoint/2010/main" val="4003632236"/>
+      </p:ext>
+    </p:extLst>
+  </p:cSld>
+  <p:clrMapOvr>
+    <a:masterClrMapping/>
+  </p:clrMapOvr>
+</p:sld>
+</file>
+
+<file path=ppt/slides/slide4.xml><?xml version="1.0" encoding="utf-8"?>
+<p:sld xmlns:a="http://schemas.openxmlformats.org/drawingml/2006/main" xmlns:r="http://schemas.openxmlformats.org/officeDocument/2006/relationships" xmlns:p="http://schemas.openxmlformats.org/presentationml/2006/main">
+  <p:cSld>
+    <p:spTree>
+      <p:nvGrpSpPr>
+        <p:cNvPr id="1" name=""/>
+        <p:cNvGrpSpPr/>
+        <p:nvPr/>
+      </p:nvGrpSpPr>
+      <p:grpSpPr>
+        <a:xfrm>
+          <a:off x="0" y="0"/>
+          <a:ext cx="0" cy="0"/>
+          <a:chOff x="0" y="0"/>
+          <a:chExt cx="0" cy="0"/>
+        </a:xfrm>
+      </p:grpSpPr>
+      <p:sp>
+        <p:nvSpPr>
+          <p:cNvPr id="2" name="Title 1"/>
+          <p:cNvSpPr>
+            <a:spLocks noGrp="1"/>
+          </p:cNvSpPr>
+          <p:nvPr>
+            <p:ph type="title"/>
+          </p:nvPr>
+        </p:nvSpPr>
+        <p:spPr/>
+        <p:txBody>
+          <a:bodyPr/>
+          <a:lstStyle/>
+          <a:p>
+            <a:r>
+              <a:rPr lang="en-US" dirty="0" smtClean="0"/>
+              <a:t>Download the Package</a:t>
+            </a:r>
+            <a:endParaRPr lang="en-US" dirty="0"/>
+          </a:p>
+        </p:txBody>
+      </p:sp>
+      <p:sp>
+        <p:nvSpPr>
+          <p:cNvPr id="3" name="Content Placeholder 2"/>
+          <p:cNvSpPr>
+            <a:spLocks noGrp="1"/>
+          </p:cNvSpPr>
+          <p:nvPr>
+            <p:ph idx="1"/>
+          </p:nvPr>
+        </p:nvSpPr>
+        <p:spPr/>
+        <p:txBody>
+          <a:bodyPr/>
+          <a:lstStyle/>
+          <a:p>
+            <a:r>
+              <a:rPr lang="en-US" dirty="0" smtClean="0"/>
+              <a:t>Includes a stripped down PHP executable</a:t>
+            </a:r>
+          </a:p>
+          <a:p>
+            <a:r>
+              <a:rPr lang="en-US" dirty="0" smtClean="0"/>
+              <a:t>Includes a batch file to run the built in server and serve from the code directory inside</a:t>
+            </a:r>
+          </a:p>
+          <a:p>
+            <a:r>
+              <a:rPr lang="en-US" dirty="0" smtClean="0"/>
+              <a:t>You can alter the code location if you choose in the batch file</a:t>
+            </a:r>
+          </a:p>
+          <a:p>
+            <a:r>
+              <a:rPr lang="en-US" dirty="0" smtClean="0"/>
+              <a:t>Includes a portable install of komodo edit and </a:t>
+            </a:r>
+            <a:r>
+              <a:rPr lang="en-US" dirty="0" err="1" smtClean="0"/>
+              <a:t>db</a:t>
+            </a:r>
+            <a:r>
+              <a:rPr lang="en-US" dirty="0" smtClean="0"/>
+              <a:t> browser for </a:t>
+            </a:r>
+            <a:r>
+              <a:rPr lang="en-US" dirty="0" err="1" smtClean="0"/>
+              <a:t>sqlite</a:t>
+            </a:r>
+            <a:endParaRPr lang="en-US" dirty="0"/>
+          </a:p>
+        </p:txBody>
+      </p:sp>
+    </p:spTree>
+    <p:extLst>
+      <p:ext uri="{BB962C8B-B14F-4D97-AF65-F5344CB8AC3E}">
+        <p14:creationId xmlns:p14="http://schemas.microsoft.com/office/powerpoint/2010/main" val="3423475601"/>
+      </p:ext>
+    </p:extLst>
+  </p:cSld>
+  <p:clrMapOvr>
+    <a:masterClrMapping/>
+  </p:clrMapOvr>
+</p:sld>
+</file>
+
+<file path=ppt/slides/slide5.xml><?xml version="1.0" encoding="utf-8"?>
+<p:sld xmlns:a="http://schemas.openxmlformats.org/drawingml/2006/main" xmlns:r="http://schemas.openxmlformats.org/officeDocument/2006/relationships" xmlns:p="http://schemas.openxmlformats.org/presentationml/2006/main">
+  <p:cSld>
+    <p:spTree>
+      <p:nvGrpSpPr>
+        <p:cNvPr id="1" name=""/>
+        <p:cNvGrpSpPr/>
+        <p:nvPr/>
+      </p:nvGrpSpPr>
+      <p:grpSpPr>
+        <a:xfrm>
+          <a:off x="0" y="0"/>
+          <a:ext cx="0" cy="0"/>
+          <a:chOff x="0" y="0"/>
+          <a:chExt cx="0" cy="0"/>
+        </a:xfrm>
+      </p:grpSpPr>
+      <p:sp>
+        <p:nvSpPr>
+          <p:cNvPr id="2" name="Title 1"/>
+          <p:cNvSpPr>
+            <a:spLocks noGrp="1"/>
+          </p:cNvSpPr>
+          <p:nvPr>
+            <p:ph type="title"/>
+          </p:nvPr>
+        </p:nvSpPr>
+        <p:spPr/>
+        <p:txBody>
+          <a:bodyPr/>
+          <a:lstStyle/>
+          <a:p>
+            <a:r>
+              <a:rPr lang="en-US" dirty="0" smtClean="0"/>
+              <a:t>Do it by hand</a:t>
+            </a:r>
+            <a:endParaRPr lang="en-US" dirty="0"/>
+          </a:p>
+        </p:txBody>
+      </p:sp>
+      <p:sp>
+        <p:nvSpPr>
+          <p:cNvPr id="3" name="Content Placeholder 2"/>
+          <p:cNvSpPr>
+            <a:spLocks noGrp="1"/>
+          </p:cNvSpPr>
+          <p:nvPr>
+            <p:ph idx="1"/>
+          </p:nvPr>
+        </p:nvSpPr>
+        <p:spPr/>
+        <p:txBody>
+          <a:bodyPr/>
+          <a:lstStyle/>
+          <a:p>
+            <a:r>
+              <a:rPr lang="en-US" dirty="0" smtClean="0"/>
+              <a:t>download komodo edit </a:t>
+            </a:r>
+            <a:r>
+              <a:rPr lang="en-US" smtClean="0"/>
+              <a:t>from http://</a:t>
+            </a:r>
+            <a:endParaRPr lang="en-US"/>
+          </a:p>
+        </p:txBody>
+      </p:sp>
+    </p:spTree>
+    <p:extLst>
+      <p:ext uri="{BB962C8B-B14F-4D97-AF65-F5344CB8AC3E}">
+        <p14:creationId xmlns:p14="http://schemas.microsoft.com/office/powerpoint/2010/main" val="3703654712"/>
+      </p:ext>
+    </p:extLst>
+  </p:cSld>
+  <p:clrMapOvr>
+    <a:masterClrMapping/>
+  </p:clrMapOvr>
+</p:sld>
+</file>
+
+<file path=ppt/slides/slide6.xml><?xml version="1.0" encoding="utf-8"?>
+<p:sld xmlns:a="http://schemas.openxmlformats.org/drawingml/2006/main" xmlns:r="http://schemas.openxmlformats.org/officeDocument/2006/relationships" xmlns:p="http://schemas.openxmlformats.org/presentationml/2006/main">
+  <p:cSld>
+    <p:spTree>
+      <p:nvGrpSpPr>
+        <p:cNvPr id="1" name=""/>
+        <p:cNvGrpSpPr/>
+        <p:nvPr/>
+      </p:nvGrpSpPr>
+      <p:grpSpPr>
+        <a:xfrm>
+          <a:off x="0" y="0"/>
+          <a:ext cx="0" cy="0"/>
+          <a:chOff x="0" y="0"/>
+          <a:chExt cx="0" cy="0"/>
+        </a:xfrm>
+      </p:grpSpPr>
+      <p:sp>
+        <p:nvSpPr>
+          <p:cNvPr id="2" name="Title 1"/>
+          <p:cNvSpPr>
+            <a:spLocks noGrp="1"/>
+          </p:cNvSpPr>
+          <p:nvPr>
+            <p:ph type="title"/>
+          </p:nvPr>
+        </p:nvSpPr>
+        <p:spPr/>
+        <p:txBody>
+          <a:bodyPr/>
+          <a:lstStyle/>
+          <a:p>
+            <a:r>
+              <a:rPr lang="en-US" dirty="0" smtClean="0"/>
+              <a:t>Linux (Ubuntu)</a:t>
+            </a:r>
+            <a:endParaRPr lang="en-US" dirty="0"/>
+          </a:p>
+        </p:txBody>
+      </p:sp>
+      <p:pic>
+        <p:nvPicPr>
+          <p:cNvPr id="4" name="Content Placeholder 3" descr="Ubuntu_Logo.png"/>
+          <p:cNvPicPr>
+            <a:picLocks noGrp="1" noChangeAspect="1"/>
+          </p:cNvPicPr>
+          <p:nvPr>
+            <p:ph idx="1"/>
+          </p:nvPr>
+        </p:nvPicPr>
+        <p:blipFill>
+          <a:blip r:embed="rId3">
+            <a:extLst>
+              <a:ext uri="{28A0092B-C50C-407E-A947-70E740481C1C}">
+                <a14:useLocalDpi xmlns:a14="http://schemas.microsoft.com/office/drawing/2010/main" val="0"/>
+              </a:ext>
+            </a:extLst>
+          </a:blip>
+          <a:srcRect l="-40915" r="-40915"/>
+          <a:stretch>
+            <a:fillRect/>
+          </a:stretch>
+        </p:blipFill>
+        <p:spPr/>
+      </p:pic>
+    </p:spTree>
+    <p:extLst>
+      <p:ext uri="{BB962C8B-B14F-4D97-AF65-F5344CB8AC3E}">
+        <p14:creationId xmlns:p14="http://schemas.microsoft.com/office/powerpoint/2010/main" val="3063094544"/>
+      </p:ext>
+    </p:extLst>
+  </p:cSld>
+  <p:clrMapOvr>
+    <a:masterClrMapping/>
+  </p:clrMapOvr>
+</p:sld>
+</file>
+
+<file path=ppt/slides/slide7.xml><?xml version="1.0" encoding="utf-8"?>
+<p:sld xmlns:a="http://schemas.openxmlformats.org/drawingml/2006/main" xmlns:r="http://schemas.openxmlformats.org/officeDocument/2006/relationships" xmlns:p="http://schemas.openxmlformats.org/presentationml/2006/main">
+  <p:cSld>
+    <p:spTree>
+      <p:nvGrpSpPr>
+        <p:cNvPr id="1" name=""/>
+        <p:cNvGrpSpPr/>
+        <p:nvPr/>
+      </p:nvGrpSpPr>
+      <p:grpSpPr>
+        <a:xfrm>
+          <a:off x="0" y="0"/>
+          <a:ext cx="0" cy="0"/>
+          <a:chOff x="0" y="0"/>
+          <a:chExt cx="0" cy="0"/>
+        </a:xfrm>
+      </p:grpSpPr>
+      <p:sp>
+        <p:nvSpPr>
+          <p:cNvPr id="2" name="Title 1"/>
+          <p:cNvSpPr>
+            <a:spLocks noGrp="1"/>
+          </p:cNvSpPr>
+          <p:nvPr>
+            <p:ph type="title"/>
+          </p:nvPr>
+        </p:nvSpPr>
+        <p:spPr/>
+        <p:txBody>
+          <a:bodyPr/>
+          <a:lstStyle/>
+          <a:p>
+            <a:r>
+              <a:rPr lang="en-US" dirty="0" smtClean="0"/>
+              <a:t>Items needed</a:t>
+            </a:r>
+            <a:endParaRPr lang="en-US" dirty="0"/>
+          </a:p>
+        </p:txBody>
+      </p:sp>
+      <p:sp>
+        <p:nvSpPr>
+          <p:cNvPr id="3" name="Content Placeholder 2"/>
+          <p:cNvSpPr>
+            <a:spLocks noGrp="1"/>
+          </p:cNvSpPr>
+          <p:nvPr>
+            <p:ph idx="1"/>
+          </p:nvPr>
+        </p:nvSpPr>
+        <p:spPr/>
+        <p:txBody>
+          <a:bodyPr/>
+          <a:lstStyle/>
+          <a:p>
+            <a:r>
+              <a:rPr lang="en-US" dirty="0" err="1" smtClean="0"/>
+              <a:t>php</a:t>
+            </a:r>
+            <a:r>
+              <a:rPr lang="en-US" dirty="0" smtClean="0"/>
+              <a:t> 5.6 (cli)</a:t>
+            </a:r>
+          </a:p>
+          <a:p>
+            <a:r>
+              <a:rPr lang="en-US" dirty="0" err="1" smtClean="0"/>
+              <a:t>pdo_sqlite</a:t>
+            </a:r>
+            <a:r>
+              <a:rPr lang="en-US" dirty="0" smtClean="0"/>
+              <a:t> extension</a:t>
+            </a:r>
+          </a:p>
+          <a:p>
+            <a:r>
+              <a:rPr lang="en-US" dirty="0" err="1" smtClean="0"/>
+              <a:t>db</a:t>
+            </a:r>
+            <a:r>
+              <a:rPr lang="en-US" dirty="0" smtClean="0"/>
+              <a:t> browser for </a:t>
+            </a:r>
+            <a:r>
+              <a:rPr lang="en-US" dirty="0" err="1" smtClean="0"/>
+              <a:t>sqlite</a:t>
+            </a:r>
+            <a:endParaRPr lang="en-US" dirty="0" smtClean="0"/>
+          </a:p>
+          <a:p>
+            <a:r>
+              <a:rPr lang="en-US" dirty="0" smtClean="0"/>
+              <a:t>komodo edit (or text editor of choice)</a:t>
+            </a:r>
+          </a:p>
+          <a:p>
+            <a:pPr lvl="1"/>
+            <a:r>
+              <a:rPr lang="en-US" dirty="0" smtClean="0"/>
+              <a:t>vim</a:t>
+            </a:r>
+          </a:p>
+          <a:p>
+            <a:pPr lvl="1"/>
+            <a:r>
+              <a:rPr lang="en-US" dirty="0" smtClean="0"/>
+              <a:t>eclipse</a:t>
+            </a:r>
+          </a:p>
+          <a:p>
+            <a:pPr lvl="1"/>
+            <a:r>
+              <a:rPr lang="en-US" dirty="0" err="1" smtClean="0"/>
+              <a:t>phpstorm</a:t>
+            </a:r>
+            <a:endParaRPr lang="en-US" dirty="0" smtClean="0"/>
+          </a:p>
+        </p:txBody>
+      </p:sp>
+    </p:spTree>
+    <p:extLst>
+      <p:ext uri="{BB962C8B-B14F-4D97-AF65-F5344CB8AC3E}">
+        <p14:creationId xmlns:p14="http://schemas.microsoft.com/office/powerpoint/2010/main" val="2211426217"/>
+      </p:ext>
+    </p:extLst>
+  </p:cSld>
+  <p:clrMapOvr>
+    <a:masterClrMapping/>
+  </p:clrMapOvr>
+</p:sld>
+</file>
+
+<file path=ppt/slides/slide8.xml><?xml version="1.0" encoding="utf-8"?>
+<p:sld xmlns:a="http://schemas.openxmlformats.org/drawingml/2006/main" xmlns:r="http://schemas.openxmlformats.org/officeDocument/2006/relationships" xmlns:p="http://schemas.openxmlformats.org/presentationml/2006/main">
+  <p:cSld>
+    <p:spTree>
+      <p:nvGrpSpPr>
+        <p:cNvPr id="1" name=""/>
+        <p:cNvGrpSpPr/>
+        <p:nvPr/>
+      </p:nvGrpSpPr>
+      <p:grpSpPr>
+        <a:xfrm>
+          <a:off x="0" y="0"/>
+          <a:ext cx="0" cy="0"/>
+          <a:chOff x="0" y="0"/>
+          <a:chExt cx="0" cy="0"/>
+        </a:xfrm>
+      </p:grpSpPr>
+      <p:sp>
+        <p:nvSpPr>
+          <p:cNvPr id="2" name="Title 1"/>
+          <p:cNvSpPr>
+            <a:spLocks noGrp="1"/>
+          </p:cNvSpPr>
+          <p:nvPr>
+            <p:ph type="title"/>
+          </p:nvPr>
+        </p:nvSpPr>
+        <p:spPr/>
+        <p:txBody>
+          <a:bodyPr/>
+          <a:lstStyle/>
+          <a:p>
+            <a:r>
+              <a:rPr lang="en-US" dirty="0" smtClean="0"/>
+              <a:t>Installation</a:t>
+            </a:r>
+            <a:endParaRPr lang="en-US" dirty="0"/>
+          </a:p>
+        </p:txBody>
+      </p:sp>
+      <p:sp>
+        <p:nvSpPr>
+          <p:cNvPr id="3" name="Content Placeholder 2"/>
+          <p:cNvSpPr>
+            <a:spLocks noGrp="1"/>
+          </p:cNvSpPr>
+          <p:nvPr>
+            <p:ph idx="1"/>
+          </p:nvPr>
+        </p:nvSpPr>
+        <p:spPr/>
+        <p:txBody>
+          <a:bodyPr/>
+          <a:lstStyle/>
+          <a:p>
+            <a:r>
+              <a:rPr lang="en-US" dirty="0" smtClean="0"/>
+              <a:t>check if </a:t>
+            </a:r>
+            <a:r>
+              <a:rPr lang="en-US" dirty="0" err="1" smtClean="0"/>
+              <a:t>php</a:t>
+            </a:r>
+            <a:r>
+              <a:rPr lang="en-US" dirty="0" smtClean="0"/>
+              <a:t> is already installed</a:t>
+            </a:r>
+          </a:p>
+          <a:p>
+            <a:r>
+              <a:rPr lang="en-US" dirty="0" smtClean="0"/>
+              <a:t>check if </a:t>
+            </a:r>
+            <a:r>
+              <a:rPr lang="en-US" dirty="0" err="1" smtClean="0"/>
+              <a:t>sqlite</a:t>
+            </a:r>
+            <a:r>
+              <a:rPr lang="en-US" dirty="0" smtClean="0"/>
+              <a:t> is available</a:t>
+            </a:r>
+          </a:p>
+          <a:p>
+            <a:r>
+              <a:rPr lang="en-US" dirty="0" smtClean="0"/>
+              <a:t>run the built in </a:t>
+            </a:r>
+            <a:r>
+              <a:rPr lang="en-US" dirty="0" err="1" smtClean="0"/>
+              <a:t>php</a:t>
+            </a:r>
+            <a:r>
+              <a:rPr lang="en-US" dirty="0" smtClean="0"/>
+              <a:t> webserver, make sure it works</a:t>
+            </a:r>
+          </a:p>
+          <a:p>
+            <a:r>
+              <a:rPr lang="en-US" dirty="0" smtClean="0"/>
+              <a:t>Install your text editor, if not already set up</a:t>
+            </a:r>
+          </a:p>
+          <a:p>
+            <a:r>
+              <a:rPr lang="en-US" dirty="0" smtClean="0"/>
+              <a:t>Install </a:t>
+            </a:r>
+            <a:r>
+              <a:rPr lang="en-US" dirty="0" err="1" smtClean="0"/>
+              <a:t>db</a:t>
+            </a:r>
+            <a:r>
+              <a:rPr lang="en-US" dirty="0" smtClean="0"/>
+              <a:t> browser for </a:t>
+            </a:r>
+            <a:r>
+              <a:rPr lang="en-US" dirty="0" err="1" smtClean="0"/>
+              <a:t>sqlite</a:t>
+            </a:r>
+            <a:r>
+              <a:rPr lang="en-US" dirty="0" smtClean="0"/>
+              <a:t>, if not already set up</a:t>
+            </a:r>
+            <a:endParaRPr lang="en-US" dirty="0"/>
+          </a:p>
+        </p:txBody>
+      </p:sp>
+    </p:spTree>
+    <p:extLst>
+      <p:ext uri="{BB962C8B-B14F-4D97-AF65-F5344CB8AC3E}">
+        <p14:creationId xmlns:p14="http://schemas.microsoft.com/office/powerpoint/2010/main" val="3537609734"/>
       </p:ext>
     </p:extLst>
   </p:cSld>

</xml_diff>

<commit_message>
Rest of pat's fixes
and additional setup work
</commit_message>
<xml_diff>
--- a/course/0 - Setup/Setup.pptx
+++ b/course/0 - Setup/Setup.pptx
@@ -5,17 +5,33 @@
     <p:sldMasterId id="2147483648" r:id="rId1"/>
   </p:sldMasterIdLst>
   <p:notesMasterIdLst>
-    <p:notesMasterId r:id="rId10"/>
+    <p:notesMasterId r:id="rId26"/>
   </p:notesMasterIdLst>
   <p:sldIdLst>
     <p:sldId id="256" r:id="rId2"/>
-    <p:sldId id="257" r:id="rId3"/>
-    <p:sldId id="258" r:id="rId4"/>
-    <p:sldId id="262" r:id="rId5"/>
-    <p:sldId id="263" r:id="rId6"/>
-    <p:sldId id="259" r:id="rId7"/>
-    <p:sldId id="260" r:id="rId8"/>
-    <p:sldId id="261" r:id="rId9"/>
+    <p:sldId id="272" r:id="rId3"/>
+    <p:sldId id="273" r:id="rId4"/>
+    <p:sldId id="274" r:id="rId5"/>
+    <p:sldId id="257" r:id="rId6"/>
+    <p:sldId id="281" r:id="rId7"/>
+    <p:sldId id="258" r:id="rId8"/>
+    <p:sldId id="262" r:id="rId9"/>
+    <p:sldId id="267" r:id="rId10"/>
+    <p:sldId id="268" r:id="rId11"/>
+    <p:sldId id="265" r:id="rId12"/>
+    <p:sldId id="269" r:id="rId13"/>
+    <p:sldId id="270" r:id="rId14"/>
+    <p:sldId id="266" r:id="rId15"/>
+    <p:sldId id="271" r:id="rId16"/>
+    <p:sldId id="263" r:id="rId17"/>
+    <p:sldId id="264" r:id="rId18"/>
+    <p:sldId id="259" r:id="rId19"/>
+    <p:sldId id="261" r:id="rId20"/>
+    <p:sldId id="277" r:id="rId21"/>
+    <p:sldId id="278" r:id="rId22"/>
+    <p:sldId id="276" r:id="rId23"/>
+    <p:sldId id="279" r:id="rId24"/>
+    <p:sldId id="280" r:id="rId25"/>
   </p:sldIdLst>
   <p:sldSz cx="9144000" cy="6858000" type="screen4x3"/>
   <p:notesSz cx="6858000" cy="9144000"/>
@@ -120,16 +136,46 @@
         <p14:section name="Default Section" id="{189D08AB-3ED4-AF4C-8427-9A2242C46576}">
           <p14:sldIdLst>
             <p14:sldId id="256"/>
+            <p14:sldId id="272"/>
+            <p14:sldId id="273"/>
+            <p14:sldId id="274"/>
             <p14:sldId id="257"/>
+            <p14:sldId id="281"/>
             <p14:sldId id="258"/>
             <p14:sldId id="262"/>
+            <p14:sldId id="267"/>
+            <p14:sldId id="268"/>
+            <p14:sldId id="265"/>
+            <p14:sldId id="269"/>
+            <p14:sldId id="270"/>
+            <p14:sldId id="266"/>
+            <p14:sldId id="271"/>
             <p14:sldId id="263"/>
+            <p14:sldId id="264"/>
             <p14:sldId id="259"/>
-            <p14:sldId id="260"/>
             <p14:sldId id="261"/>
+            <p14:sldId id="277"/>
+            <p14:sldId id="278"/>
+            <p14:sldId id="276"/>
+            <p14:sldId id="279"/>
+            <p14:sldId id="280"/>
           </p14:sldIdLst>
         </p14:section>
       </p14:sectionLst>
+    </p:ext>
+    <p:ext uri="{EFAFB233-063F-42B5-8137-9DF3F51BA10A}">
+      <p15:sldGuideLst xmlns:p15="http://schemas.microsoft.com/office/powerpoint/2012/main">
+        <p15:guide id="1" orient="horz" pos="2160">
+          <p15:clr>
+            <a:srgbClr val="A4A3A4"/>
+          </p15:clr>
+        </p15:guide>
+        <p15:guide id="2" pos="2880">
+          <p15:clr>
+            <a:srgbClr val="A4A3A4"/>
+          </p15:clr>
+        </p15:guide>
+      </p15:sldGuideLst>
     </p:ext>
   </p:extLst>
 </p:presentation>
@@ -217,7 +263,7 @@
           <a:p>
             <a:fld id="{E759826C-CDF1-1343-846F-5EC65008665E}" type="datetimeFigureOut">
               <a:rPr lang="en-US" smtClean="0"/>
-              <a:t>3/28/15</a:t>
+              <a:t>3/28/2015</a:t>
             </a:fld>
             <a:endParaRPr lang="en-US"/>
           </a:p>
@@ -577,6 +623,843 @@
 </p:notes>
 </file>
 
+<file path=ppt/notesSlides/notesSlide10.xml><?xml version="1.0" encoding="utf-8"?>
+<p:notes xmlns:a="http://schemas.openxmlformats.org/drawingml/2006/main" xmlns:r="http://schemas.openxmlformats.org/officeDocument/2006/relationships" xmlns:p="http://schemas.openxmlformats.org/presentationml/2006/main">
+  <p:cSld>
+    <p:spTree>
+      <p:nvGrpSpPr>
+        <p:cNvPr id="1" name=""/>
+        <p:cNvGrpSpPr/>
+        <p:nvPr/>
+      </p:nvGrpSpPr>
+      <p:grpSpPr>
+        <a:xfrm>
+          <a:off x="0" y="0"/>
+          <a:ext cx="0" cy="0"/>
+          <a:chOff x="0" y="0"/>
+          <a:chExt cx="0" cy="0"/>
+        </a:xfrm>
+      </p:grpSpPr>
+      <p:sp>
+        <p:nvSpPr>
+          <p:cNvPr id="2" name="Slide Image Placeholder 1"/>
+          <p:cNvSpPr>
+            <a:spLocks noGrp="1" noRot="1" noChangeAspect="1"/>
+          </p:cNvSpPr>
+          <p:nvPr>
+            <p:ph type="sldImg"/>
+          </p:nvPr>
+        </p:nvSpPr>
+        <p:spPr/>
+      </p:sp>
+      <p:sp>
+        <p:nvSpPr>
+          <p:cNvPr id="3" name="Notes Placeholder 2"/>
+          <p:cNvSpPr>
+            <a:spLocks noGrp="1"/>
+          </p:cNvSpPr>
+          <p:nvPr>
+            <p:ph type="body" idx="1"/>
+          </p:nvPr>
+        </p:nvSpPr>
+        <p:spPr/>
+        <p:txBody>
+          <a:bodyPr/>
+          <a:lstStyle/>
+          <a:p>
+            <a:endParaRPr lang="en-US" dirty="0"/>
+          </a:p>
+        </p:txBody>
+      </p:sp>
+      <p:sp>
+        <p:nvSpPr>
+          <p:cNvPr id="4" name="Slide Number Placeholder 3"/>
+          <p:cNvSpPr>
+            <a:spLocks noGrp="1"/>
+          </p:cNvSpPr>
+          <p:nvPr>
+            <p:ph type="sldNum" sz="quarter" idx="10"/>
+          </p:nvPr>
+        </p:nvSpPr>
+        <p:spPr/>
+        <p:txBody>
+          <a:bodyPr/>
+          <a:lstStyle/>
+          <a:p>
+            <a:fld id="{84A452C3-0BE2-3E46-BBC2-652C991B87BC}" type="slidenum">
+              <a:rPr lang="en-US" smtClean="0"/>
+              <a:t>18</a:t>
+            </a:fld>
+            <a:endParaRPr lang="en-US"/>
+          </a:p>
+        </p:txBody>
+      </p:sp>
+    </p:spTree>
+    <p:extLst>
+      <p:ext uri="{BB962C8B-B14F-4D97-AF65-F5344CB8AC3E}">
+        <p14:creationId xmlns:p14="http://schemas.microsoft.com/office/powerpoint/2010/main" val="4222441541"/>
+      </p:ext>
+    </p:extLst>
+  </p:cSld>
+  <p:clrMapOvr>
+    <a:masterClrMapping/>
+  </p:clrMapOvr>
+</p:notes>
+</file>
+
+<file path=ppt/notesSlides/notesSlide11.xml><?xml version="1.0" encoding="utf-8"?>
+<p:notes xmlns:a="http://schemas.openxmlformats.org/drawingml/2006/main" xmlns:r="http://schemas.openxmlformats.org/officeDocument/2006/relationships" xmlns:p="http://schemas.openxmlformats.org/presentationml/2006/main">
+  <p:cSld>
+    <p:spTree>
+      <p:nvGrpSpPr>
+        <p:cNvPr id="1" name=""/>
+        <p:cNvGrpSpPr/>
+        <p:nvPr/>
+      </p:nvGrpSpPr>
+      <p:grpSpPr>
+        <a:xfrm>
+          <a:off x="0" y="0"/>
+          <a:ext cx="0" cy="0"/>
+          <a:chOff x="0" y="0"/>
+          <a:chExt cx="0" cy="0"/>
+        </a:xfrm>
+      </p:grpSpPr>
+      <p:sp>
+        <p:nvSpPr>
+          <p:cNvPr id="2" name="Slide Image Placeholder 1"/>
+          <p:cNvSpPr>
+            <a:spLocks noGrp="1" noRot="1" noChangeAspect="1"/>
+          </p:cNvSpPr>
+          <p:nvPr>
+            <p:ph type="sldImg"/>
+          </p:nvPr>
+        </p:nvSpPr>
+        <p:spPr/>
+      </p:sp>
+      <p:sp>
+        <p:nvSpPr>
+          <p:cNvPr id="3" name="Notes Placeholder 2"/>
+          <p:cNvSpPr>
+            <a:spLocks noGrp="1"/>
+          </p:cNvSpPr>
+          <p:nvPr>
+            <p:ph type="body" idx="1"/>
+          </p:nvPr>
+        </p:nvSpPr>
+        <p:spPr/>
+        <p:txBody>
+          <a:bodyPr/>
+          <a:lstStyle/>
+          <a:p>
+            <a:endParaRPr lang="en-US" dirty="0"/>
+          </a:p>
+        </p:txBody>
+      </p:sp>
+      <p:sp>
+        <p:nvSpPr>
+          <p:cNvPr id="4" name="Slide Number Placeholder 3"/>
+          <p:cNvSpPr>
+            <a:spLocks noGrp="1"/>
+          </p:cNvSpPr>
+          <p:nvPr>
+            <p:ph type="sldNum" sz="quarter" idx="10"/>
+          </p:nvPr>
+        </p:nvSpPr>
+        <p:spPr/>
+        <p:txBody>
+          <a:bodyPr/>
+          <a:lstStyle/>
+          <a:p>
+            <a:fld id="{84A452C3-0BE2-3E46-BBC2-652C991B87BC}" type="slidenum">
+              <a:rPr lang="en-US" smtClean="0"/>
+              <a:t>19</a:t>
+            </a:fld>
+            <a:endParaRPr lang="en-US"/>
+          </a:p>
+        </p:txBody>
+      </p:sp>
+    </p:spTree>
+    <p:extLst>
+      <p:ext uri="{BB962C8B-B14F-4D97-AF65-F5344CB8AC3E}">
+        <p14:creationId xmlns:p14="http://schemas.microsoft.com/office/powerpoint/2010/main" val="2541437675"/>
+      </p:ext>
+    </p:extLst>
+  </p:cSld>
+  <p:clrMapOvr>
+    <a:masterClrMapping/>
+  </p:clrMapOvr>
+</p:notes>
+</file>
+
+<file path=ppt/notesSlides/notesSlide12.xml><?xml version="1.0" encoding="utf-8"?>
+<p:notes xmlns:a="http://schemas.openxmlformats.org/drawingml/2006/main" xmlns:r="http://schemas.openxmlformats.org/officeDocument/2006/relationships" xmlns:p="http://schemas.openxmlformats.org/presentationml/2006/main">
+  <p:cSld>
+    <p:spTree>
+      <p:nvGrpSpPr>
+        <p:cNvPr id="1" name=""/>
+        <p:cNvGrpSpPr/>
+        <p:nvPr/>
+      </p:nvGrpSpPr>
+      <p:grpSpPr>
+        <a:xfrm>
+          <a:off x="0" y="0"/>
+          <a:ext cx="0" cy="0"/>
+          <a:chOff x="0" y="0"/>
+          <a:chExt cx="0" cy="0"/>
+        </a:xfrm>
+      </p:grpSpPr>
+      <p:sp>
+        <p:nvSpPr>
+          <p:cNvPr id="2" name="Slide Image Placeholder 1"/>
+          <p:cNvSpPr>
+            <a:spLocks noGrp="1" noRot="1" noChangeAspect="1"/>
+          </p:cNvSpPr>
+          <p:nvPr>
+            <p:ph type="sldImg"/>
+          </p:nvPr>
+        </p:nvSpPr>
+        <p:spPr/>
+      </p:sp>
+      <p:sp>
+        <p:nvSpPr>
+          <p:cNvPr id="3" name="Notes Placeholder 2"/>
+          <p:cNvSpPr>
+            <a:spLocks noGrp="1"/>
+          </p:cNvSpPr>
+          <p:nvPr>
+            <p:ph type="body" idx="1"/>
+          </p:nvPr>
+        </p:nvSpPr>
+        <p:spPr/>
+        <p:txBody>
+          <a:bodyPr/>
+          <a:lstStyle/>
+          <a:p>
+            <a:endParaRPr lang="en-US" dirty="0"/>
+          </a:p>
+        </p:txBody>
+      </p:sp>
+      <p:sp>
+        <p:nvSpPr>
+          <p:cNvPr id="4" name="Slide Number Placeholder 3"/>
+          <p:cNvSpPr>
+            <a:spLocks noGrp="1"/>
+          </p:cNvSpPr>
+          <p:nvPr>
+            <p:ph type="sldNum" sz="quarter" idx="10"/>
+          </p:nvPr>
+        </p:nvSpPr>
+        <p:spPr/>
+        <p:txBody>
+          <a:bodyPr/>
+          <a:lstStyle/>
+          <a:p>
+            <a:fld id="{84A452C3-0BE2-3E46-BBC2-652C991B87BC}" type="slidenum">
+              <a:rPr lang="en-US" smtClean="0"/>
+              <a:t>20</a:t>
+            </a:fld>
+            <a:endParaRPr lang="en-US"/>
+          </a:p>
+        </p:txBody>
+      </p:sp>
+    </p:spTree>
+    <p:extLst>
+      <p:ext uri="{BB962C8B-B14F-4D97-AF65-F5344CB8AC3E}">
+        <p14:creationId xmlns:p14="http://schemas.microsoft.com/office/powerpoint/2010/main" val="636899950"/>
+      </p:ext>
+    </p:extLst>
+  </p:cSld>
+  <p:clrMapOvr>
+    <a:masterClrMapping/>
+  </p:clrMapOvr>
+</p:notes>
+</file>
+
+<file path=ppt/notesSlides/notesSlide13.xml><?xml version="1.0" encoding="utf-8"?>
+<p:notes xmlns:a="http://schemas.openxmlformats.org/drawingml/2006/main" xmlns:r="http://schemas.openxmlformats.org/officeDocument/2006/relationships" xmlns:p="http://schemas.openxmlformats.org/presentationml/2006/main">
+  <p:cSld>
+    <p:spTree>
+      <p:nvGrpSpPr>
+        <p:cNvPr id="1" name=""/>
+        <p:cNvGrpSpPr/>
+        <p:nvPr/>
+      </p:nvGrpSpPr>
+      <p:grpSpPr>
+        <a:xfrm>
+          <a:off x="0" y="0"/>
+          <a:ext cx="0" cy="0"/>
+          <a:chOff x="0" y="0"/>
+          <a:chExt cx="0" cy="0"/>
+        </a:xfrm>
+      </p:grpSpPr>
+      <p:sp>
+        <p:nvSpPr>
+          <p:cNvPr id="2" name="Slide Image Placeholder 1"/>
+          <p:cNvSpPr>
+            <a:spLocks noGrp="1" noRot="1" noChangeAspect="1"/>
+          </p:cNvSpPr>
+          <p:nvPr>
+            <p:ph type="sldImg"/>
+          </p:nvPr>
+        </p:nvSpPr>
+        <p:spPr/>
+      </p:sp>
+      <p:sp>
+        <p:nvSpPr>
+          <p:cNvPr id="3" name="Notes Placeholder 2"/>
+          <p:cNvSpPr>
+            <a:spLocks noGrp="1"/>
+          </p:cNvSpPr>
+          <p:nvPr>
+            <p:ph type="body" idx="1"/>
+          </p:nvPr>
+        </p:nvSpPr>
+        <p:spPr/>
+        <p:txBody>
+          <a:bodyPr/>
+          <a:lstStyle/>
+          <a:p>
+            <a:pPr marL="0" marR="0" indent="0" algn="l" defTabSz="457200" rtl="0" eaLnBrk="1" fontAlgn="auto" latinLnBrk="0" hangingPunct="1">
+              <a:lnSpc>
+                <a:spcPct val="100000"/>
+              </a:lnSpc>
+              <a:spcBef>
+                <a:spcPts val="0"/>
+              </a:spcBef>
+              <a:spcAft>
+                <a:spcPts val="0"/>
+              </a:spcAft>
+              <a:buClrTx/>
+              <a:buSzTx/>
+              <a:buFontTx/>
+              <a:buNone/>
+              <a:tabLst/>
+              <a:defRPr/>
+            </a:pPr>
+            <a:r>
+              <a:rPr lang="en-US" dirty="0" smtClean="0"/>
+              <a:t>(this is already present in the windows package, on </a:t>
+            </a:r>
+            <a:r>
+              <a:rPr lang="en-US" dirty="0" err="1" smtClean="0"/>
+              <a:t>linux</a:t>
+            </a:r>
+            <a:r>
+              <a:rPr lang="en-US" dirty="0" smtClean="0"/>
+              <a:t> or mac it's the path you used when you started the webserver)</a:t>
+            </a:r>
+          </a:p>
+          <a:p>
+            <a:endParaRPr lang="en-US" dirty="0"/>
+          </a:p>
+        </p:txBody>
+      </p:sp>
+      <p:sp>
+        <p:nvSpPr>
+          <p:cNvPr id="4" name="Slide Number Placeholder 3"/>
+          <p:cNvSpPr>
+            <a:spLocks noGrp="1"/>
+          </p:cNvSpPr>
+          <p:nvPr>
+            <p:ph type="sldNum" sz="quarter" idx="10"/>
+          </p:nvPr>
+        </p:nvSpPr>
+        <p:spPr/>
+        <p:txBody>
+          <a:bodyPr/>
+          <a:lstStyle/>
+          <a:p>
+            <a:fld id="{84A452C3-0BE2-3E46-BBC2-652C991B87BC}" type="slidenum">
+              <a:rPr lang="en-US" smtClean="0"/>
+              <a:t>21</a:t>
+            </a:fld>
+            <a:endParaRPr lang="en-US"/>
+          </a:p>
+        </p:txBody>
+      </p:sp>
+    </p:spTree>
+    <p:extLst>
+      <p:ext uri="{BB962C8B-B14F-4D97-AF65-F5344CB8AC3E}">
+        <p14:creationId xmlns:p14="http://schemas.microsoft.com/office/powerpoint/2010/main" val="3108985399"/>
+      </p:ext>
+    </p:extLst>
+  </p:cSld>
+  <p:clrMapOvr>
+    <a:masterClrMapping/>
+  </p:clrMapOvr>
+</p:notes>
+</file>
+
+<file path=ppt/notesSlides/notesSlide14.xml><?xml version="1.0" encoding="utf-8"?>
+<p:notes xmlns:a="http://schemas.openxmlformats.org/drawingml/2006/main" xmlns:r="http://schemas.openxmlformats.org/officeDocument/2006/relationships" xmlns:p="http://schemas.openxmlformats.org/presentationml/2006/main">
+  <p:cSld>
+    <p:spTree>
+      <p:nvGrpSpPr>
+        <p:cNvPr id="1" name=""/>
+        <p:cNvGrpSpPr/>
+        <p:nvPr/>
+      </p:nvGrpSpPr>
+      <p:grpSpPr>
+        <a:xfrm>
+          <a:off x="0" y="0"/>
+          <a:ext cx="0" cy="0"/>
+          <a:chOff x="0" y="0"/>
+          <a:chExt cx="0" cy="0"/>
+        </a:xfrm>
+      </p:grpSpPr>
+      <p:sp>
+        <p:nvSpPr>
+          <p:cNvPr id="2" name="Slide Image Placeholder 1"/>
+          <p:cNvSpPr>
+            <a:spLocks noGrp="1" noRot="1" noChangeAspect="1"/>
+          </p:cNvSpPr>
+          <p:nvPr>
+            <p:ph type="sldImg"/>
+          </p:nvPr>
+        </p:nvSpPr>
+        <p:spPr/>
+      </p:sp>
+      <p:sp>
+        <p:nvSpPr>
+          <p:cNvPr id="3" name="Notes Placeholder 2"/>
+          <p:cNvSpPr>
+            <a:spLocks noGrp="1"/>
+          </p:cNvSpPr>
+          <p:nvPr>
+            <p:ph type="body" idx="1"/>
+          </p:nvPr>
+        </p:nvSpPr>
+        <p:spPr/>
+        <p:txBody>
+          <a:bodyPr/>
+          <a:lstStyle/>
+          <a:p>
+            <a:r>
+              <a:rPr kumimoji="0" lang="en-US" altLang="en-US" sz="1200" b="0" i="0" u="none" strike="noStrike" cap="none" normalizeH="0" baseline="0" dirty="0" smtClean="0">
+                <a:ln>
+                  <a:noFill/>
+                </a:ln>
+                <a:solidFill>
+                  <a:srgbClr val="3F7F59"/>
+                </a:solidFill>
+                <a:effectLst/>
+                <a:latin typeface="Arial Unicode MS" panose="020B0604020202020204" pitchFamily="34" charset="-128"/>
+              </a:rPr>
+              <a:t>The first item shows assignment</a:t>
+            </a:r>
+            <a:r>
+              <a:rPr kumimoji="0" lang="en-US" altLang="en-US" sz="1200" b="0" i="0" u="none" strike="noStrike" cap="none" normalizeH="0" baseline="0" dirty="0" smtClean="0">
+                <a:ln>
+                  <a:noFill/>
+                </a:ln>
+                <a:solidFill>
+                  <a:srgbClr val="000000"/>
+                </a:solidFill>
+                <a:effectLst/>
+                <a:latin typeface="Arial Unicode MS" panose="020B0604020202020204" pitchFamily="34" charset="-128"/>
+              </a:rPr>
+              <a:t> </a:t>
+            </a:r>
+          </a:p>
+          <a:p>
+            <a:r>
+              <a:rPr kumimoji="0" lang="en-US" altLang="en-US" sz="1200" b="0" i="0" u="none" strike="noStrike" cap="none" normalizeH="0" baseline="0" dirty="0" smtClean="0">
+                <a:ln>
+                  <a:noFill/>
+                </a:ln>
+                <a:solidFill>
+                  <a:srgbClr val="3F7F59"/>
+                </a:solidFill>
+                <a:effectLst/>
+                <a:latin typeface="Arial Unicode MS" panose="020B0604020202020204" pitchFamily="34" charset="-128"/>
+              </a:rPr>
+              <a:t>This is doing something with the variable</a:t>
+            </a:r>
+          </a:p>
+          <a:p>
+            <a:r>
+              <a:rPr kumimoji="0" lang="en-US" altLang="en-US" sz="1200" b="0" i="0" u="none" strike="noStrike" cap="none" normalizeH="0" baseline="0" dirty="0" smtClean="0">
+                <a:ln>
+                  <a:noFill/>
+                </a:ln>
+                <a:solidFill>
+                  <a:srgbClr val="3F7F59"/>
+                </a:solidFill>
+                <a:effectLst/>
+                <a:latin typeface="Arial Unicode MS" panose="020B0604020202020204" pitchFamily="34" charset="-128"/>
+              </a:rPr>
+              <a:t>This will cause a PHP Notice to be show</a:t>
+            </a:r>
+            <a:r>
+              <a:rPr kumimoji="0" lang="en-US" altLang="en-US" sz="1200" b="0" i="0" u="none" strike="noStrike" cap="none" normalizeH="0" baseline="0" dirty="0" smtClean="0">
+                <a:ln>
+                  <a:noFill/>
+                </a:ln>
+                <a:solidFill>
+                  <a:schemeClr val="tx1"/>
+                </a:solidFill>
+                <a:effectLst/>
+                <a:latin typeface="+mn-lt"/>
+              </a:rPr>
+              <a:t>n</a:t>
+            </a:r>
+          </a:p>
+          <a:p>
+            <a:endParaRPr kumimoji="0" lang="en-US" altLang="en-US" sz="1200" b="0" i="0" u="none" strike="noStrike" cap="none" normalizeH="0" baseline="0" dirty="0" smtClean="0">
+              <a:ln>
+                <a:noFill/>
+              </a:ln>
+              <a:solidFill>
+                <a:schemeClr val="tx1"/>
+              </a:solidFill>
+              <a:effectLst/>
+              <a:latin typeface="+mn-lt"/>
+            </a:endParaRPr>
+          </a:p>
+          <a:p>
+            <a:r>
+              <a:rPr kumimoji="0" lang="en-US" altLang="en-US" sz="1200" b="0" i="0" u="none" strike="noStrike" cap="none" normalizeH="0" baseline="0" dirty="0" smtClean="0">
+                <a:ln>
+                  <a:noFill/>
+                </a:ln>
+                <a:solidFill>
+                  <a:schemeClr val="tx1"/>
+                </a:solidFill>
+                <a:effectLst/>
+                <a:latin typeface="+mn-lt"/>
+              </a:rPr>
+              <a:t>by default it is given a null value</a:t>
+            </a:r>
+          </a:p>
+          <a:p>
+            <a:endParaRPr kumimoji="0" lang="en-US" altLang="en-US" sz="1200" b="0" i="0" u="none" strike="noStrike" cap="none" normalizeH="0" baseline="0" dirty="0" smtClean="0">
+              <a:ln>
+                <a:noFill/>
+              </a:ln>
+              <a:solidFill>
+                <a:schemeClr val="tx1"/>
+              </a:solidFill>
+              <a:effectLst/>
+              <a:latin typeface="+mn-lt"/>
+            </a:endParaRPr>
+          </a:p>
+          <a:p>
+            <a:r>
+              <a:rPr kumimoji="0" lang="en-US" altLang="en-US" sz="1200" b="0" i="0" u="none" strike="noStrike" cap="none" normalizeH="0" baseline="0" dirty="0" smtClean="0">
+                <a:ln>
+                  <a:noFill/>
+                </a:ln>
+                <a:solidFill>
+                  <a:schemeClr val="tx1"/>
+                </a:solidFill>
+                <a:effectLst/>
+                <a:latin typeface="+mn-lt"/>
+              </a:rPr>
+              <a:t>Output:</a:t>
+            </a:r>
+          </a:p>
+          <a:p>
+            <a:r>
+              <a:rPr lang="en-US" dirty="0" smtClean="0"/>
+              <a:t>1</a:t>
+            </a:r>
+          </a:p>
+          <a:p>
+            <a:r>
+              <a:rPr lang="en-US" dirty="0" smtClean="0"/>
+              <a:t>Notice: Undefined variable: missing in {filename} on line 7</a:t>
+            </a:r>
+            <a:endParaRPr kumimoji="0" lang="en-US" altLang="en-US" sz="1200" b="0" i="0" u="none" strike="noStrike" cap="none" normalizeH="0" baseline="0" dirty="0" smtClean="0">
+              <a:ln>
+                <a:noFill/>
+              </a:ln>
+              <a:solidFill>
+                <a:schemeClr val="tx1"/>
+              </a:solidFill>
+              <a:effectLst/>
+              <a:latin typeface="Arial" panose="020B0604020202020204" pitchFamily="34" charset="0"/>
+            </a:endParaRPr>
+          </a:p>
+        </p:txBody>
+      </p:sp>
+      <p:sp>
+        <p:nvSpPr>
+          <p:cNvPr id="4" name="Slide Number Placeholder 3"/>
+          <p:cNvSpPr>
+            <a:spLocks noGrp="1"/>
+          </p:cNvSpPr>
+          <p:nvPr>
+            <p:ph type="sldNum" sz="quarter" idx="10"/>
+          </p:nvPr>
+        </p:nvSpPr>
+        <p:spPr/>
+        <p:txBody>
+          <a:bodyPr/>
+          <a:lstStyle/>
+          <a:p>
+            <a:fld id="{E51715A9-EB64-4481-89E4-A64020E86A42}" type="slidenum">
+              <a:rPr lang="en-US" smtClean="0"/>
+              <a:t>22</a:t>
+            </a:fld>
+            <a:endParaRPr lang="en-US"/>
+          </a:p>
+        </p:txBody>
+      </p:sp>
+    </p:spTree>
+    <p:extLst>
+      <p:ext uri="{BB962C8B-B14F-4D97-AF65-F5344CB8AC3E}">
+        <p14:creationId xmlns:p14="http://schemas.microsoft.com/office/powerpoint/2010/main" val="84181288"/>
+      </p:ext>
+    </p:extLst>
+  </p:cSld>
+  <p:clrMapOvr>
+    <a:masterClrMapping/>
+  </p:clrMapOvr>
+</p:notes>
+</file>
+
+<file path=ppt/notesSlides/notesSlide15.xml><?xml version="1.0" encoding="utf-8"?>
+<p:notes xmlns:a="http://schemas.openxmlformats.org/drawingml/2006/main" xmlns:r="http://schemas.openxmlformats.org/officeDocument/2006/relationships" xmlns:p="http://schemas.openxmlformats.org/presentationml/2006/main">
+  <p:cSld>
+    <p:spTree>
+      <p:nvGrpSpPr>
+        <p:cNvPr id="1" name=""/>
+        <p:cNvGrpSpPr/>
+        <p:nvPr/>
+      </p:nvGrpSpPr>
+      <p:grpSpPr>
+        <a:xfrm>
+          <a:off x="0" y="0"/>
+          <a:ext cx="0" cy="0"/>
+          <a:chOff x="0" y="0"/>
+          <a:chExt cx="0" cy="0"/>
+        </a:xfrm>
+      </p:grpSpPr>
+      <p:sp>
+        <p:nvSpPr>
+          <p:cNvPr id="2" name="Slide Image Placeholder 1"/>
+          <p:cNvSpPr>
+            <a:spLocks noGrp="1" noRot="1" noChangeAspect="1"/>
+          </p:cNvSpPr>
+          <p:nvPr>
+            <p:ph type="sldImg"/>
+          </p:nvPr>
+        </p:nvSpPr>
+        <p:spPr/>
+      </p:sp>
+      <p:sp>
+        <p:nvSpPr>
+          <p:cNvPr id="3" name="Notes Placeholder 2"/>
+          <p:cNvSpPr>
+            <a:spLocks noGrp="1"/>
+          </p:cNvSpPr>
+          <p:nvPr>
+            <p:ph type="body" idx="1"/>
+          </p:nvPr>
+        </p:nvSpPr>
+        <p:spPr/>
+        <p:txBody>
+          <a:bodyPr/>
+          <a:lstStyle/>
+          <a:p>
+            <a:endParaRPr lang="en-US" dirty="0"/>
+          </a:p>
+        </p:txBody>
+      </p:sp>
+      <p:sp>
+        <p:nvSpPr>
+          <p:cNvPr id="4" name="Slide Number Placeholder 3"/>
+          <p:cNvSpPr>
+            <a:spLocks noGrp="1"/>
+          </p:cNvSpPr>
+          <p:nvPr>
+            <p:ph type="sldNum" sz="quarter" idx="10"/>
+          </p:nvPr>
+        </p:nvSpPr>
+        <p:spPr/>
+        <p:txBody>
+          <a:bodyPr/>
+          <a:lstStyle/>
+          <a:p>
+            <a:fld id="{84A452C3-0BE2-3E46-BBC2-652C991B87BC}" type="slidenum">
+              <a:rPr lang="en-US" smtClean="0"/>
+              <a:t>23</a:t>
+            </a:fld>
+            <a:endParaRPr lang="en-US"/>
+          </a:p>
+        </p:txBody>
+      </p:sp>
+    </p:spTree>
+    <p:extLst>
+      <p:ext uri="{BB962C8B-B14F-4D97-AF65-F5344CB8AC3E}">
+        <p14:creationId xmlns:p14="http://schemas.microsoft.com/office/powerpoint/2010/main" val="1259845975"/>
+      </p:ext>
+    </p:extLst>
+  </p:cSld>
+  <p:clrMapOvr>
+    <a:masterClrMapping/>
+  </p:clrMapOvr>
+</p:notes>
+</file>
+
+<file path=ppt/notesSlides/notesSlide16.xml><?xml version="1.0" encoding="utf-8"?>
+<p:notes xmlns:a="http://schemas.openxmlformats.org/drawingml/2006/main" xmlns:r="http://schemas.openxmlformats.org/officeDocument/2006/relationships" xmlns:p="http://schemas.openxmlformats.org/presentationml/2006/main">
+  <p:cSld>
+    <p:spTree>
+      <p:nvGrpSpPr>
+        <p:cNvPr id="1" name=""/>
+        <p:cNvGrpSpPr/>
+        <p:nvPr/>
+      </p:nvGrpSpPr>
+      <p:grpSpPr>
+        <a:xfrm>
+          <a:off x="0" y="0"/>
+          <a:ext cx="0" cy="0"/>
+          <a:chOff x="0" y="0"/>
+          <a:chExt cx="0" cy="0"/>
+        </a:xfrm>
+      </p:grpSpPr>
+      <p:sp>
+        <p:nvSpPr>
+          <p:cNvPr id="2" name="Slide Image Placeholder 1"/>
+          <p:cNvSpPr>
+            <a:spLocks noGrp="1" noRot="1" noChangeAspect="1"/>
+          </p:cNvSpPr>
+          <p:nvPr>
+            <p:ph type="sldImg"/>
+          </p:nvPr>
+        </p:nvSpPr>
+        <p:spPr/>
+      </p:sp>
+      <p:sp>
+        <p:nvSpPr>
+          <p:cNvPr id="3" name="Notes Placeholder 2"/>
+          <p:cNvSpPr>
+            <a:spLocks noGrp="1"/>
+          </p:cNvSpPr>
+          <p:nvPr>
+            <p:ph type="body" idx="1"/>
+          </p:nvPr>
+        </p:nvSpPr>
+        <p:spPr/>
+        <p:txBody>
+          <a:bodyPr/>
+          <a:lstStyle/>
+          <a:p>
+            <a:r>
+              <a:rPr kumimoji="0" lang="en-US" altLang="en-US" sz="1200" b="0" i="0" u="none" strike="noStrike" cap="none" normalizeH="0" baseline="0" dirty="0" smtClean="0">
+                <a:ln>
+                  <a:noFill/>
+                </a:ln>
+                <a:solidFill>
+                  <a:schemeClr val="tx1"/>
+                </a:solidFill>
+                <a:effectLst/>
+                <a:latin typeface="Arial" panose="020B0604020202020204" pitchFamily="34" charset="0"/>
+              </a:rPr>
+              <a:t>This is a very </a:t>
+            </a:r>
+            <a:r>
+              <a:rPr kumimoji="0" lang="en-US" altLang="en-US" sz="1200" b="0" i="0" u="none" strike="noStrike" cap="none" normalizeH="0" baseline="0" dirty="0" err="1" smtClean="0">
+                <a:ln>
+                  <a:noFill/>
+                </a:ln>
+                <a:solidFill>
+                  <a:schemeClr val="tx1"/>
+                </a:solidFill>
+                <a:effectLst/>
+                <a:latin typeface="Arial" panose="020B0604020202020204" pitchFamily="34" charset="0"/>
+              </a:rPr>
+              <a:t>very</a:t>
+            </a:r>
+            <a:r>
+              <a:rPr kumimoji="0" lang="en-US" altLang="en-US" sz="1200" b="0" i="0" u="none" strike="noStrike" cap="none" normalizeH="0" baseline="0" dirty="0" smtClean="0">
+                <a:ln>
+                  <a:noFill/>
+                </a:ln>
+                <a:solidFill>
+                  <a:schemeClr val="tx1"/>
+                </a:solidFill>
+                <a:effectLst/>
+                <a:latin typeface="Arial" panose="020B0604020202020204" pitchFamily="34" charset="0"/>
+              </a:rPr>
+              <a:t> simple test to make sure </a:t>
+            </a:r>
+            <a:r>
+              <a:rPr kumimoji="0" lang="en-US" altLang="en-US" sz="1200" b="0" i="0" u="none" strike="noStrike" cap="none" normalizeH="0" baseline="0" dirty="0" err="1" smtClean="0">
+                <a:ln>
+                  <a:noFill/>
+                </a:ln>
+                <a:solidFill>
+                  <a:schemeClr val="tx1"/>
+                </a:solidFill>
+                <a:effectLst/>
+                <a:latin typeface="Arial" panose="020B0604020202020204" pitchFamily="34" charset="0"/>
+              </a:rPr>
+              <a:t>php</a:t>
+            </a:r>
+            <a:r>
+              <a:rPr kumimoji="0" lang="en-US" altLang="en-US" sz="1200" b="0" i="0" u="none" strike="noStrike" cap="none" normalizeH="0" baseline="0" dirty="0" smtClean="0">
+                <a:ln>
+                  <a:noFill/>
+                </a:ln>
+                <a:solidFill>
+                  <a:schemeClr val="tx1"/>
+                </a:solidFill>
+                <a:effectLst/>
+                <a:latin typeface="Arial" panose="020B0604020202020204" pitchFamily="34" charset="0"/>
+              </a:rPr>
+              <a:t> is working</a:t>
+            </a:r>
+            <a:endParaRPr kumimoji="0" lang="en-US" altLang="en-US" sz="1200" b="0" i="0" u="none" strike="noStrike" cap="none" normalizeH="0" baseline="0" dirty="0" smtClean="0">
+              <a:ln>
+                <a:noFill/>
+              </a:ln>
+              <a:solidFill>
+                <a:schemeClr val="tx1"/>
+              </a:solidFill>
+              <a:effectLst/>
+              <a:latin typeface="Arial" panose="020B0604020202020204" pitchFamily="34" charset="0"/>
+            </a:endParaRPr>
+          </a:p>
+        </p:txBody>
+      </p:sp>
+      <p:sp>
+        <p:nvSpPr>
+          <p:cNvPr id="4" name="Slide Number Placeholder 3"/>
+          <p:cNvSpPr>
+            <a:spLocks noGrp="1"/>
+          </p:cNvSpPr>
+          <p:nvPr>
+            <p:ph type="sldNum" sz="quarter" idx="10"/>
+          </p:nvPr>
+        </p:nvSpPr>
+        <p:spPr/>
+        <p:txBody>
+          <a:bodyPr/>
+          <a:lstStyle/>
+          <a:p>
+            <a:fld id="{E51715A9-EB64-4481-89E4-A64020E86A42}" type="slidenum">
+              <a:rPr lang="en-US" smtClean="0"/>
+              <a:t>24</a:t>
+            </a:fld>
+            <a:endParaRPr lang="en-US"/>
+          </a:p>
+        </p:txBody>
+      </p:sp>
+    </p:spTree>
+    <p:extLst>
+      <p:ext uri="{BB962C8B-B14F-4D97-AF65-F5344CB8AC3E}">
+        <p14:creationId xmlns:p14="http://schemas.microsoft.com/office/powerpoint/2010/main" val="103967450"/>
+      </p:ext>
+    </p:extLst>
+  </p:cSld>
+  <p:clrMapOvr>
+    <a:masterClrMapping/>
+  </p:clrMapOvr>
+</p:notes>
+</file>
+
 <file path=ppt/notesSlides/notesSlide2.xml><?xml version="1.0" encoding="utf-8"?>
 <p:notes xmlns:a="http://schemas.openxmlformats.org/drawingml/2006/main" xmlns:r="http://schemas.openxmlformats.org/officeDocument/2006/relationships" xmlns:p="http://schemas.openxmlformats.org/presentationml/2006/main">
   <p:cSld>
@@ -642,7 +1525,7 @@
           <a:p>
             <a:fld id="{84A452C3-0BE2-3E46-BBC2-652C991B87BC}" type="slidenum">
               <a:rPr lang="en-US" smtClean="0"/>
-              <a:t>2</a:t>
+              <a:t>5</a:t>
             </a:fld>
             <a:endParaRPr lang="en-US"/>
           </a:p>
@@ -726,7 +1609,7 @@
           <a:p>
             <a:fld id="{84A452C3-0BE2-3E46-BBC2-652C991B87BC}" type="slidenum">
               <a:rPr lang="en-US" smtClean="0"/>
-              <a:t>3</a:t>
+              <a:t>6</a:t>
             </a:fld>
             <a:endParaRPr lang="en-US"/>
           </a:p>
@@ -735,7 +1618,7 @@
     </p:spTree>
     <p:extLst>
       <p:ext uri="{BB962C8B-B14F-4D97-AF65-F5344CB8AC3E}">
-        <p14:creationId xmlns:p14="http://schemas.microsoft.com/office/powerpoint/2010/main" val="2137996786"/>
+        <p14:creationId xmlns:p14="http://schemas.microsoft.com/office/powerpoint/2010/main" val="3459451342"/>
       </p:ext>
     </p:extLst>
   </p:cSld>
@@ -789,10 +1672,6 @@
           <a:bodyPr/>
           <a:lstStyle/>
           <a:p>
-            <a:r>
-              <a:rPr lang="en-US" dirty="0" smtClean="0"/>
-              <a:t>Needs nothing installed – download, unzip, and run</a:t>
-            </a:r>
             <a:endParaRPr lang="en-US" dirty="0"/>
           </a:p>
         </p:txBody>
@@ -814,7 +1693,7 @@
           <a:p>
             <a:fld id="{84A452C3-0BE2-3E46-BBC2-652C991B87BC}" type="slidenum">
               <a:rPr lang="en-US" smtClean="0"/>
-              <a:t>4</a:t>
+              <a:t>7</a:t>
             </a:fld>
             <a:endParaRPr lang="en-US"/>
           </a:p>
@@ -823,7 +1702,7 @@
     </p:spTree>
     <p:extLst>
       <p:ext uri="{BB962C8B-B14F-4D97-AF65-F5344CB8AC3E}">
-        <p14:creationId xmlns:p14="http://schemas.microsoft.com/office/powerpoint/2010/main" val="1122006803"/>
+        <p14:creationId xmlns:p14="http://schemas.microsoft.com/office/powerpoint/2010/main" val="2137996786"/>
       </p:ext>
     </p:extLst>
   </p:cSld>
@@ -877,6 +1756,10 @@
           <a:bodyPr/>
           <a:lstStyle/>
           <a:p>
+            <a:r>
+              <a:rPr lang="en-US" dirty="0" smtClean="0"/>
+              <a:t>Needs nothing installed – download, unzip, and run</a:t>
+            </a:r>
             <a:endParaRPr lang="en-US" dirty="0"/>
           </a:p>
         </p:txBody>
@@ -898,7 +1781,7 @@
           <a:p>
             <a:fld id="{84A452C3-0BE2-3E46-BBC2-652C991B87BC}" type="slidenum">
               <a:rPr lang="en-US" smtClean="0"/>
-              <a:t>6</a:t>
+              <a:t>8</a:t>
             </a:fld>
             <a:endParaRPr lang="en-US"/>
           </a:p>
@@ -907,7 +1790,7 @@
     </p:spTree>
     <p:extLst>
       <p:ext uri="{BB962C8B-B14F-4D97-AF65-F5344CB8AC3E}">
-        <p14:creationId xmlns:p14="http://schemas.microsoft.com/office/powerpoint/2010/main" val="4222441541"/>
+        <p14:creationId xmlns:p14="http://schemas.microsoft.com/office/powerpoint/2010/main" val="1122006803"/>
       </p:ext>
     </p:extLst>
   </p:cSld>
@@ -961,25 +1844,6 @@
           <a:bodyPr/>
           <a:lstStyle/>
           <a:p>
-            <a:r>
-              <a:rPr lang="en-US" dirty="0" smtClean="0"/>
-              <a:t>Although</a:t>
-            </a:r>
-            <a:r>
-              <a:rPr lang="en-US" baseline="0" dirty="0" smtClean="0"/>
-              <a:t> we will be using komodo edit in examples any text editor you already use should be fine if it has syntax highlighting for </a:t>
-            </a:r>
-            <a:r>
-              <a:rPr lang="en-US" baseline="0" dirty="0" err="1" smtClean="0"/>
-              <a:t>php</a:t>
-            </a:r>
-            <a:endParaRPr lang="en-US" baseline="0" dirty="0" smtClean="0"/>
-          </a:p>
-          <a:p>
-            <a:r>
-              <a:rPr lang="en-US" baseline="0" dirty="0" smtClean="0"/>
-              <a:t>this includes vim</a:t>
-            </a:r>
             <a:endParaRPr lang="en-US" dirty="0"/>
           </a:p>
         </p:txBody>
@@ -1001,7 +1865,7 @@
           <a:p>
             <a:fld id="{84A452C3-0BE2-3E46-BBC2-652C991B87BC}" type="slidenum">
               <a:rPr lang="en-US" smtClean="0"/>
-              <a:t>7</a:t>
+              <a:t>9</a:t>
             </a:fld>
             <a:endParaRPr lang="en-US"/>
           </a:p>
@@ -1010,7 +1874,7 @@
     </p:spTree>
     <p:extLst>
       <p:ext uri="{BB962C8B-B14F-4D97-AF65-F5344CB8AC3E}">
-        <p14:creationId xmlns:p14="http://schemas.microsoft.com/office/powerpoint/2010/main" val="2170865128"/>
+        <p14:creationId xmlns:p14="http://schemas.microsoft.com/office/powerpoint/2010/main" val="2127644208"/>
       </p:ext>
     </p:extLst>
   </p:cSld>
@@ -1085,7 +1949,7 @@
           <a:p>
             <a:fld id="{84A452C3-0BE2-3E46-BBC2-652C991B87BC}" type="slidenum">
               <a:rPr lang="en-US" smtClean="0"/>
-              <a:t>8</a:t>
+              <a:t>13</a:t>
             </a:fld>
             <a:endParaRPr lang="en-US"/>
           </a:p>
@@ -1094,7 +1958,175 @@
     </p:spTree>
     <p:extLst>
       <p:ext uri="{BB962C8B-B14F-4D97-AF65-F5344CB8AC3E}">
-        <p14:creationId xmlns:p14="http://schemas.microsoft.com/office/powerpoint/2010/main" val="2541437675"/>
+        <p14:creationId xmlns:p14="http://schemas.microsoft.com/office/powerpoint/2010/main" val="1152324146"/>
+      </p:ext>
+    </p:extLst>
+  </p:cSld>
+  <p:clrMapOvr>
+    <a:masterClrMapping/>
+  </p:clrMapOvr>
+</p:notes>
+</file>
+
+<file path=ppt/notesSlides/notesSlide8.xml><?xml version="1.0" encoding="utf-8"?>
+<p:notes xmlns:a="http://schemas.openxmlformats.org/drawingml/2006/main" xmlns:r="http://schemas.openxmlformats.org/officeDocument/2006/relationships" xmlns:p="http://schemas.openxmlformats.org/presentationml/2006/main">
+  <p:cSld>
+    <p:spTree>
+      <p:nvGrpSpPr>
+        <p:cNvPr id="1" name=""/>
+        <p:cNvGrpSpPr/>
+        <p:nvPr/>
+      </p:nvGrpSpPr>
+      <p:grpSpPr>
+        <a:xfrm>
+          <a:off x="0" y="0"/>
+          <a:ext cx="0" cy="0"/>
+          <a:chOff x="0" y="0"/>
+          <a:chExt cx="0" cy="0"/>
+        </a:xfrm>
+      </p:grpSpPr>
+      <p:sp>
+        <p:nvSpPr>
+          <p:cNvPr id="2" name="Slide Image Placeholder 1"/>
+          <p:cNvSpPr>
+            <a:spLocks noGrp="1" noRot="1" noChangeAspect="1"/>
+          </p:cNvSpPr>
+          <p:nvPr>
+            <p:ph type="sldImg"/>
+          </p:nvPr>
+        </p:nvSpPr>
+        <p:spPr/>
+      </p:sp>
+      <p:sp>
+        <p:nvSpPr>
+          <p:cNvPr id="3" name="Notes Placeholder 2"/>
+          <p:cNvSpPr>
+            <a:spLocks noGrp="1"/>
+          </p:cNvSpPr>
+          <p:nvPr>
+            <p:ph type="body" idx="1"/>
+          </p:nvPr>
+        </p:nvSpPr>
+        <p:spPr/>
+        <p:txBody>
+          <a:bodyPr/>
+          <a:lstStyle/>
+          <a:p>
+            <a:endParaRPr lang="en-US" dirty="0"/>
+          </a:p>
+        </p:txBody>
+      </p:sp>
+      <p:sp>
+        <p:nvSpPr>
+          <p:cNvPr id="4" name="Slide Number Placeholder 3"/>
+          <p:cNvSpPr>
+            <a:spLocks noGrp="1"/>
+          </p:cNvSpPr>
+          <p:nvPr>
+            <p:ph type="sldNum" sz="quarter" idx="10"/>
+          </p:nvPr>
+        </p:nvSpPr>
+        <p:spPr/>
+        <p:txBody>
+          <a:bodyPr/>
+          <a:lstStyle/>
+          <a:p>
+            <a:fld id="{84A452C3-0BE2-3E46-BBC2-652C991B87BC}" type="slidenum">
+              <a:rPr lang="en-US" smtClean="0"/>
+              <a:t>16</a:t>
+            </a:fld>
+            <a:endParaRPr lang="en-US"/>
+          </a:p>
+        </p:txBody>
+      </p:sp>
+    </p:spTree>
+    <p:extLst>
+      <p:ext uri="{BB962C8B-B14F-4D97-AF65-F5344CB8AC3E}">
+        <p14:creationId xmlns:p14="http://schemas.microsoft.com/office/powerpoint/2010/main" val="1690993758"/>
+      </p:ext>
+    </p:extLst>
+  </p:cSld>
+  <p:clrMapOvr>
+    <a:masterClrMapping/>
+  </p:clrMapOvr>
+</p:notes>
+</file>
+
+<file path=ppt/notesSlides/notesSlide9.xml><?xml version="1.0" encoding="utf-8"?>
+<p:notes xmlns:a="http://schemas.openxmlformats.org/drawingml/2006/main" xmlns:r="http://schemas.openxmlformats.org/officeDocument/2006/relationships" xmlns:p="http://schemas.openxmlformats.org/presentationml/2006/main">
+  <p:cSld>
+    <p:spTree>
+      <p:nvGrpSpPr>
+        <p:cNvPr id="1" name=""/>
+        <p:cNvGrpSpPr/>
+        <p:nvPr/>
+      </p:nvGrpSpPr>
+      <p:grpSpPr>
+        <a:xfrm>
+          <a:off x="0" y="0"/>
+          <a:ext cx="0" cy="0"/>
+          <a:chOff x="0" y="0"/>
+          <a:chExt cx="0" cy="0"/>
+        </a:xfrm>
+      </p:grpSpPr>
+      <p:sp>
+        <p:nvSpPr>
+          <p:cNvPr id="2" name="Slide Image Placeholder 1"/>
+          <p:cNvSpPr>
+            <a:spLocks noGrp="1" noRot="1" noChangeAspect="1"/>
+          </p:cNvSpPr>
+          <p:nvPr>
+            <p:ph type="sldImg"/>
+          </p:nvPr>
+        </p:nvSpPr>
+        <p:spPr/>
+      </p:sp>
+      <p:sp>
+        <p:nvSpPr>
+          <p:cNvPr id="3" name="Notes Placeholder 2"/>
+          <p:cNvSpPr>
+            <a:spLocks noGrp="1"/>
+          </p:cNvSpPr>
+          <p:nvPr>
+            <p:ph type="body" idx="1"/>
+          </p:nvPr>
+        </p:nvSpPr>
+        <p:spPr/>
+        <p:txBody>
+          <a:bodyPr/>
+          <a:lstStyle/>
+          <a:p>
+            <a:endParaRPr lang="en-US" dirty="0"/>
+          </a:p>
+        </p:txBody>
+      </p:sp>
+      <p:sp>
+        <p:nvSpPr>
+          <p:cNvPr id="4" name="Slide Number Placeholder 3"/>
+          <p:cNvSpPr>
+            <a:spLocks noGrp="1"/>
+          </p:cNvSpPr>
+          <p:nvPr>
+            <p:ph type="sldNum" sz="quarter" idx="10"/>
+          </p:nvPr>
+        </p:nvSpPr>
+        <p:spPr/>
+        <p:txBody>
+          <a:bodyPr/>
+          <a:lstStyle/>
+          <a:p>
+            <a:fld id="{84A452C3-0BE2-3E46-BBC2-652C991B87BC}" type="slidenum">
+              <a:rPr lang="en-US" smtClean="0"/>
+              <a:t>17</a:t>
+            </a:fld>
+            <a:endParaRPr lang="en-US"/>
+          </a:p>
+        </p:txBody>
+      </p:sp>
+    </p:spTree>
+    <p:extLst>
+      <p:ext uri="{BB962C8B-B14F-4D97-AF65-F5344CB8AC3E}">
+        <p14:creationId xmlns:p14="http://schemas.microsoft.com/office/powerpoint/2010/main" val="2022242866"/>
       </p:ext>
     </p:extLst>
   </p:cSld>
@@ -1285,7 +2317,7 @@
           <a:p>
             <a:fld id="{ABB552BE-1EA2-CA46-B5AB-EBCC0D015347}" type="datetimeFigureOut">
               <a:rPr lang="en-US" smtClean="0"/>
-              <a:t>3/28/15</a:t>
+              <a:t>3/28/2015</a:t>
             </a:fld>
             <a:endParaRPr lang="en-US"/>
           </a:p>
@@ -1455,7 +2487,7 @@
           <a:p>
             <a:fld id="{ABB552BE-1EA2-CA46-B5AB-EBCC0D015347}" type="datetimeFigureOut">
               <a:rPr lang="en-US" smtClean="0"/>
-              <a:t>3/28/15</a:t>
+              <a:t>3/28/2015</a:t>
             </a:fld>
             <a:endParaRPr lang="en-US"/>
           </a:p>
@@ -1635,7 +2667,7 @@
           <a:p>
             <a:fld id="{ABB552BE-1EA2-CA46-B5AB-EBCC0D015347}" type="datetimeFigureOut">
               <a:rPr lang="en-US" smtClean="0"/>
-              <a:t>3/28/15</a:t>
+              <a:t>3/28/2015</a:t>
             </a:fld>
             <a:endParaRPr lang="en-US"/>
           </a:p>
@@ -1805,7 +2837,7 @@
           <a:p>
             <a:fld id="{ABB552BE-1EA2-CA46-B5AB-EBCC0D015347}" type="datetimeFigureOut">
               <a:rPr lang="en-US" smtClean="0"/>
-              <a:t>3/28/15</a:t>
+              <a:t>3/28/2015</a:t>
             </a:fld>
             <a:endParaRPr lang="en-US"/>
           </a:p>
@@ -2051,7 +3083,7 @@
           <a:p>
             <a:fld id="{ABB552BE-1EA2-CA46-B5AB-EBCC0D015347}" type="datetimeFigureOut">
               <a:rPr lang="en-US" smtClean="0"/>
-              <a:t>3/28/15</a:t>
+              <a:t>3/28/2015</a:t>
             </a:fld>
             <a:endParaRPr lang="en-US"/>
           </a:p>
@@ -2339,7 +3371,7 @@
           <a:p>
             <a:fld id="{ABB552BE-1EA2-CA46-B5AB-EBCC0D015347}" type="datetimeFigureOut">
               <a:rPr lang="en-US" smtClean="0"/>
-              <a:t>3/28/15</a:t>
+              <a:t>3/28/2015</a:t>
             </a:fld>
             <a:endParaRPr lang="en-US"/>
           </a:p>
@@ -2761,7 +3793,7 @@
           <a:p>
             <a:fld id="{ABB552BE-1EA2-CA46-B5AB-EBCC0D015347}" type="datetimeFigureOut">
               <a:rPr lang="en-US" smtClean="0"/>
-              <a:t>3/28/15</a:t>
+              <a:t>3/28/2015</a:t>
             </a:fld>
             <a:endParaRPr lang="en-US"/>
           </a:p>
@@ -2879,7 +3911,7 @@
           <a:p>
             <a:fld id="{ABB552BE-1EA2-CA46-B5AB-EBCC0D015347}" type="datetimeFigureOut">
               <a:rPr lang="en-US" smtClean="0"/>
-              <a:t>3/28/15</a:t>
+              <a:t>3/28/2015</a:t>
             </a:fld>
             <a:endParaRPr lang="en-US"/>
           </a:p>
@@ -2974,7 +4006,7 @@
           <a:p>
             <a:fld id="{ABB552BE-1EA2-CA46-B5AB-EBCC0D015347}" type="datetimeFigureOut">
               <a:rPr lang="en-US" smtClean="0"/>
-              <a:t>3/28/15</a:t>
+              <a:t>3/28/2015</a:t>
             </a:fld>
             <a:endParaRPr lang="en-US"/>
           </a:p>
@@ -3251,7 +4283,7 @@
           <a:p>
             <a:fld id="{ABB552BE-1EA2-CA46-B5AB-EBCC0D015347}" type="datetimeFigureOut">
               <a:rPr lang="en-US" smtClean="0"/>
-              <a:t>3/28/15</a:t>
+              <a:t>3/28/2015</a:t>
             </a:fld>
             <a:endParaRPr lang="en-US"/>
           </a:p>
@@ -3504,7 +4536,7 @@
           <a:p>
             <a:fld id="{ABB552BE-1EA2-CA46-B5AB-EBCC0D015347}" type="datetimeFigureOut">
               <a:rPr lang="en-US" smtClean="0"/>
-              <a:t>3/28/15</a:t>
+              <a:t>3/28/2015</a:t>
             </a:fld>
             <a:endParaRPr lang="en-US"/>
           </a:p>
@@ -3717,7 +4749,7 @@
           <a:p>
             <a:fld id="{ABB552BE-1EA2-CA46-B5AB-EBCC0D015347}" type="datetimeFigureOut">
               <a:rPr lang="en-US" smtClean="0"/>
-              <a:t>3/28/15</a:t>
+              <a:t>3/28/2015</a:t>
             </a:fld>
             <a:endParaRPr lang="en-US"/>
           </a:p>
@@ -4148,10 +5180,2546 @@
   <p:clrMapOvr>
     <a:masterClrMapping/>
   </p:clrMapOvr>
+  <p:timing>
+    <p:tnLst>
+      <p:par>
+        <p:cTn id="1" dur="indefinite" restart="never" nodeType="tmRoot"/>
+      </p:par>
+    </p:tnLst>
+  </p:timing>
+</p:sld>
+</file>
+
+<file path=ppt/slides/slide10.xml><?xml version="1.0" encoding="utf-8"?>
+<p:sld xmlns:a="http://schemas.openxmlformats.org/drawingml/2006/main" xmlns:r="http://schemas.openxmlformats.org/officeDocument/2006/relationships" xmlns:p="http://schemas.openxmlformats.org/presentationml/2006/main">
+  <p:cSld>
+    <p:spTree>
+      <p:nvGrpSpPr>
+        <p:cNvPr id="1" name=""/>
+        <p:cNvGrpSpPr/>
+        <p:nvPr/>
+      </p:nvGrpSpPr>
+      <p:grpSpPr>
+        <a:xfrm>
+          <a:off x="0" y="0"/>
+          <a:ext cx="0" cy="0"/>
+          <a:chOff x="0" y="0"/>
+          <a:chExt cx="0" cy="0"/>
+        </a:xfrm>
+      </p:grpSpPr>
+      <p:sp>
+        <p:nvSpPr>
+          <p:cNvPr id="2" name="Title 1"/>
+          <p:cNvSpPr>
+            <a:spLocks noGrp="1"/>
+          </p:cNvSpPr>
+          <p:nvPr>
+            <p:ph type="title"/>
+          </p:nvPr>
+        </p:nvSpPr>
+        <p:spPr/>
+        <p:txBody>
+          <a:bodyPr/>
+          <a:lstStyle/>
+          <a:p>
+            <a:r>
+              <a:rPr lang="en-US" dirty="0" smtClean="0"/>
+              <a:t>Installing by Hand</a:t>
+            </a:r>
+            <a:endParaRPr lang="en-US" dirty="0"/>
+          </a:p>
+        </p:txBody>
+      </p:sp>
+      <p:sp>
+        <p:nvSpPr>
+          <p:cNvPr id="3" name="Content Placeholder 2"/>
+          <p:cNvSpPr>
+            <a:spLocks noGrp="1"/>
+          </p:cNvSpPr>
+          <p:nvPr>
+            <p:ph idx="1"/>
+          </p:nvPr>
+        </p:nvSpPr>
+        <p:spPr/>
+        <p:txBody>
+          <a:bodyPr/>
+          <a:lstStyle/>
+          <a:p>
+            <a:r>
+              <a:rPr lang="en-US" dirty="0" smtClean="0"/>
+              <a:t>The editing and </a:t>
+            </a:r>
+            <a:r>
+              <a:rPr lang="en-US" dirty="0" err="1" smtClean="0"/>
+              <a:t>sql</a:t>
+            </a:r>
+            <a:r>
+              <a:rPr lang="en-US" dirty="0" smtClean="0"/>
+              <a:t> tools will be part of your system, not portable apps</a:t>
+            </a:r>
+          </a:p>
+          <a:p>
+            <a:r>
+              <a:rPr lang="en-US" dirty="0" smtClean="0"/>
+              <a:t>PHP will be wherever you put it</a:t>
+            </a:r>
+          </a:p>
+          <a:p>
+            <a:r>
+              <a:rPr lang="en-US" dirty="0" smtClean="0"/>
+              <a:t>You can still use the run.bat file if you would like to avoid doing command line stuff</a:t>
+            </a:r>
+            <a:endParaRPr lang="en-US" dirty="0"/>
+          </a:p>
+        </p:txBody>
+      </p:sp>
+    </p:spTree>
+    <p:extLst>
+      <p:ext uri="{BB962C8B-B14F-4D97-AF65-F5344CB8AC3E}">
+        <p14:creationId xmlns:p14="http://schemas.microsoft.com/office/powerpoint/2010/main" val="3321136829"/>
+      </p:ext>
+    </p:extLst>
+  </p:cSld>
+  <p:clrMapOvr>
+    <a:masterClrMapping/>
+  </p:clrMapOvr>
+  <p:timing>
+    <p:tnLst>
+      <p:par>
+        <p:cTn id="1" dur="indefinite" restart="never" nodeType="tmRoot"/>
+      </p:par>
+    </p:tnLst>
+  </p:timing>
+</p:sld>
+</file>
+
+<file path=ppt/slides/slide11.xml><?xml version="1.0" encoding="utf-8"?>
+<p:sld xmlns:a="http://schemas.openxmlformats.org/drawingml/2006/main" xmlns:r="http://schemas.openxmlformats.org/officeDocument/2006/relationships" xmlns:p="http://schemas.openxmlformats.org/presentationml/2006/main">
+  <p:cSld>
+    <p:spTree>
+      <p:nvGrpSpPr>
+        <p:cNvPr id="1" name=""/>
+        <p:cNvGrpSpPr/>
+        <p:nvPr/>
+      </p:nvGrpSpPr>
+      <p:grpSpPr>
+        <a:xfrm>
+          <a:off x="0" y="0"/>
+          <a:ext cx="0" cy="0"/>
+          <a:chOff x="0" y="0"/>
+          <a:chExt cx="0" cy="0"/>
+        </a:xfrm>
+      </p:grpSpPr>
+      <p:sp>
+        <p:nvSpPr>
+          <p:cNvPr id="2" name="Title 1"/>
+          <p:cNvSpPr>
+            <a:spLocks noGrp="1"/>
+          </p:cNvSpPr>
+          <p:nvPr>
+            <p:ph type="title"/>
+          </p:nvPr>
+        </p:nvSpPr>
+        <p:spPr/>
+        <p:txBody>
+          <a:bodyPr/>
+          <a:lstStyle/>
+          <a:p>
+            <a:r>
+              <a:rPr lang="en-US" dirty="0" smtClean="0"/>
+              <a:t>Installing PHP</a:t>
+            </a:r>
+            <a:endParaRPr lang="en-US" dirty="0"/>
+          </a:p>
+        </p:txBody>
+      </p:sp>
+      <p:sp>
+        <p:nvSpPr>
+          <p:cNvPr id="3" name="Content Placeholder 2"/>
+          <p:cNvSpPr>
+            <a:spLocks noGrp="1"/>
+          </p:cNvSpPr>
+          <p:nvPr>
+            <p:ph idx="1"/>
+          </p:nvPr>
+        </p:nvSpPr>
+        <p:spPr/>
+        <p:txBody>
+          <a:bodyPr>
+            <a:normAutofit/>
+          </a:bodyPr>
+          <a:lstStyle/>
+          <a:p>
+            <a:r>
+              <a:rPr lang="en-US" dirty="0" smtClean="0"/>
+              <a:t>Download PHP –</a:t>
+            </a:r>
+          </a:p>
+          <a:p>
+            <a:pPr lvl="1"/>
+            <a:r>
+              <a:rPr lang="en-US" dirty="0" smtClean="0">
+                <a:hlinkClick r:id="rId2"/>
+              </a:rPr>
+              <a:t>http://windows.php.net/download</a:t>
+            </a:r>
+            <a:r>
+              <a:rPr lang="en-US" dirty="0" smtClean="0"/>
+              <a:t> </a:t>
+            </a:r>
+          </a:p>
+          <a:p>
+            <a:pPr lvl="1"/>
+            <a:r>
+              <a:rPr lang="en-US" dirty="0"/>
+              <a:t>VC11 x86 Non Thread Safe</a:t>
+            </a:r>
+          </a:p>
+          <a:p>
+            <a:r>
+              <a:rPr lang="en-US" dirty="0" smtClean="0"/>
+              <a:t>Unzip to a location of your choice </a:t>
+            </a:r>
+          </a:p>
+          <a:p>
+            <a:pPr lvl="1"/>
+            <a:r>
+              <a:rPr lang="en-US" dirty="0" smtClean="0"/>
+              <a:t>c:\php works</a:t>
+            </a:r>
+          </a:p>
+        </p:txBody>
+      </p:sp>
+    </p:spTree>
+    <p:extLst>
+      <p:ext uri="{BB962C8B-B14F-4D97-AF65-F5344CB8AC3E}">
+        <p14:creationId xmlns:p14="http://schemas.microsoft.com/office/powerpoint/2010/main" val="3987006042"/>
+      </p:ext>
+    </p:extLst>
+  </p:cSld>
+  <p:clrMapOvr>
+    <a:masterClrMapping/>
+  </p:clrMapOvr>
+  <p:timing>
+    <p:tnLst>
+      <p:par>
+        <p:cTn id="1" dur="indefinite" restart="never" nodeType="tmRoot"/>
+      </p:par>
+    </p:tnLst>
+  </p:timing>
+</p:sld>
+</file>
+
+<file path=ppt/slides/slide12.xml><?xml version="1.0" encoding="utf-8"?>
+<p:sld xmlns:a="http://schemas.openxmlformats.org/drawingml/2006/main" xmlns:r="http://schemas.openxmlformats.org/officeDocument/2006/relationships" xmlns:p="http://schemas.openxmlformats.org/presentationml/2006/main">
+  <p:cSld>
+    <p:spTree>
+      <p:nvGrpSpPr>
+        <p:cNvPr id="1" name=""/>
+        <p:cNvGrpSpPr/>
+        <p:nvPr/>
+      </p:nvGrpSpPr>
+      <p:grpSpPr>
+        <a:xfrm>
+          <a:off x="0" y="0"/>
+          <a:ext cx="0" cy="0"/>
+          <a:chOff x="0" y="0"/>
+          <a:chExt cx="0" cy="0"/>
+        </a:xfrm>
+      </p:grpSpPr>
+      <p:sp>
+        <p:nvSpPr>
+          <p:cNvPr id="2" name="Title 1"/>
+          <p:cNvSpPr>
+            <a:spLocks noGrp="1"/>
+          </p:cNvSpPr>
+          <p:nvPr>
+            <p:ph type="title"/>
+          </p:nvPr>
+        </p:nvSpPr>
+        <p:spPr/>
+        <p:txBody>
+          <a:bodyPr/>
+          <a:lstStyle/>
+          <a:p>
+            <a:r>
+              <a:rPr lang="en-US" dirty="0" smtClean="0"/>
+              <a:t>Configure PHP</a:t>
+            </a:r>
+            <a:endParaRPr lang="en-US" dirty="0"/>
+          </a:p>
+        </p:txBody>
+      </p:sp>
+      <p:sp>
+        <p:nvSpPr>
+          <p:cNvPr id="3" name="Content Placeholder 2"/>
+          <p:cNvSpPr>
+            <a:spLocks noGrp="1"/>
+          </p:cNvSpPr>
+          <p:nvPr>
+            <p:ph idx="1"/>
+          </p:nvPr>
+        </p:nvSpPr>
+        <p:spPr/>
+        <p:txBody>
+          <a:bodyPr/>
+          <a:lstStyle/>
+          <a:p>
+            <a:r>
+              <a:rPr lang="en-US" dirty="0" smtClean="0"/>
+              <a:t>open your </a:t>
+            </a:r>
+            <a:r>
+              <a:rPr lang="en-US" dirty="0" err="1" smtClean="0"/>
+              <a:t>php</a:t>
+            </a:r>
+            <a:r>
+              <a:rPr lang="en-US" dirty="0" smtClean="0"/>
+              <a:t> directory</a:t>
+            </a:r>
+          </a:p>
+          <a:p>
+            <a:r>
+              <a:rPr lang="en-US" dirty="0" smtClean="0"/>
+              <a:t>rename </a:t>
+            </a:r>
+            <a:r>
+              <a:rPr lang="en-US" dirty="0"/>
+              <a:t>php.ini-development to php.ini</a:t>
+            </a:r>
+          </a:p>
+          <a:p>
+            <a:r>
+              <a:rPr lang="en-US" dirty="0" smtClean="0"/>
+              <a:t>open your new php.ini file</a:t>
+            </a:r>
+          </a:p>
+          <a:p>
+            <a:r>
+              <a:rPr lang="en-US" dirty="0" smtClean="0"/>
+              <a:t>uncomment </a:t>
+            </a:r>
+            <a:r>
+              <a:rPr lang="en-US" dirty="0" err="1"/>
+              <a:t>extension_dir</a:t>
+            </a:r>
+            <a:r>
+              <a:rPr lang="en-US" dirty="0"/>
+              <a:t> = "</a:t>
+            </a:r>
+            <a:r>
+              <a:rPr lang="en-US" dirty="0" err="1"/>
+              <a:t>ext</a:t>
+            </a:r>
+            <a:r>
+              <a:rPr lang="en-US" dirty="0"/>
+              <a:t>"</a:t>
+            </a:r>
+          </a:p>
+          <a:p>
+            <a:r>
+              <a:rPr lang="en-US" dirty="0"/>
+              <a:t>uncomment extension=php_pdo_sqlite.dll </a:t>
+            </a:r>
+            <a:endParaRPr lang="en-US" dirty="0" smtClean="0"/>
+          </a:p>
+          <a:p>
+            <a:r>
+              <a:rPr lang="en-US" dirty="0" smtClean="0"/>
+              <a:t>save the changes</a:t>
+            </a:r>
+            <a:endParaRPr lang="en-US" dirty="0"/>
+          </a:p>
+          <a:p>
+            <a:endParaRPr lang="en-US" dirty="0"/>
+          </a:p>
+        </p:txBody>
+      </p:sp>
+    </p:spTree>
+    <p:extLst>
+      <p:ext uri="{BB962C8B-B14F-4D97-AF65-F5344CB8AC3E}">
+        <p14:creationId xmlns:p14="http://schemas.microsoft.com/office/powerpoint/2010/main" val="3015649681"/>
+      </p:ext>
+    </p:extLst>
+  </p:cSld>
+  <p:clrMapOvr>
+    <a:masterClrMapping/>
+  </p:clrMapOvr>
+  <p:timing>
+    <p:tnLst>
+      <p:par>
+        <p:cTn id="1" dur="indefinite" restart="never" nodeType="tmRoot"/>
+      </p:par>
+    </p:tnLst>
+  </p:timing>
+</p:sld>
+</file>
+
+<file path=ppt/slides/slide13.xml><?xml version="1.0" encoding="utf-8"?>
+<p:sld xmlns:a="http://schemas.openxmlformats.org/drawingml/2006/main" xmlns:r="http://schemas.openxmlformats.org/officeDocument/2006/relationships" xmlns:p="http://schemas.openxmlformats.org/presentationml/2006/main">
+  <p:cSld>
+    <p:spTree>
+      <p:nvGrpSpPr>
+        <p:cNvPr id="1" name=""/>
+        <p:cNvGrpSpPr/>
+        <p:nvPr/>
+      </p:nvGrpSpPr>
+      <p:grpSpPr>
+        <a:xfrm>
+          <a:off x="0" y="0"/>
+          <a:ext cx="0" cy="0"/>
+          <a:chOff x="0" y="0"/>
+          <a:chExt cx="0" cy="0"/>
+        </a:xfrm>
+      </p:grpSpPr>
+      <p:sp>
+        <p:nvSpPr>
+          <p:cNvPr id="2" name="Title 1"/>
+          <p:cNvSpPr>
+            <a:spLocks noGrp="1"/>
+          </p:cNvSpPr>
+          <p:nvPr>
+            <p:ph type="title"/>
+          </p:nvPr>
+        </p:nvSpPr>
+        <p:spPr/>
+        <p:txBody>
+          <a:bodyPr/>
+          <a:lstStyle/>
+          <a:p>
+            <a:r>
+              <a:rPr lang="en-US" dirty="0" smtClean="0"/>
+              <a:t>Checking PHP</a:t>
+            </a:r>
+            <a:endParaRPr lang="en-US" dirty="0"/>
+          </a:p>
+        </p:txBody>
+      </p:sp>
+      <p:sp>
+        <p:nvSpPr>
+          <p:cNvPr id="3" name="Content Placeholder 2"/>
+          <p:cNvSpPr>
+            <a:spLocks noGrp="1"/>
+          </p:cNvSpPr>
+          <p:nvPr>
+            <p:ph idx="1"/>
+          </p:nvPr>
+        </p:nvSpPr>
+        <p:spPr>
+          <a:xfrm>
+            <a:off x="457200" y="1600201"/>
+            <a:ext cx="8229600" cy="1828800"/>
+          </a:xfrm>
+        </p:spPr>
+        <p:txBody>
+          <a:bodyPr>
+            <a:normAutofit fontScale="70000" lnSpcReduction="20000"/>
+          </a:bodyPr>
+          <a:lstStyle/>
+          <a:p>
+            <a:r>
+              <a:rPr lang="en-US" dirty="0"/>
+              <a:t>open a </a:t>
+            </a:r>
+            <a:r>
+              <a:rPr lang="en-US" dirty="0" err="1"/>
+              <a:t>powershell</a:t>
+            </a:r>
+            <a:r>
+              <a:rPr lang="en-US" dirty="0"/>
+              <a:t> or </a:t>
+            </a:r>
+            <a:r>
+              <a:rPr lang="en-US" dirty="0" err="1"/>
+              <a:t>cmd</a:t>
+            </a:r>
+            <a:r>
+              <a:rPr lang="en-US" dirty="0"/>
+              <a:t> window and cd to your </a:t>
+            </a:r>
+            <a:r>
+              <a:rPr lang="en-US" dirty="0" err="1"/>
+              <a:t>php</a:t>
+            </a:r>
+            <a:r>
+              <a:rPr lang="en-US" dirty="0"/>
+              <a:t> </a:t>
+            </a:r>
+            <a:r>
+              <a:rPr lang="en-US" dirty="0" smtClean="0"/>
+              <a:t>location</a:t>
+            </a:r>
+          </a:p>
+          <a:p>
+            <a:r>
+              <a:rPr lang="en-US" dirty="0"/>
+              <a:t>run </a:t>
+            </a:r>
+            <a:r>
+              <a:rPr lang="en-US" dirty="0" err="1"/>
+              <a:t>php</a:t>
+            </a:r>
+            <a:r>
+              <a:rPr lang="en-US" dirty="0"/>
+              <a:t> –v </a:t>
+            </a:r>
+          </a:p>
+          <a:p>
+            <a:pPr lvl="1"/>
+            <a:r>
+              <a:rPr lang="en-US" dirty="0"/>
+              <a:t>should say PHP 5.6.7 and a bunch more</a:t>
+            </a:r>
+          </a:p>
+          <a:p>
+            <a:r>
+              <a:rPr lang="en-US" dirty="0"/>
+              <a:t>run </a:t>
+            </a:r>
+            <a:r>
+              <a:rPr lang="en-US" dirty="0" err="1"/>
+              <a:t>php</a:t>
+            </a:r>
+            <a:r>
+              <a:rPr lang="en-US" dirty="0"/>
+              <a:t> –m</a:t>
+            </a:r>
+          </a:p>
+          <a:p>
+            <a:pPr lvl="1"/>
+            <a:r>
+              <a:rPr lang="en-US" dirty="0"/>
+              <a:t>make sure </a:t>
+            </a:r>
+            <a:r>
+              <a:rPr lang="en-US" dirty="0" err="1"/>
+              <a:t>pdo_sqlite</a:t>
+            </a:r>
+            <a:r>
+              <a:rPr lang="en-US" dirty="0"/>
+              <a:t> is in the </a:t>
+            </a:r>
+            <a:r>
+              <a:rPr lang="en-US" dirty="0" smtClean="0"/>
+              <a:t>list</a:t>
+            </a:r>
+            <a:endParaRPr lang="en-US" dirty="0"/>
+          </a:p>
+          <a:p>
+            <a:endParaRPr lang="en-US" dirty="0"/>
+          </a:p>
+        </p:txBody>
+      </p:sp>
+      <p:pic>
+        <p:nvPicPr>
+          <p:cNvPr id="4" name="Picture 3"/>
+          <p:cNvPicPr>
+            <a:picLocks noChangeAspect="1"/>
+          </p:cNvPicPr>
+          <p:nvPr/>
+        </p:nvPicPr>
+        <p:blipFill>
+          <a:blip r:embed="rId3">
+            <a:extLst>
+              <a:ext uri="{28A0092B-C50C-407E-A947-70E740481C1C}">
+                <a14:useLocalDpi xmlns:a14="http://schemas.microsoft.com/office/drawing/2010/main" val="0"/>
+              </a:ext>
+            </a:extLst>
+          </a:blip>
+          <a:stretch>
+            <a:fillRect/>
+          </a:stretch>
+        </p:blipFill>
+        <p:spPr>
+          <a:xfrm>
+            <a:off x="1496292" y="3226359"/>
+            <a:ext cx="4980380" cy="3631642"/>
+          </a:xfrm>
+          <a:prstGeom prst="rect">
+            <a:avLst/>
+          </a:prstGeom>
+        </p:spPr>
+      </p:pic>
+    </p:spTree>
+    <p:extLst>
+      <p:ext uri="{BB962C8B-B14F-4D97-AF65-F5344CB8AC3E}">
+        <p14:creationId xmlns:p14="http://schemas.microsoft.com/office/powerpoint/2010/main" val="3155988950"/>
+      </p:ext>
+    </p:extLst>
+  </p:cSld>
+  <p:clrMapOvr>
+    <a:masterClrMapping/>
+  </p:clrMapOvr>
+  <p:timing>
+    <p:tnLst>
+      <p:par>
+        <p:cTn id="1" dur="indefinite" restart="never" nodeType="tmRoot"/>
+      </p:par>
+    </p:tnLst>
+  </p:timing>
+</p:sld>
+</file>
+
+<file path=ppt/slides/slide14.xml><?xml version="1.0" encoding="utf-8"?>
+<p:sld xmlns:a="http://schemas.openxmlformats.org/drawingml/2006/main" xmlns:r="http://schemas.openxmlformats.org/officeDocument/2006/relationships" xmlns:p="http://schemas.openxmlformats.org/presentationml/2006/main">
+  <p:cSld>
+    <p:spTree>
+      <p:nvGrpSpPr>
+        <p:cNvPr id="1" name=""/>
+        <p:cNvGrpSpPr/>
+        <p:nvPr/>
+      </p:nvGrpSpPr>
+      <p:grpSpPr>
+        <a:xfrm>
+          <a:off x="0" y="0"/>
+          <a:ext cx="0" cy="0"/>
+          <a:chOff x="0" y="0"/>
+          <a:chExt cx="0" cy="0"/>
+        </a:xfrm>
+      </p:grpSpPr>
+      <p:sp>
+        <p:nvSpPr>
+          <p:cNvPr id="2" name="Title 1"/>
+          <p:cNvSpPr>
+            <a:spLocks noGrp="1"/>
+          </p:cNvSpPr>
+          <p:nvPr>
+            <p:ph type="title"/>
+          </p:nvPr>
+        </p:nvSpPr>
+        <p:spPr/>
+        <p:txBody>
+          <a:bodyPr/>
+          <a:lstStyle/>
+          <a:p>
+            <a:r>
+              <a:rPr lang="en-US" dirty="0" smtClean="0"/>
+              <a:t>Running PHP</a:t>
+            </a:r>
+            <a:endParaRPr lang="en-US" dirty="0"/>
+          </a:p>
+        </p:txBody>
+      </p:sp>
+      <p:sp>
+        <p:nvSpPr>
+          <p:cNvPr id="3" name="Content Placeholder 2"/>
+          <p:cNvSpPr>
+            <a:spLocks noGrp="1"/>
+          </p:cNvSpPr>
+          <p:nvPr>
+            <p:ph idx="1"/>
+          </p:nvPr>
+        </p:nvSpPr>
+        <p:spPr/>
+        <p:txBody>
+          <a:bodyPr>
+            <a:normAutofit/>
+          </a:bodyPr>
+          <a:lstStyle/>
+          <a:p>
+            <a:r>
+              <a:rPr lang="en-US" dirty="0" smtClean="0"/>
+              <a:t>run</a:t>
+            </a:r>
+          </a:p>
+          <a:p>
+            <a:pPr lvl="1"/>
+            <a:r>
+              <a:rPr lang="en-US" dirty="0" err="1" smtClean="0"/>
+              <a:t>php</a:t>
+            </a:r>
+            <a:r>
+              <a:rPr lang="en-US" dirty="0" smtClean="0"/>
+              <a:t> </a:t>
+            </a:r>
+            <a:r>
+              <a:rPr lang="en-US" dirty="0"/>
+              <a:t>-S 0.0.0.0:8080 -t </a:t>
+            </a:r>
+            <a:r>
+              <a:rPr lang="en-US" dirty="0" smtClean="0"/>
+              <a:t>./public/</a:t>
+            </a:r>
+          </a:p>
+          <a:p>
+            <a:pPr lvl="1"/>
+            <a:r>
+              <a:rPr lang="en-US" dirty="0" smtClean="0"/>
+              <a:t>(</a:t>
+            </a:r>
+            <a:r>
+              <a:rPr lang="en-US" dirty="0"/>
+              <a:t>where ./public is the directory you want to </a:t>
+            </a:r>
+            <a:r>
+              <a:rPr lang="en-US" dirty="0" smtClean="0"/>
+              <a:t>put your PHP files as you learn)</a:t>
+            </a:r>
+          </a:p>
+          <a:p>
+            <a:pPr lvl="1"/>
+            <a:r>
+              <a:rPr lang="en-US" dirty="0" smtClean="0"/>
+              <a:t>if a firewall popup appears, allow it</a:t>
+            </a:r>
+          </a:p>
+          <a:p>
+            <a:pPr lvl="1"/>
+            <a:r>
+              <a:rPr lang="en-US" dirty="0" smtClean="0"/>
+              <a:t>as long as the </a:t>
+            </a:r>
+            <a:r>
+              <a:rPr lang="en-US" dirty="0" err="1" smtClean="0"/>
+              <a:t>cmd</a:t>
+            </a:r>
+            <a:r>
+              <a:rPr lang="en-US" dirty="0" smtClean="0"/>
+              <a:t> window is open, your site will be running</a:t>
+            </a:r>
+          </a:p>
+          <a:p>
+            <a:pPr lvl="1"/>
+            <a:r>
+              <a:rPr lang="en-US" dirty="0" smtClean="0"/>
+              <a:t>visit </a:t>
+            </a:r>
+            <a:r>
+              <a:rPr lang="en-US" dirty="0" smtClean="0">
+                <a:hlinkClick r:id="rId2"/>
+              </a:rPr>
+              <a:t>http</a:t>
+            </a:r>
+            <a:r>
+              <a:rPr lang="en-US" dirty="0">
+                <a:hlinkClick r:id="rId2"/>
+              </a:rPr>
+              <a:t>://localhost:8080</a:t>
+            </a:r>
+            <a:r>
+              <a:rPr lang="en-US" dirty="0" smtClean="0">
+                <a:hlinkClick r:id="rId2"/>
+              </a:rPr>
+              <a:t>/</a:t>
+            </a:r>
+            <a:r>
+              <a:rPr lang="en-US" dirty="0" smtClean="0"/>
+              <a:t> in your browser</a:t>
+            </a:r>
+            <a:endParaRPr lang="en-US" dirty="0"/>
+          </a:p>
+          <a:p>
+            <a:endParaRPr lang="en-US" dirty="0"/>
+          </a:p>
+        </p:txBody>
+      </p:sp>
+    </p:spTree>
+    <p:extLst>
+      <p:ext uri="{BB962C8B-B14F-4D97-AF65-F5344CB8AC3E}">
+        <p14:creationId xmlns:p14="http://schemas.microsoft.com/office/powerpoint/2010/main" val="314135072"/>
+      </p:ext>
+    </p:extLst>
+  </p:cSld>
+  <p:clrMapOvr>
+    <a:masterClrMapping/>
+  </p:clrMapOvr>
+  <p:timing>
+    <p:tnLst>
+      <p:par>
+        <p:cTn id="1" dur="indefinite" restart="never" nodeType="tmRoot"/>
+      </p:par>
+    </p:tnLst>
+  </p:timing>
+</p:sld>
+</file>
+
+<file path=ppt/slides/slide15.xml><?xml version="1.0" encoding="utf-8"?>
+<p:sld xmlns:a="http://schemas.openxmlformats.org/drawingml/2006/main" xmlns:r="http://schemas.openxmlformats.org/officeDocument/2006/relationships" xmlns:p="http://schemas.openxmlformats.org/presentationml/2006/main">
+  <p:cSld>
+    <p:spTree>
+      <p:nvGrpSpPr>
+        <p:cNvPr id="1" name=""/>
+        <p:cNvGrpSpPr/>
+        <p:nvPr/>
+      </p:nvGrpSpPr>
+      <p:grpSpPr>
+        <a:xfrm>
+          <a:off x="0" y="0"/>
+          <a:ext cx="0" cy="0"/>
+          <a:chOff x="0" y="0"/>
+          <a:chExt cx="0" cy="0"/>
+        </a:xfrm>
+      </p:grpSpPr>
+      <p:pic>
+        <p:nvPicPr>
+          <p:cNvPr id="4" name="Picture 3"/>
+          <p:cNvPicPr>
+            <a:picLocks noChangeAspect="1"/>
+          </p:cNvPicPr>
+          <p:nvPr/>
+        </p:nvPicPr>
+        <p:blipFill>
+          <a:blip r:embed="rId2">
+            <a:extLst>
+              <a:ext uri="{28A0092B-C50C-407E-A947-70E740481C1C}">
+                <a14:useLocalDpi xmlns:a14="http://schemas.microsoft.com/office/drawing/2010/main" val="0"/>
+              </a:ext>
+            </a:extLst>
+          </a:blip>
+          <a:stretch>
+            <a:fillRect/>
+          </a:stretch>
+        </p:blipFill>
+        <p:spPr>
+          <a:xfrm>
+            <a:off x="-96402" y="665019"/>
+            <a:ext cx="9144000" cy="2045616"/>
+          </a:xfrm>
+          <a:prstGeom prst="rect">
+            <a:avLst/>
+          </a:prstGeom>
+        </p:spPr>
+      </p:pic>
+      <p:pic>
+        <p:nvPicPr>
+          <p:cNvPr id="5" name="Picture 4"/>
+          <p:cNvPicPr>
+            <a:picLocks noChangeAspect="1"/>
+          </p:cNvPicPr>
+          <p:nvPr/>
+        </p:nvPicPr>
+        <p:blipFill>
+          <a:blip r:embed="rId3">
+            <a:extLst>
+              <a:ext uri="{28A0092B-C50C-407E-A947-70E740481C1C}">
+                <a14:useLocalDpi xmlns:a14="http://schemas.microsoft.com/office/drawing/2010/main" val="0"/>
+              </a:ext>
+            </a:extLst>
+          </a:blip>
+          <a:stretch>
+            <a:fillRect/>
+          </a:stretch>
+        </p:blipFill>
+        <p:spPr>
+          <a:xfrm>
+            <a:off x="752199" y="3429000"/>
+            <a:ext cx="7446798" cy="2953896"/>
+          </a:xfrm>
+          <a:prstGeom prst="rect">
+            <a:avLst/>
+          </a:prstGeom>
+        </p:spPr>
+      </p:pic>
+    </p:spTree>
+    <p:extLst>
+      <p:ext uri="{BB962C8B-B14F-4D97-AF65-F5344CB8AC3E}">
+        <p14:creationId xmlns:p14="http://schemas.microsoft.com/office/powerpoint/2010/main" val="1934675733"/>
+      </p:ext>
+    </p:extLst>
+  </p:cSld>
+  <p:clrMapOvr>
+    <a:masterClrMapping/>
+  </p:clrMapOvr>
+  <p:timing>
+    <p:tnLst>
+      <p:par>
+        <p:cTn id="1" dur="indefinite" restart="never" nodeType="tmRoot"/>
+      </p:par>
+    </p:tnLst>
+  </p:timing>
+</p:sld>
+</file>
+
+<file path=ppt/slides/slide16.xml><?xml version="1.0" encoding="utf-8"?>
+<p:sld xmlns:a="http://schemas.openxmlformats.org/drawingml/2006/main" xmlns:r="http://schemas.openxmlformats.org/officeDocument/2006/relationships" xmlns:p="http://schemas.openxmlformats.org/presentationml/2006/main">
+  <p:cSld>
+    <p:spTree>
+      <p:nvGrpSpPr>
+        <p:cNvPr id="1" name=""/>
+        <p:cNvGrpSpPr/>
+        <p:nvPr/>
+      </p:nvGrpSpPr>
+      <p:grpSpPr>
+        <a:xfrm>
+          <a:off x="0" y="0"/>
+          <a:ext cx="0" cy="0"/>
+          <a:chOff x="0" y="0"/>
+          <a:chExt cx="0" cy="0"/>
+        </a:xfrm>
+      </p:grpSpPr>
+      <p:sp>
+        <p:nvSpPr>
+          <p:cNvPr id="2" name="Title 1"/>
+          <p:cNvSpPr>
+            <a:spLocks noGrp="1"/>
+          </p:cNvSpPr>
+          <p:nvPr>
+            <p:ph type="title"/>
+          </p:nvPr>
+        </p:nvSpPr>
+        <p:spPr/>
+        <p:txBody>
+          <a:bodyPr/>
+          <a:lstStyle/>
+          <a:p>
+            <a:r>
+              <a:rPr lang="en-US" dirty="0" smtClean="0"/>
+              <a:t>Installing Komodo Edit</a:t>
+            </a:r>
+            <a:endParaRPr lang="en-US" dirty="0"/>
+          </a:p>
+        </p:txBody>
+      </p:sp>
+      <p:sp>
+        <p:nvSpPr>
+          <p:cNvPr id="3" name="Content Placeholder 2"/>
+          <p:cNvSpPr>
+            <a:spLocks noGrp="1"/>
+          </p:cNvSpPr>
+          <p:nvPr>
+            <p:ph idx="1"/>
+          </p:nvPr>
+        </p:nvSpPr>
+        <p:spPr/>
+        <p:txBody>
+          <a:bodyPr/>
+          <a:lstStyle/>
+          <a:p>
+            <a:r>
+              <a:rPr lang="en-US" dirty="0" smtClean="0"/>
+              <a:t>Download Komodo Edit – </a:t>
+            </a:r>
+            <a:r>
+              <a:rPr lang="en-US" dirty="0" smtClean="0">
+                <a:hlinkClick r:id="rId3"/>
+              </a:rPr>
+              <a:t>http</a:t>
+            </a:r>
+            <a:r>
+              <a:rPr lang="en-US" dirty="0">
+                <a:hlinkClick r:id="rId3"/>
+              </a:rPr>
+              <a:t>://komodoide.com/download/#</a:t>
+            </a:r>
+            <a:r>
+              <a:rPr lang="en-US" dirty="0" smtClean="0">
+                <a:hlinkClick r:id="rId3"/>
+              </a:rPr>
+              <a:t>edit</a:t>
+            </a:r>
+            <a:r>
+              <a:rPr lang="en-US" dirty="0" smtClean="0"/>
+              <a:t> </a:t>
+            </a:r>
+          </a:p>
+          <a:p>
+            <a:r>
+              <a:rPr lang="en-US" dirty="0" smtClean="0"/>
+              <a:t> Run the .</a:t>
+            </a:r>
+            <a:r>
+              <a:rPr lang="en-US" dirty="0" err="1" smtClean="0"/>
+              <a:t>msi</a:t>
+            </a:r>
+            <a:r>
+              <a:rPr lang="en-US" dirty="0" smtClean="0"/>
+              <a:t> installer</a:t>
+            </a:r>
+            <a:endParaRPr lang="en-US" dirty="0"/>
+          </a:p>
+        </p:txBody>
+      </p:sp>
+      <p:pic>
+        <p:nvPicPr>
+          <p:cNvPr id="4" name="Picture 3"/>
+          <p:cNvPicPr>
+            <a:picLocks noChangeAspect="1"/>
+          </p:cNvPicPr>
+          <p:nvPr/>
+        </p:nvPicPr>
+        <p:blipFill>
+          <a:blip r:embed="rId4">
+            <a:extLst>
+              <a:ext uri="{28A0092B-C50C-407E-A947-70E740481C1C}">
+                <a14:useLocalDpi xmlns:a14="http://schemas.microsoft.com/office/drawing/2010/main" val="0"/>
+              </a:ext>
+            </a:extLst>
+          </a:blip>
+          <a:stretch>
+            <a:fillRect/>
+          </a:stretch>
+        </p:blipFill>
+        <p:spPr>
+          <a:xfrm>
+            <a:off x="2266957" y="3429000"/>
+            <a:ext cx="4110860" cy="3103988"/>
+          </a:xfrm>
+          <a:prstGeom prst="rect">
+            <a:avLst/>
+          </a:prstGeom>
+        </p:spPr>
+      </p:pic>
+    </p:spTree>
+    <p:extLst>
+      <p:ext uri="{BB962C8B-B14F-4D97-AF65-F5344CB8AC3E}">
+        <p14:creationId xmlns:p14="http://schemas.microsoft.com/office/powerpoint/2010/main" val="3703654712"/>
+      </p:ext>
+    </p:extLst>
+  </p:cSld>
+  <p:clrMapOvr>
+    <a:masterClrMapping/>
+  </p:clrMapOvr>
+  <p:timing>
+    <p:tnLst>
+      <p:par>
+        <p:cTn id="1" dur="indefinite" restart="never" nodeType="tmRoot"/>
+      </p:par>
+    </p:tnLst>
+  </p:timing>
+</p:sld>
+</file>
+
+<file path=ppt/slides/slide17.xml><?xml version="1.0" encoding="utf-8"?>
+<p:sld xmlns:a="http://schemas.openxmlformats.org/drawingml/2006/main" xmlns:r="http://schemas.openxmlformats.org/officeDocument/2006/relationships" xmlns:p="http://schemas.openxmlformats.org/presentationml/2006/main">
+  <p:cSld>
+    <p:spTree>
+      <p:nvGrpSpPr>
+        <p:cNvPr id="1" name=""/>
+        <p:cNvGrpSpPr/>
+        <p:nvPr/>
+      </p:nvGrpSpPr>
+      <p:grpSpPr>
+        <a:xfrm>
+          <a:off x="0" y="0"/>
+          <a:ext cx="0" cy="0"/>
+          <a:chOff x="0" y="0"/>
+          <a:chExt cx="0" cy="0"/>
+        </a:xfrm>
+      </p:grpSpPr>
+      <p:sp>
+        <p:nvSpPr>
+          <p:cNvPr id="2" name="Title 1"/>
+          <p:cNvSpPr>
+            <a:spLocks noGrp="1"/>
+          </p:cNvSpPr>
+          <p:nvPr>
+            <p:ph type="title"/>
+          </p:nvPr>
+        </p:nvSpPr>
+        <p:spPr/>
+        <p:txBody>
+          <a:bodyPr/>
+          <a:lstStyle/>
+          <a:p>
+            <a:r>
+              <a:rPr lang="en-US" dirty="0" smtClean="0"/>
+              <a:t>Installing DB Browser</a:t>
+            </a:r>
+            <a:endParaRPr lang="en-US" dirty="0"/>
+          </a:p>
+        </p:txBody>
+      </p:sp>
+      <p:sp>
+        <p:nvSpPr>
+          <p:cNvPr id="3" name="Content Placeholder 2"/>
+          <p:cNvSpPr>
+            <a:spLocks noGrp="1"/>
+          </p:cNvSpPr>
+          <p:nvPr>
+            <p:ph idx="1"/>
+          </p:nvPr>
+        </p:nvSpPr>
+        <p:spPr/>
+        <p:txBody>
+          <a:bodyPr/>
+          <a:lstStyle/>
+          <a:p>
+            <a:r>
+              <a:rPr lang="en-US" dirty="0" smtClean="0"/>
+              <a:t>Download DB Browser for </a:t>
+            </a:r>
+            <a:r>
+              <a:rPr lang="en-US" dirty="0" err="1" smtClean="0"/>
+              <a:t>Sqlite</a:t>
+            </a:r>
+            <a:r>
+              <a:rPr lang="en-US" dirty="0" smtClean="0"/>
+              <a:t> –</a:t>
+            </a:r>
+          </a:p>
+          <a:p>
+            <a:pPr lvl="1"/>
+            <a:r>
+              <a:rPr lang="en-US" dirty="0">
+                <a:hlinkClick r:id="rId3"/>
+              </a:rPr>
+              <a:t>http://sqlitebrowser.org</a:t>
+            </a:r>
+            <a:r>
+              <a:rPr lang="en-US" dirty="0" smtClean="0">
+                <a:hlinkClick r:id="rId3"/>
+              </a:rPr>
+              <a:t>/</a:t>
+            </a:r>
+            <a:r>
+              <a:rPr lang="en-US" dirty="0" smtClean="0"/>
+              <a:t> </a:t>
+            </a:r>
+          </a:p>
+          <a:p>
+            <a:pPr lvl="1"/>
+            <a:r>
+              <a:rPr lang="en-US" dirty="0" smtClean="0"/>
+              <a:t>choose the windows.exe</a:t>
+            </a:r>
+          </a:p>
+          <a:p>
+            <a:pPr lvl="1"/>
+            <a:r>
+              <a:rPr lang="en-US" dirty="0" smtClean="0"/>
+              <a:t>run the installer</a:t>
+            </a:r>
+            <a:endParaRPr lang="en-US" dirty="0"/>
+          </a:p>
+        </p:txBody>
+      </p:sp>
+      <p:pic>
+        <p:nvPicPr>
+          <p:cNvPr id="4" name="Picture 3"/>
+          <p:cNvPicPr>
+            <a:picLocks noChangeAspect="1"/>
+          </p:cNvPicPr>
+          <p:nvPr/>
+        </p:nvPicPr>
+        <p:blipFill>
+          <a:blip r:embed="rId4">
+            <a:extLst>
+              <a:ext uri="{28A0092B-C50C-407E-A947-70E740481C1C}">
+                <a14:useLocalDpi xmlns:a14="http://schemas.microsoft.com/office/drawing/2010/main" val="0"/>
+              </a:ext>
+            </a:extLst>
+          </a:blip>
+          <a:stretch>
+            <a:fillRect/>
+          </a:stretch>
+        </p:blipFill>
+        <p:spPr>
+          <a:xfrm>
+            <a:off x="2398815" y="3777158"/>
+            <a:ext cx="3916565" cy="3080842"/>
+          </a:xfrm>
+          <a:prstGeom prst="rect">
+            <a:avLst/>
+          </a:prstGeom>
+        </p:spPr>
+      </p:pic>
+    </p:spTree>
+    <p:extLst>
+      <p:ext uri="{BB962C8B-B14F-4D97-AF65-F5344CB8AC3E}">
+        <p14:creationId xmlns:p14="http://schemas.microsoft.com/office/powerpoint/2010/main" val="4130467850"/>
+      </p:ext>
+    </p:extLst>
+  </p:cSld>
+  <p:clrMapOvr>
+    <a:masterClrMapping/>
+  </p:clrMapOvr>
+  <p:timing>
+    <p:tnLst>
+      <p:par>
+        <p:cTn id="1" dur="indefinite" restart="never" nodeType="tmRoot"/>
+      </p:par>
+    </p:tnLst>
+  </p:timing>
+</p:sld>
+</file>
+
+<file path=ppt/slides/slide18.xml><?xml version="1.0" encoding="utf-8"?>
+<p:sld xmlns:a="http://schemas.openxmlformats.org/drawingml/2006/main" xmlns:r="http://schemas.openxmlformats.org/officeDocument/2006/relationships" xmlns:p="http://schemas.openxmlformats.org/presentationml/2006/main">
+  <p:cSld>
+    <p:spTree>
+      <p:nvGrpSpPr>
+        <p:cNvPr id="1" name=""/>
+        <p:cNvGrpSpPr/>
+        <p:nvPr/>
+      </p:nvGrpSpPr>
+      <p:grpSpPr>
+        <a:xfrm>
+          <a:off x="0" y="0"/>
+          <a:ext cx="0" cy="0"/>
+          <a:chOff x="0" y="0"/>
+          <a:chExt cx="0" cy="0"/>
+        </a:xfrm>
+      </p:grpSpPr>
+      <p:sp>
+        <p:nvSpPr>
+          <p:cNvPr id="2" name="Title 1"/>
+          <p:cNvSpPr>
+            <a:spLocks noGrp="1"/>
+          </p:cNvSpPr>
+          <p:nvPr>
+            <p:ph type="title"/>
+          </p:nvPr>
+        </p:nvSpPr>
+        <p:spPr/>
+        <p:txBody>
+          <a:bodyPr/>
+          <a:lstStyle/>
+          <a:p>
+            <a:r>
+              <a:rPr lang="en-US" dirty="0" smtClean="0"/>
+              <a:t>Linux (Ubuntu)</a:t>
+            </a:r>
+            <a:endParaRPr lang="en-US" dirty="0"/>
+          </a:p>
+        </p:txBody>
+      </p:sp>
+      <p:pic>
+        <p:nvPicPr>
+          <p:cNvPr id="4" name="Content Placeholder 3" descr="Ubuntu_Logo.png"/>
+          <p:cNvPicPr>
+            <a:picLocks noGrp="1" noChangeAspect="1"/>
+          </p:cNvPicPr>
+          <p:nvPr>
+            <p:ph idx="1"/>
+          </p:nvPr>
+        </p:nvPicPr>
+        <p:blipFill>
+          <a:blip r:embed="rId3">
+            <a:extLst>
+              <a:ext uri="{28A0092B-C50C-407E-A947-70E740481C1C}">
+                <a14:useLocalDpi xmlns:a14="http://schemas.microsoft.com/office/drawing/2010/main" val="0"/>
+              </a:ext>
+            </a:extLst>
+          </a:blip>
+          <a:srcRect l="-40915" r="-40915"/>
+          <a:stretch>
+            <a:fillRect/>
+          </a:stretch>
+        </p:blipFill>
+        <p:spPr/>
+      </p:pic>
+    </p:spTree>
+    <p:extLst>
+      <p:ext uri="{BB962C8B-B14F-4D97-AF65-F5344CB8AC3E}">
+        <p14:creationId xmlns:p14="http://schemas.microsoft.com/office/powerpoint/2010/main" val="3063094544"/>
+      </p:ext>
+    </p:extLst>
+  </p:cSld>
+  <p:clrMapOvr>
+    <a:masterClrMapping/>
+  </p:clrMapOvr>
+  <p:timing>
+    <p:tnLst>
+      <p:par>
+        <p:cTn id="1" dur="indefinite" restart="never" nodeType="tmRoot"/>
+      </p:par>
+    </p:tnLst>
+  </p:timing>
+</p:sld>
+</file>
+
+<file path=ppt/slides/slide19.xml><?xml version="1.0" encoding="utf-8"?>
+<p:sld xmlns:a="http://schemas.openxmlformats.org/drawingml/2006/main" xmlns:r="http://schemas.openxmlformats.org/officeDocument/2006/relationships" xmlns:p="http://schemas.openxmlformats.org/presentationml/2006/main">
+  <p:cSld>
+    <p:spTree>
+      <p:nvGrpSpPr>
+        <p:cNvPr id="1" name=""/>
+        <p:cNvGrpSpPr/>
+        <p:nvPr/>
+      </p:nvGrpSpPr>
+      <p:grpSpPr>
+        <a:xfrm>
+          <a:off x="0" y="0"/>
+          <a:ext cx="0" cy="0"/>
+          <a:chOff x="0" y="0"/>
+          <a:chExt cx="0" cy="0"/>
+        </a:xfrm>
+      </p:grpSpPr>
+      <p:sp>
+        <p:nvSpPr>
+          <p:cNvPr id="2" name="Title 1"/>
+          <p:cNvSpPr>
+            <a:spLocks noGrp="1"/>
+          </p:cNvSpPr>
+          <p:nvPr>
+            <p:ph type="title"/>
+          </p:nvPr>
+        </p:nvSpPr>
+        <p:spPr/>
+        <p:txBody>
+          <a:bodyPr/>
+          <a:lstStyle/>
+          <a:p>
+            <a:r>
+              <a:rPr lang="en-US" dirty="0" smtClean="0"/>
+              <a:t>Installation</a:t>
+            </a:r>
+            <a:endParaRPr lang="en-US" dirty="0"/>
+          </a:p>
+        </p:txBody>
+      </p:sp>
+      <p:sp>
+        <p:nvSpPr>
+          <p:cNvPr id="3" name="Content Placeholder 2"/>
+          <p:cNvSpPr>
+            <a:spLocks noGrp="1"/>
+          </p:cNvSpPr>
+          <p:nvPr>
+            <p:ph idx="1"/>
+          </p:nvPr>
+        </p:nvSpPr>
+        <p:spPr/>
+        <p:txBody>
+          <a:bodyPr/>
+          <a:lstStyle/>
+          <a:p>
+            <a:r>
+              <a:rPr lang="en-US" dirty="0" smtClean="0"/>
+              <a:t>check if </a:t>
+            </a:r>
+            <a:r>
+              <a:rPr lang="en-US" dirty="0" err="1" smtClean="0"/>
+              <a:t>php</a:t>
+            </a:r>
+            <a:r>
+              <a:rPr lang="en-US" dirty="0" smtClean="0"/>
+              <a:t> is already installed</a:t>
+            </a:r>
+          </a:p>
+          <a:p>
+            <a:r>
+              <a:rPr lang="en-US" dirty="0" smtClean="0"/>
+              <a:t>check if </a:t>
+            </a:r>
+            <a:r>
+              <a:rPr lang="en-US" dirty="0" err="1" smtClean="0"/>
+              <a:t>sqlite</a:t>
+            </a:r>
+            <a:r>
+              <a:rPr lang="en-US" dirty="0" smtClean="0"/>
+              <a:t> is available</a:t>
+            </a:r>
+          </a:p>
+          <a:p>
+            <a:r>
+              <a:rPr lang="en-US" dirty="0" smtClean="0"/>
+              <a:t>run the built in </a:t>
+            </a:r>
+            <a:r>
+              <a:rPr lang="en-US" dirty="0" err="1" smtClean="0"/>
+              <a:t>php</a:t>
+            </a:r>
+            <a:r>
+              <a:rPr lang="en-US" dirty="0" smtClean="0"/>
+              <a:t> webserver, make sure it works</a:t>
+            </a:r>
+          </a:p>
+          <a:p>
+            <a:r>
+              <a:rPr lang="en-US" dirty="0" smtClean="0"/>
+              <a:t>Install your text editor, if not already set up</a:t>
+            </a:r>
+          </a:p>
+          <a:p>
+            <a:r>
+              <a:rPr lang="en-US" dirty="0" smtClean="0"/>
+              <a:t>Install </a:t>
+            </a:r>
+            <a:r>
+              <a:rPr lang="en-US" dirty="0" err="1" smtClean="0"/>
+              <a:t>db</a:t>
+            </a:r>
+            <a:r>
+              <a:rPr lang="en-US" dirty="0" smtClean="0"/>
+              <a:t> browser for </a:t>
+            </a:r>
+            <a:r>
+              <a:rPr lang="en-US" dirty="0" err="1" smtClean="0"/>
+              <a:t>sqlite</a:t>
+            </a:r>
+            <a:r>
+              <a:rPr lang="en-US" dirty="0" smtClean="0"/>
+              <a:t>, if not already set up</a:t>
+            </a:r>
+            <a:endParaRPr lang="en-US" dirty="0"/>
+          </a:p>
+        </p:txBody>
+      </p:sp>
+    </p:spTree>
+    <p:extLst>
+      <p:ext uri="{BB962C8B-B14F-4D97-AF65-F5344CB8AC3E}">
+        <p14:creationId xmlns:p14="http://schemas.microsoft.com/office/powerpoint/2010/main" val="3537609734"/>
+      </p:ext>
+    </p:extLst>
+  </p:cSld>
+  <p:clrMapOvr>
+    <a:masterClrMapping/>
+  </p:clrMapOvr>
+  <p:timing>
+    <p:tnLst>
+      <p:par>
+        <p:cTn id="1" dur="indefinite" restart="never" nodeType="tmRoot"/>
+      </p:par>
+    </p:tnLst>
+  </p:timing>
 </p:sld>
 </file>
 
 <file path=ppt/slides/slide2.xml><?xml version="1.0" encoding="utf-8"?>
+<p:sld xmlns:a="http://schemas.openxmlformats.org/drawingml/2006/main" xmlns:r="http://schemas.openxmlformats.org/officeDocument/2006/relationships" xmlns:p="http://schemas.openxmlformats.org/presentationml/2006/main">
+  <p:cSld>
+    <p:spTree>
+      <p:nvGrpSpPr>
+        <p:cNvPr id="1" name=""/>
+        <p:cNvGrpSpPr/>
+        <p:nvPr/>
+      </p:nvGrpSpPr>
+      <p:grpSpPr>
+        <a:xfrm>
+          <a:off x="0" y="0"/>
+          <a:ext cx="0" cy="0"/>
+          <a:chOff x="0" y="0"/>
+          <a:chExt cx="0" cy="0"/>
+        </a:xfrm>
+      </p:grpSpPr>
+      <p:sp>
+        <p:nvSpPr>
+          <p:cNvPr id="2" name="Title 1"/>
+          <p:cNvSpPr>
+            <a:spLocks noGrp="1"/>
+          </p:cNvSpPr>
+          <p:nvPr>
+            <p:ph type="title"/>
+          </p:nvPr>
+        </p:nvSpPr>
+        <p:spPr/>
+        <p:txBody>
+          <a:bodyPr/>
+          <a:lstStyle/>
+          <a:p>
+            <a:r>
+              <a:rPr lang="en-US" dirty="0" smtClean="0"/>
+              <a:t>The Server</a:t>
+            </a:r>
+            <a:endParaRPr lang="en-US" dirty="0"/>
+          </a:p>
+        </p:txBody>
+      </p:sp>
+      <p:sp>
+        <p:nvSpPr>
+          <p:cNvPr id="3" name="Content Placeholder 2"/>
+          <p:cNvSpPr>
+            <a:spLocks noGrp="1"/>
+          </p:cNvSpPr>
+          <p:nvPr>
+            <p:ph idx="1"/>
+          </p:nvPr>
+        </p:nvSpPr>
+        <p:spPr/>
+        <p:txBody>
+          <a:bodyPr/>
+          <a:lstStyle/>
+          <a:p>
+            <a:r>
+              <a:rPr lang="en-US" dirty="0" smtClean="0"/>
+              <a:t>PHP 5.6 (cli) using the test cli server</a:t>
+            </a:r>
+          </a:p>
+          <a:p>
+            <a:r>
+              <a:rPr lang="en-US" dirty="0" err="1" smtClean="0"/>
+              <a:t>pdo_sqlite</a:t>
+            </a:r>
+            <a:r>
+              <a:rPr lang="en-US" dirty="0" smtClean="0"/>
+              <a:t> available</a:t>
+            </a:r>
+          </a:p>
+          <a:p>
+            <a:r>
+              <a:rPr lang="en-US" dirty="0" smtClean="0"/>
+              <a:t>Running on localhost:8080</a:t>
+            </a:r>
+            <a:endParaRPr lang="en-US" dirty="0"/>
+          </a:p>
+        </p:txBody>
+      </p:sp>
+    </p:spTree>
+    <p:extLst>
+      <p:ext uri="{BB962C8B-B14F-4D97-AF65-F5344CB8AC3E}">
+        <p14:creationId xmlns:p14="http://schemas.microsoft.com/office/powerpoint/2010/main" val="3281030049"/>
+      </p:ext>
+    </p:extLst>
+  </p:cSld>
+  <p:clrMapOvr>
+    <a:masterClrMapping/>
+  </p:clrMapOvr>
+  <p:timing>
+    <p:tnLst>
+      <p:par>
+        <p:cTn id="1" dur="indefinite" restart="never" nodeType="tmRoot"/>
+      </p:par>
+    </p:tnLst>
+  </p:timing>
+</p:sld>
+</file>
+
+<file path=ppt/slides/slide20.xml><?xml version="1.0" encoding="utf-8"?>
+<p:sld xmlns:a="http://schemas.openxmlformats.org/drawingml/2006/main" xmlns:r="http://schemas.openxmlformats.org/officeDocument/2006/relationships" xmlns:p="http://schemas.openxmlformats.org/presentationml/2006/main">
+  <p:cSld>
+    <p:spTree>
+      <p:nvGrpSpPr>
+        <p:cNvPr id="1" name=""/>
+        <p:cNvGrpSpPr/>
+        <p:nvPr/>
+      </p:nvGrpSpPr>
+      <p:grpSpPr>
+        <a:xfrm>
+          <a:off x="0" y="0"/>
+          <a:ext cx="0" cy="0"/>
+          <a:chOff x="0" y="0"/>
+          <a:chExt cx="0" cy="0"/>
+        </a:xfrm>
+      </p:grpSpPr>
+      <p:sp>
+        <p:nvSpPr>
+          <p:cNvPr id="4" name="Title 3"/>
+          <p:cNvSpPr>
+            <a:spLocks noGrp="1"/>
+          </p:cNvSpPr>
+          <p:nvPr>
+            <p:ph type="title"/>
+          </p:nvPr>
+        </p:nvSpPr>
+        <p:spPr/>
+        <p:txBody>
+          <a:bodyPr/>
+          <a:lstStyle/>
+          <a:p>
+            <a:r>
+              <a:rPr lang="en-US" dirty="0" smtClean="0"/>
+              <a:t>Hello World</a:t>
+            </a:r>
+            <a:endParaRPr lang="en-US" dirty="0"/>
+          </a:p>
+        </p:txBody>
+      </p:sp>
+      <p:sp>
+        <p:nvSpPr>
+          <p:cNvPr id="5" name="Text Placeholder 4"/>
+          <p:cNvSpPr>
+            <a:spLocks noGrp="1"/>
+          </p:cNvSpPr>
+          <p:nvPr>
+            <p:ph type="body" idx="1"/>
+          </p:nvPr>
+        </p:nvSpPr>
+        <p:spPr/>
+        <p:txBody>
+          <a:bodyPr/>
+          <a:lstStyle/>
+          <a:p>
+            <a:r>
+              <a:rPr lang="en-US" dirty="0" smtClean="0"/>
+              <a:t>Making sure we can run PHP code</a:t>
+            </a:r>
+            <a:endParaRPr lang="en-US" dirty="0"/>
+          </a:p>
+        </p:txBody>
+      </p:sp>
+    </p:spTree>
+    <p:extLst>
+      <p:ext uri="{BB962C8B-B14F-4D97-AF65-F5344CB8AC3E}">
+        <p14:creationId xmlns:p14="http://schemas.microsoft.com/office/powerpoint/2010/main" val="1020605476"/>
+      </p:ext>
+    </p:extLst>
+  </p:cSld>
+  <p:clrMapOvr>
+    <a:masterClrMapping/>
+  </p:clrMapOvr>
+  <p:timing>
+    <p:tnLst>
+      <p:par>
+        <p:cTn id="1" dur="indefinite" restart="never" nodeType="tmRoot"/>
+      </p:par>
+    </p:tnLst>
+  </p:timing>
+</p:sld>
+</file>
+
+<file path=ppt/slides/slide21.xml><?xml version="1.0" encoding="utf-8"?>
+<p:sld xmlns:a="http://schemas.openxmlformats.org/drawingml/2006/main" xmlns:r="http://schemas.openxmlformats.org/officeDocument/2006/relationships" xmlns:p="http://schemas.openxmlformats.org/presentationml/2006/main">
+  <p:cSld>
+    <p:spTree>
+      <p:nvGrpSpPr>
+        <p:cNvPr id="1" name=""/>
+        <p:cNvGrpSpPr/>
+        <p:nvPr/>
+      </p:nvGrpSpPr>
+      <p:grpSpPr>
+        <a:xfrm>
+          <a:off x="0" y="0"/>
+          <a:ext cx="0" cy="0"/>
+          <a:chOff x="0" y="0"/>
+          <a:chExt cx="0" cy="0"/>
+        </a:xfrm>
+      </p:grpSpPr>
+      <p:sp>
+        <p:nvSpPr>
+          <p:cNvPr id="4" name="Title 3"/>
+          <p:cNvSpPr>
+            <a:spLocks noGrp="1"/>
+          </p:cNvSpPr>
+          <p:nvPr>
+            <p:ph type="title"/>
+          </p:nvPr>
+        </p:nvSpPr>
+        <p:spPr/>
+        <p:txBody>
+          <a:bodyPr/>
+          <a:lstStyle/>
+          <a:p>
+            <a:r>
+              <a:rPr lang="en-US" dirty="0" smtClean="0"/>
+              <a:t>Testing PHP Configuration</a:t>
+            </a:r>
+            <a:endParaRPr lang="en-US" dirty="0"/>
+          </a:p>
+        </p:txBody>
+      </p:sp>
+      <p:sp>
+        <p:nvSpPr>
+          <p:cNvPr id="5" name="Content Placeholder 4"/>
+          <p:cNvSpPr>
+            <a:spLocks noGrp="1"/>
+          </p:cNvSpPr>
+          <p:nvPr>
+            <p:ph idx="1"/>
+          </p:nvPr>
+        </p:nvSpPr>
+        <p:spPr/>
+        <p:txBody>
+          <a:bodyPr>
+            <a:normAutofit/>
+          </a:bodyPr>
+          <a:lstStyle/>
+          <a:p>
+            <a:r>
+              <a:rPr lang="en-US" dirty="0" smtClean="0"/>
+              <a:t>Create a file called </a:t>
+            </a:r>
+            <a:r>
+              <a:rPr lang="en-US" dirty="0" err="1" smtClean="0"/>
+              <a:t>info.php</a:t>
+            </a:r>
+            <a:r>
+              <a:rPr lang="en-US" dirty="0" smtClean="0"/>
+              <a:t> in your document root</a:t>
+            </a:r>
+          </a:p>
+          <a:p>
+            <a:r>
+              <a:rPr lang="en-US" dirty="0" smtClean="0"/>
+              <a:t>Use the opening tag (&lt;?</a:t>
+            </a:r>
+            <a:r>
+              <a:rPr lang="en-US" dirty="0" err="1" smtClean="0"/>
+              <a:t>php</a:t>
+            </a:r>
+            <a:r>
+              <a:rPr lang="en-US" dirty="0" smtClean="0"/>
+              <a:t>) to turn on PHP parsing</a:t>
+            </a:r>
+          </a:p>
+          <a:p>
+            <a:r>
+              <a:rPr lang="en-US" dirty="0" smtClean="0"/>
+              <a:t>Write </a:t>
+            </a:r>
+            <a:r>
+              <a:rPr lang="en-US" dirty="0" err="1" smtClean="0"/>
+              <a:t>phpinfo</a:t>
+            </a:r>
+            <a:r>
+              <a:rPr lang="en-US" dirty="0" smtClean="0"/>
+              <a:t>(); on the second line</a:t>
+            </a:r>
+          </a:p>
+          <a:p>
+            <a:r>
+              <a:rPr lang="en-US" dirty="0" smtClean="0"/>
+              <a:t>Close with ?&gt;</a:t>
+            </a:r>
+          </a:p>
+          <a:p>
+            <a:r>
+              <a:rPr lang="en-US" dirty="0" smtClean="0"/>
+              <a:t>Save the file and visit </a:t>
+            </a:r>
+            <a:r>
+              <a:rPr lang="en-US" dirty="0" smtClean="0">
+                <a:hlinkClick r:id="rId3"/>
+              </a:rPr>
+              <a:t>http://localhost:8080/info.php</a:t>
+            </a:r>
+            <a:r>
+              <a:rPr lang="en-US" dirty="0" smtClean="0"/>
+              <a:t> </a:t>
+            </a:r>
+          </a:p>
+        </p:txBody>
+      </p:sp>
+    </p:spTree>
+    <p:extLst>
+      <p:ext uri="{BB962C8B-B14F-4D97-AF65-F5344CB8AC3E}">
+        <p14:creationId xmlns:p14="http://schemas.microsoft.com/office/powerpoint/2010/main" val="2828029901"/>
+      </p:ext>
+    </p:extLst>
+  </p:cSld>
+  <p:clrMapOvr>
+    <a:masterClrMapping/>
+  </p:clrMapOvr>
+  <p:timing>
+    <p:tnLst>
+      <p:par>
+        <p:cTn id="1" dur="indefinite" restart="never" nodeType="tmRoot"/>
+      </p:par>
+    </p:tnLst>
+  </p:timing>
+</p:sld>
+</file>
+
+<file path=ppt/slides/slide22.xml><?xml version="1.0" encoding="utf-8"?>
+<p:sld xmlns:a="http://schemas.openxmlformats.org/drawingml/2006/main" xmlns:r="http://schemas.openxmlformats.org/officeDocument/2006/relationships" xmlns:p="http://schemas.openxmlformats.org/presentationml/2006/main">
+  <p:cSld>
+    <p:spTree>
+      <p:nvGrpSpPr>
+        <p:cNvPr id="1" name=""/>
+        <p:cNvGrpSpPr/>
+        <p:nvPr/>
+      </p:nvGrpSpPr>
+      <p:grpSpPr>
+        <a:xfrm>
+          <a:off x="0" y="0"/>
+          <a:ext cx="0" cy="0"/>
+          <a:chOff x="0" y="0"/>
+          <a:chExt cx="0" cy="0"/>
+        </a:xfrm>
+      </p:grpSpPr>
+      <p:sp>
+        <p:nvSpPr>
+          <p:cNvPr id="6" name="Rectangle 2"/>
+          <p:cNvSpPr>
+            <a:spLocks noGrp="1" noChangeArrowheads="1"/>
+          </p:cNvSpPr>
+          <p:nvPr>
+            <p:ph idx="1"/>
+          </p:nvPr>
+        </p:nvSpPr>
+        <p:spPr bwMode="auto">
+          <a:xfrm>
+            <a:off x="332287" y="508612"/>
+            <a:ext cx="8218170" cy="1915909"/>
+          </a:xfrm>
+          <a:prstGeom prst="rect">
+            <a:avLst/>
+          </a:prstGeom>
+          <a:solidFill>
+            <a:schemeClr val="bg2"/>
+          </a:solidFill>
+          <a:ln>
+            <a:solidFill>
+              <a:schemeClr val="tx1"/>
+            </a:solidFill>
+          </a:ln>
+          <a:effectLst/>
+        </p:spPr>
+        <p:txBody>
+          <a:bodyPr vert="horz" wrap="square" lIns="68580" tIns="34290" rIns="68580" bIns="34290" numCol="1" rtlCol="0" anchor="ctr" anchorCtr="0" compatLnSpc="1">
+            <a:prstTxWarp prst="textNoShape">
+              <a:avLst/>
+            </a:prstTxWarp>
+            <a:spAutoFit/>
+          </a:bodyPr>
+          <a:lstStyle/>
+          <a:p>
+            <a:pPr marL="0" indent="0" defTabSz="685800" eaLnBrk="0" fontAlgn="base" hangingPunct="0">
+              <a:spcBef>
+                <a:spcPct val="0"/>
+              </a:spcBef>
+              <a:spcAft>
+                <a:spcPct val="0"/>
+              </a:spcAft>
+              <a:buNone/>
+            </a:pPr>
+            <a:r>
+              <a:rPr lang="en-US" altLang="en-US" sz="2400" dirty="0">
+                <a:solidFill>
+                  <a:srgbClr val="7F0055"/>
+                </a:solidFill>
+                <a:latin typeface="Arial Unicode MS" panose="020B0604020202020204" pitchFamily="34" charset="-128"/>
+              </a:rPr>
+              <a:t>&lt;?</a:t>
+            </a:r>
+            <a:r>
+              <a:rPr lang="en-US" altLang="en-US" sz="2400" dirty="0" err="1">
+                <a:solidFill>
+                  <a:srgbClr val="7F0055"/>
+                </a:solidFill>
+                <a:latin typeface="Arial Unicode MS" panose="020B0604020202020204" pitchFamily="34" charset="-128"/>
+              </a:rPr>
+              <a:t>php</a:t>
+            </a:r>
+            <a:endParaRPr lang="en-US" altLang="en-US" sz="2400" dirty="0">
+              <a:solidFill>
+                <a:srgbClr val="000000"/>
+              </a:solidFill>
+              <a:latin typeface="Arial Unicode MS" panose="020B0604020202020204" pitchFamily="34" charset="-128"/>
+            </a:endParaRPr>
+          </a:p>
+          <a:p>
+            <a:pPr marL="0" indent="0" defTabSz="685800" eaLnBrk="0" fontAlgn="base" hangingPunct="0">
+              <a:spcBef>
+                <a:spcPct val="0"/>
+              </a:spcBef>
+              <a:spcAft>
+                <a:spcPct val="0"/>
+              </a:spcAft>
+              <a:buNone/>
+            </a:pPr>
+            <a:endParaRPr lang="en-US" altLang="en-US" sz="2400" dirty="0">
+              <a:solidFill>
+                <a:srgbClr val="000000"/>
+              </a:solidFill>
+              <a:latin typeface="Arial Unicode MS" panose="020B0604020202020204" pitchFamily="34" charset="-128"/>
+            </a:endParaRPr>
+          </a:p>
+          <a:p>
+            <a:pPr marL="0" indent="0" defTabSz="685800" eaLnBrk="0" fontAlgn="base" hangingPunct="0">
+              <a:spcBef>
+                <a:spcPct val="0"/>
+              </a:spcBef>
+              <a:spcAft>
+                <a:spcPct val="0"/>
+              </a:spcAft>
+              <a:buNone/>
+            </a:pPr>
+            <a:r>
+              <a:rPr lang="en-US" altLang="en-US" sz="2400" dirty="0" err="1" smtClean="0">
+                <a:solidFill>
+                  <a:srgbClr val="000000"/>
+                </a:solidFill>
+                <a:latin typeface="Arial Unicode MS" panose="020B0604020202020204" pitchFamily="34" charset="-128"/>
+              </a:rPr>
+              <a:t>phpinfo</a:t>
+            </a:r>
+            <a:r>
+              <a:rPr lang="en-US" altLang="en-US" sz="2400" dirty="0" smtClean="0">
+                <a:solidFill>
+                  <a:srgbClr val="000000"/>
+                </a:solidFill>
+                <a:latin typeface="Arial Unicode MS" panose="020B0604020202020204" pitchFamily="34" charset="-128"/>
+              </a:rPr>
+              <a:t>();</a:t>
+            </a:r>
+            <a:endParaRPr lang="en-US" altLang="en-US" sz="2400" dirty="0">
+              <a:solidFill>
+                <a:srgbClr val="000000"/>
+              </a:solidFill>
+              <a:latin typeface="Arial Unicode MS" panose="020B0604020202020204" pitchFamily="34" charset="-128"/>
+            </a:endParaRPr>
+          </a:p>
+          <a:p>
+            <a:pPr marL="0" indent="0" defTabSz="685800" eaLnBrk="0" fontAlgn="base" hangingPunct="0">
+              <a:spcBef>
+                <a:spcPct val="0"/>
+              </a:spcBef>
+              <a:spcAft>
+                <a:spcPct val="0"/>
+              </a:spcAft>
+              <a:buNone/>
+            </a:pPr>
+            <a:endParaRPr lang="en-US" altLang="en-US" sz="2400" dirty="0">
+              <a:solidFill>
+                <a:srgbClr val="000000"/>
+              </a:solidFill>
+              <a:latin typeface="Arial Unicode MS" panose="020B0604020202020204" pitchFamily="34" charset="-128"/>
+            </a:endParaRPr>
+          </a:p>
+          <a:p>
+            <a:pPr marL="0" indent="0" defTabSz="685800" eaLnBrk="0" fontAlgn="base" hangingPunct="0">
+              <a:spcBef>
+                <a:spcPct val="0"/>
+              </a:spcBef>
+              <a:spcAft>
+                <a:spcPct val="0"/>
+              </a:spcAft>
+              <a:buNone/>
+            </a:pPr>
+            <a:r>
+              <a:rPr lang="en-US" altLang="en-US" sz="2400" dirty="0">
+                <a:solidFill>
+                  <a:srgbClr val="000000"/>
+                </a:solidFill>
+                <a:latin typeface="Arial Unicode MS" panose="020B0604020202020204" pitchFamily="34" charset="-128"/>
+              </a:rPr>
+              <a:t>?&gt;</a:t>
+            </a:r>
+            <a:endParaRPr lang="en-US" altLang="en-US" sz="2400" dirty="0">
+              <a:latin typeface="Arial" panose="020B0604020202020204" pitchFamily="34" charset="0"/>
+            </a:endParaRPr>
+          </a:p>
+        </p:txBody>
+      </p:sp>
+      <p:pic>
+        <p:nvPicPr>
+          <p:cNvPr id="2" name="Picture 1"/>
+          <p:cNvPicPr>
+            <a:picLocks noChangeAspect="1"/>
+          </p:cNvPicPr>
+          <p:nvPr/>
+        </p:nvPicPr>
+        <p:blipFill>
+          <a:blip r:embed="rId3">
+            <a:extLst>
+              <a:ext uri="{28A0092B-C50C-407E-A947-70E740481C1C}">
+                <a14:useLocalDpi xmlns:a14="http://schemas.microsoft.com/office/drawing/2010/main" val="0"/>
+              </a:ext>
+            </a:extLst>
+          </a:blip>
+          <a:stretch>
+            <a:fillRect/>
+          </a:stretch>
+        </p:blipFill>
+        <p:spPr>
+          <a:xfrm>
+            <a:off x="961900" y="2562462"/>
+            <a:ext cx="6305797" cy="4295538"/>
+          </a:xfrm>
+          <a:prstGeom prst="rect">
+            <a:avLst/>
+          </a:prstGeom>
+        </p:spPr>
+      </p:pic>
+    </p:spTree>
+    <p:extLst>
+      <p:ext uri="{BB962C8B-B14F-4D97-AF65-F5344CB8AC3E}">
+        <p14:creationId xmlns:p14="http://schemas.microsoft.com/office/powerpoint/2010/main" val="35282351"/>
+      </p:ext>
+    </p:extLst>
+  </p:cSld>
+  <p:clrMapOvr>
+    <a:masterClrMapping/>
+  </p:clrMapOvr>
+  <p:timing>
+    <p:tnLst>
+      <p:par>
+        <p:cTn id="1" dur="indefinite" restart="never" nodeType="tmRoot"/>
+      </p:par>
+    </p:tnLst>
+  </p:timing>
+</p:sld>
+</file>
+
+<file path=ppt/slides/slide23.xml><?xml version="1.0" encoding="utf-8"?>
+<p:sld xmlns:a="http://schemas.openxmlformats.org/drawingml/2006/main" xmlns:r="http://schemas.openxmlformats.org/officeDocument/2006/relationships" xmlns:p="http://schemas.openxmlformats.org/presentationml/2006/main">
+  <p:cSld>
+    <p:spTree>
+      <p:nvGrpSpPr>
+        <p:cNvPr id="1" name=""/>
+        <p:cNvGrpSpPr/>
+        <p:nvPr/>
+      </p:nvGrpSpPr>
+      <p:grpSpPr>
+        <a:xfrm>
+          <a:off x="0" y="0"/>
+          <a:ext cx="0" cy="0"/>
+          <a:chOff x="0" y="0"/>
+          <a:chExt cx="0" cy="0"/>
+        </a:xfrm>
+      </p:grpSpPr>
+      <p:sp>
+        <p:nvSpPr>
+          <p:cNvPr id="4" name="Title 3"/>
+          <p:cNvSpPr>
+            <a:spLocks noGrp="1"/>
+          </p:cNvSpPr>
+          <p:nvPr>
+            <p:ph type="title"/>
+          </p:nvPr>
+        </p:nvSpPr>
+        <p:spPr/>
+        <p:txBody>
+          <a:bodyPr/>
+          <a:lstStyle/>
+          <a:p>
+            <a:r>
+              <a:rPr lang="en-US" dirty="0" smtClean="0"/>
+              <a:t>Testing PHP Code</a:t>
+            </a:r>
+            <a:endParaRPr lang="en-US" dirty="0"/>
+          </a:p>
+        </p:txBody>
+      </p:sp>
+      <p:sp>
+        <p:nvSpPr>
+          <p:cNvPr id="5" name="Content Placeholder 4"/>
+          <p:cNvSpPr>
+            <a:spLocks noGrp="1"/>
+          </p:cNvSpPr>
+          <p:nvPr>
+            <p:ph idx="1"/>
+          </p:nvPr>
+        </p:nvSpPr>
+        <p:spPr/>
+        <p:txBody>
+          <a:bodyPr>
+            <a:normAutofit/>
+          </a:bodyPr>
+          <a:lstStyle/>
+          <a:p>
+            <a:r>
+              <a:rPr lang="en-US" dirty="0" smtClean="0"/>
+              <a:t>Create a file called </a:t>
+            </a:r>
+            <a:r>
+              <a:rPr lang="en-US" dirty="0" err="1" smtClean="0"/>
+              <a:t>hello.php</a:t>
+            </a:r>
+            <a:r>
+              <a:rPr lang="en-US" dirty="0" smtClean="0"/>
+              <a:t> in your document root</a:t>
+            </a:r>
+          </a:p>
+          <a:p>
+            <a:r>
+              <a:rPr lang="en-US" dirty="0" smtClean="0"/>
+              <a:t>Use the opening tag (&lt;?</a:t>
+            </a:r>
+            <a:r>
+              <a:rPr lang="en-US" dirty="0" err="1" smtClean="0"/>
+              <a:t>php</a:t>
+            </a:r>
+            <a:r>
+              <a:rPr lang="en-US" dirty="0" smtClean="0"/>
+              <a:t>) to turn on PHP parsing</a:t>
+            </a:r>
+          </a:p>
+          <a:p>
+            <a:r>
+              <a:rPr lang="en-US" dirty="0" smtClean="0"/>
+              <a:t>Write echo "Hello World"; on the second line</a:t>
+            </a:r>
+          </a:p>
+          <a:p>
+            <a:r>
+              <a:rPr lang="en-US" dirty="0" smtClean="0"/>
+              <a:t>Close with ?&gt;</a:t>
+            </a:r>
+          </a:p>
+          <a:p>
+            <a:r>
+              <a:rPr lang="en-US" dirty="0" smtClean="0"/>
+              <a:t>Save the file and visit </a:t>
+            </a:r>
+            <a:r>
+              <a:rPr lang="en-US" dirty="0" smtClean="0">
+                <a:hlinkClick r:id="rId3"/>
+              </a:rPr>
+              <a:t>http://localhost:8080/hello.php</a:t>
+            </a:r>
+            <a:r>
+              <a:rPr lang="en-US" dirty="0" smtClean="0"/>
+              <a:t> </a:t>
+            </a:r>
+          </a:p>
+        </p:txBody>
+      </p:sp>
+    </p:spTree>
+    <p:extLst>
+      <p:ext uri="{BB962C8B-B14F-4D97-AF65-F5344CB8AC3E}">
+        <p14:creationId xmlns:p14="http://schemas.microsoft.com/office/powerpoint/2010/main" val="2281987020"/>
+      </p:ext>
+    </p:extLst>
+  </p:cSld>
+  <p:clrMapOvr>
+    <a:masterClrMapping/>
+  </p:clrMapOvr>
+  <p:timing>
+    <p:tnLst>
+      <p:par>
+        <p:cTn id="1" dur="indefinite" restart="never" nodeType="tmRoot"/>
+      </p:par>
+    </p:tnLst>
+  </p:timing>
+</p:sld>
+</file>
+
+<file path=ppt/slides/slide24.xml><?xml version="1.0" encoding="utf-8"?>
+<p:sld xmlns:a="http://schemas.openxmlformats.org/drawingml/2006/main" xmlns:r="http://schemas.openxmlformats.org/officeDocument/2006/relationships" xmlns:p="http://schemas.openxmlformats.org/presentationml/2006/main">
+  <p:cSld>
+    <p:spTree>
+      <p:nvGrpSpPr>
+        <p:cNvPr id="1" name=""/>
+        <p:cNvGrpSpPr/>
+        <p:nvPr/>
+      </p:nvGrpSpPr>
+      <p:grpSpPr>
+        <a:xfrm>
+          <a:off x="0" y="0"/>
+          <a:ext cx="0" cy="0"/>
+          <a:chOff x="0" y="0"/>
+          <a:chExt cx="0" cy="0"/>
+        </a:xfrm>
+      </p:grpSpPr>
+      <p:sp>
+        <p:nvSpPr>
+          <p:cNvPr id="6" name="Rectangle 2"/>
+          <p:cNvSpPr>
+            <a:spLocks noGrp="1" noChangeArrowheads="1"/>
+          </p:cNvSpPr>
+          <p:nvPr>
+            <p:ph idx="1"/>
+          </p:nvPr>
+        </p:nvSpPr>
+        <p:spPr bwMode="auto">
+          <a:xfrm>
+            <a:off x="332287" y="508612"/>
+            <a:ext cx="8218170" cy="1915909"/>
+          </a:xfrm>
+          <a:prstGeom prst="rect">
+            <a:avLst/>
+          </a:prstGeom>
+          <a:solidFill>
+            <a:schemeClr val="bg2"/>
+          </a:solidFill>
+          <a:ln>
+            <a:solidFill>
+              <a:schemeClr val="tx1"/>
+            </a:solidFill>
+          </a:ln>
+          <a:effectLst/>
+        </p:spPr>
+        <p:txBody>
+          <a:bodyPr vert="horz" wrap="square" lIns="68580" tIns="34290" rIns="68580" bIns="34290" numCol="1" rtlCol="0" anchor="ctr" anchorCtr="0" compatLnSpc="1">
+            <a:prstTxWarp prst="textNoShape">
+              <a:avLst/>
+            </a:prstTxWarp>
+            <a:spAutoFit/>
+          </a:bodyPr>
+          <a:lstStyle/>
+          <a:p>
+            <a:pPr marL="0" indent="0" defTabSz="685800" eaLnBrk="0" fontAlgn="base" hangingPunct="0">
+              <a:spcBef>
+                <a:spcPct val="0"/>
+              </a:spcBef>
+              <a:spcAft>
+                <a:spcPct val="0"/>
+              </a:spcAft>
+              <a:buNone/>
+            </a:pPr>
+            <a:r>
+              <a:rPr lang="en-US" altLang="en-US" sz="2400" dirty="0">
+                <a:solidFill>
+                  <a:srgbClr val="7F0055"/>
+                </a:solidFill>
+                <a:latin typeface="Arial Unicode MS" panose="020B0604020202020204" pitchFamily="34" charset="-128"/>
+              </a:rPr>
+              <a:t>&lt;?</a:t>
+            </a:r>
+            <a:r>
+              <a:rPr lang="en-US" altLang="en-US" sz="2400" dirty="0" err="1">
+                <a:solidFill>
+                  <a:srgbClr val="7F0055"/>
+                </a:solidFill>
+                <a:latin typeface="Arial Unicode MS" panose="020B0604020202020204" pitchFamily="34" charset="-128"/>
+              </a:rPr>
+              <a:t>php</a:t>
+            </a:r>
+            <a:endParaRPr lang="en-US" altLang="en-US" sz="2400" dirty="0">
+              <a:solidFill>
+                <a:srgbClr val="000000"/>
+              </a:solidFill>
+              <a:latin typeface="Arial Unicode MS" panose="020B0604020202020204" pitchFamily="34" charset="-128"/>
+            </a:endParaRPr>
+          </a:p>
+          <a:p>
+            <a:pPr marL="0" indent="0" defTabSz="685800" eaLnBrk="0" fontAlgn="base" hangingPunct="0">
+              <a:spcBef>
+                <a:spcPct val="0"/>
+              </a:spcBef>
+              <a:spcAft>
+                <a:spcPct val="0"/>
+              </a:spcAft>
+              <a:buNone/>
+            </a:pPr>
+            <a:endParaRPr lang="en-US" altLang="en-US" sz="2400" dirty="0">
+              <a:solidFill>
+                <a:srgbClr val="000000"/>
+              </a:solidFill>
+              <a:latin typeface="Arial Unicode MS" panose="020B0604020202020204" pitchFamily="34" charset="-128"/>
+            </a:endParaRPr>
+          </a:p>
+          <a:p>
+            <a:pPr marL="0" indent="0" defTabSz="685800" eaLnBrk="0" fontAlgn="base" hangingPunct="0">
+              <a:spcBef>
+                <a:spcPct val="0"/>
+              </a:spcBef>
+              <a:spcAft>
+                <a:spcPct val="0"/>
+              </a:spcAft>
+              <a:buNone/>
+            </a:pPr>
+            <a:r>
+              <a:rPr lang="en-US" altLang="en-US" sz="2400" dirty="0" smtClean="0">
+                <a:solidFill>
+                  <a:srgbClr val="000000"/>
+                </a:solidFill>
+                <a:latin typeface="Arial Unicode MS" panose="020B0604020202020204" pitchFamily="34" charset="-128"/>
+              </a:rPr>
+              <a:t>echo "Hello World";</a:t>
+            </a:r>
+            <a:endParaRPr lang="en-US" altLang="en-US" sz="2400" dirty="0">
+              <a:solidFill>
+                <a:srgbClr val="000000"/>
+              </a:solidFill>
+              <a:latin typeface="Arial Unicode MS" panose="020B0604020202020204" pitchFamily="34" charset="-128"/>
+            </a:endParaRPr>
+          </a:p>
+          <a:p>
+            <a:pPr marL="0" indent="0" defTabSz="685800" eaLnBrk="0" fontAlgn="base" hangingPunct="0">
+              <a:spcBef>
+                <a:spcPct val="0"/>
+              </a:spcBef>
+              <a:spcAft>
+                <a:spcPct val="0"/>
+              </a:spcAft>
+              <a:buNone/>
+            </a:pPr>
+            <a:endParaRPr lang="en-US" altLang="en-US" sz="2400" dirty="0">
+              <a:solidFill>
+                <a:srgbClr val="000000"/>
+              </a:solidFill>
+              <a:latin typeface="Arial Unicode MS" panose="020B0604020202020204" pitchFamily="34" charset="-128"/>
+            </a:endParaRPr>
+          </a:p>
+          <a:p>
+            <a:pPr marL="0" indent="0" defTabSz="685800" eaLnBrk="0" fontAlgn="base" hangingPunct="0">
+              <a:spcBef>
+                <a:spcPct val="0"/>
+              </a:spcBef>
+              <a:spcAft>
+                <a:spcPct val="0"/>
+              </a:spcAft>
+              <a:buNone/>
+            </a:pPr>
+            <a:r>
+              <a:rPr lang="en-US" altLang="en-US" sz="2400" dirty="0">
+                <a:solidFill>
+                  <a:srgbClr val="000000"/>
+                </a:solidFill>
+                <a:latin typeface="Arial Unicode MS" panose="020B0604020202020204" pitchFamily="34" charset="-128"/>
+              </a:rPr>
+              <a:t>?&gt;</a:t>
+            </a:r>
+            <a:endParaRPr lang="en-US" altLang="en-US" sz="2400" dirty="0">
+              <a:latin typeface="Arial" panose="020B0604020202020204" pitchFamily="34" charset="0"/>
+            </a:endParaRPr>
+          </a:p>
+        </p:txBody>
+      </p:sp>
+      <p:pic>
+        <p:nvPicPr>
+          <p:cNvPr id="3" name="Picture 2"/>
+          <p:cNvPicPr>
+            <a:picLocks noChangeAspect="1"/>
+          </p:cNvPicPr>
+          <p:nvPr/>
+        </p:nvPicPr>
+        <p:blipFill>
+          <a:blip r:embed="rId3">
+            <a:extLst>
+              <a:ext uri="{28A0092B-C50C-407E-A947-70E740481C1C}">
+                <a14:useLocalDpi xmlns:a14="http://schemas.microsoft.com/office/drawing/2010/main" val="0"/>
+              </a:ext>
+            </a:extLst>
+          </a:blip>
+          <a:stretch>
+            <a:fillRect/>
+          </a:stretch>
+        </p:blipFill>
+        <p:spPr>
+          <a:xfrm>
+            <a:off x="1831483" y="3429000"/>
+            <a:ext cx="4982270" cy="2086266"/>
+          </a:xfrm>
+          <a:prstGeom prst="rect">
+            <a:avLst/>
+          </a:prstGeom>
+        </p:spPr>
+      </p:pic>
+    </p:spTree>
+    <p:extLst>
+      <p:ext uri="{BB962C8B-B14F-4D97-AF65-F5344CB8AC3E}">
+        <p14:creationId xmlns:p14="http://schemas.microsoft.com/office/powerpoint/2010/main" val="2067309977"/>
+      </p:ext>
+    </p:extLst>
+  </p:cSld>
+  <p:clrMapOvr>
+    <a:masterClrMapping/>
+  </p:clrMapOvr>
+  <p:timing>
+    <p:tnLst>
+      <p:par>
+        <p:cTn id="1" dur="indefinite" restart="never" nodeType="tmRoot"/>
+      </p:par>
+    </p:tnLst>
+  </p:timing>
+</p:sld>
+</file>
+
+<file path=ppt/slides/slide3.xml><?xml version="1.0" encoding="utf-8"?>
+<p:sld xmlns:a="http://schemas.openxmlformats.org/drawingml/2006/main" xmlns:r="http://schemas.openxmlformats.org/officeDocument/2006/relationships" xmlns:p="http://schemas.openxmlformats.org/presentationml/2006/main">
+  <p:cSld>
+    <p:spTree>
+      <p:nvGrpSpPr>
+        <p:cNvPr id="1" name=""/>
+        <p:cNvGrpSpPr/>
+        <p:nvPr/>
+      </p:nvGrpSpPr>
+      <p:grpSpPr>
+        <a:xfrm>
+          <a:off x="0" y="0"/>
+          <a:ext cx="0" cy="0"/>
+          <a:chOff x="0" y="0"/>
+          <a:chExt cx="0" cy="0"/>
+        </a:xfrm>
+      </p:grpSpPr>
+      <p:sp>
+        <p:nvSpPr>
+          <p:cNvPr id="2" name="Title 1"/>
+          <p:cNvSpPr>
+            <a:spLocks noGrp="1"/>
+          </p:cNvSpPr>
+          <p:nvPr>
+            <p:ph type="title"/>
+          </p:nvPr>
+        </p:nvSpPr>
+        <p:spPr/>
+        <p:txBody>
+          <a:bodyPr/>
+          <a:lstStyle/>
+          <a:p>
+            <a:r>
+              <a:rPr lang="en-US" dirty="0" smtClean="0"/>
+              <a:t>The Tools</a:t>
+            </a:r>
+            <a:endParaRPr lang="en-US" dirty="0"/>
+          </a:p>
+        </p:txBody>
+      </p:sp>
+      <p:sp>
+        <p:nvSpPr>
+          <p:cNvPr id="3" name="Content Placeholder 2"/>
+          <p:cNvSpPr>
+            <a:spLocks noGrp="1"/>
+          </p:cNvSpPr>
+          <p:nvPr>
+            <p:ph idx="1"/>
+          </p:nvPr>
+        </p:nvSpPr>
+        <p:spPr/>
+        <p:txBody>
+          <a:bodyPr/>
+          <a:lstStyle/>
+          <a:p>
+            <a:r>
+              <a:rPr lang="en-US" dirty="0" smtClean="0"/>
+              <a:t>Komodo Edit – </a:t>
+            </a:r>
+          </a:p>
+          <a:p>
+            <a:pPr lvl="1"/>
+            <a:r>
+              <a:rPr lang="en-US" dirty="0" smtClean="0"/>
+              <a:t>cross platform text editing tool</a:t>
+            </a:r>
+          </a:p>
+          <a:p>
+            <a:pPr lvl="1"/>
+            <a:r>
+              <a:rPr lang="en-US" dirty="0" smtClean="0"/>
+              <a:t>can use any other text editing tool you're already comfortable with, as long as it has support for PHP</a:t>
+            </a:r>
+          </a:p>
+          <a:p>
+            <a:r>
+              <a:rPr lang="en-US" dirty="0" smtClean="0"/>
+              <a:t>DB Browser for SQLite –</a:t>
+            </a:r>
+          </a:p>
+          <a:p>
+            <a:pPr lvl="1"/>
+            <a:r>
+              <a:rPr lang="en-US" dirty="0" smtClean="0"/>
+              <a:t>cross platform </a:t>
+            </a:r>
+            <a:r>
+              <a:rPr lang="en-US" dirty="0" err="1" smtClean="0"/>
+              <a:t>sqlite</a:t>
+            </a:r>
+            <a:r>
+              <a:rPr lang="en-US" dirty="0" smtClean="0"/>
+              <a:t> database </a:t>
+            </a:r>
+            <a:r>
+              <a:rPr lang="en-US" dirty="0" err="1" smtClean="0"/>
+              <a:t>gui</a:t>
+            </a:r>
+            <a:endParaRPr lang="en-US" dirty="0" smtClean="0"/>
+          </a:p>
+          <a:p>
+            <a:pPr lvl="1"/>
+            <a:r>
+              <a:rPr lang="en-US" dirty="0" smtClean="0"/>
+              <a:t>makes learning and working with </a:t>
+            </a:r>
+            <a:r>
+              <a:rPr lang="en-US" dirty="0" err="1" smtClean="0"/>
+              <a:t>sqlite</a:t>
+            </a:r>
+            <a:r>
+              <a:rPr lang="en-US" dirty="0" smtClean="0"/>
+              <a:t> easy</a:t>
+            </a:r>
+            <a:endParaRPr lang="en-US" dirty="0"/>
+          </a:p>
+        </p:txBody>
+      </p:sp>
+    </p:spTree>
+    <p:extLst>
+      <p:ext uri="{BB962C8B-B14F-4D97-AF65-F5344CB8AC3E}">
+        <p14:creationId xmlns:p14="http://schemas.microsoft.com/office/powerpoint/2010/main" val="26060531"/>
+      </p:ext>
+    </p:extLst>
+  </p:cSld>
+  <p:clrMapOvr>
+    <a:masterClrMapping/>
+  </p:clrMapOvr>
+  <p:timing>
+    <p:tnLst>
+      <p:par>
+        <p:cTn id="1" dur="indefinite" restart="never" nodeType="tmRoot"/>
+      </p:par>
+    </p:tnLst>
+  </p:timing>
+</p:sld>
+</file>
+
+<file path=ppt/slides/slide4.xml><?xml version="1.0" encoding="utf-8"?>
+<p:sld xmlns:a="http://schemas.openxmlformats.org/drawingml/2006/main" xmlns:r="http://schemas.openxmlformats.org/officeDocument/2006/relationships" xmlns:p="http://schemas.openxmlformats.org/presentationml/2006/main">
+  <p:cSld>
+    <p:spTree>
+      <p:nvGrpSpPr>
+        <p:cNvPr id="1" name=""/>
+        <p:cNvGrpSpPr/>
+        <p:nvPr/>
+      </p:nvGrpSpPr>
+      <p:grpSpPr>
+        <a:xfrm>
+          <a:off x="0" y="0"/>
+          <a:ext cx="0" cy="0"/>
+          <a:chOff x="0" y="0"/>
+          <a:chExt cx="0" cy="0"/>
+        </a:xfrm>
+      </p:grpSpPr>
+      <p:sp>
+        <p:nvSpPr>
+          <p:cNvPr id="2" name="Title 1"/>
+          <p:cNvSpPr>
+            <a:spLocks noGrp="1"/>
+          </p:cNvSpPr>
+          <p:nvPr>
+            <p:ph type="title"/>
+          </p:nvPr>
+        </p:nvSpPr>
+        <p:spPr/>
+        <p:txBody>
+          <a:bodyPr/>
+          <a:lstStyle/>
+          <a:p>
+            <a:r>
+              <a:rPr lang="en-US" dirty="0" smtClean="0"/>
+              <a:t>The goal</a:t>
+            </a:r>
+            <a:endParaRPr lang="en-US" dirty="0"/>
+          </a:p>
+        </p:txBody>
+      </p:sp>
+      <p:sp>
+        <p:nvSpPr>
+          <p:cNvPr id="3" name="Content Placeholder 2"/>
+          <p:cNvSpPr>
+            <a:spLocks noGrp="1"/>
+          </p:cNvSpPr>
+          <p:nvPr>
+            <p:ph idx="1"/>
+          </p:nvPr>
+        </p:nvSpPr>
+        <p:spPr/>
+        <p:txBody>
+          <a:bodyPr/>
+          <a:lstStyle/>
+          <a:p>
+            <a:r>
+              <a:rPr lang="en-US" dirty="0" smtClean="0"/>
+              <a:t>A running PHP webserver</a:t>
+            </a:r>
+          </a:p>
+          <a:p>
+            <a:r>
+              <a:rPr lang="en-US" dirty="0" smtClean="0"/>
+              <a:t>A directory where you can put code, run it through PHP, and view it in your browser</a:t>
+            </a:r>
+          </a:p>
+          <a:p>
+            <a:r>
+              <a:rPr lang="en-US" dirty="0" smtClean="0"/>
+              <a:t>Test with </a:t>
+            </a:r>
+            <a:r>
+              <a:rPr lang="en-US" dirty="0" err="1" smtClean="0"/>
+              <a:t>phpinfo</a:t>
+            </a:r>
+            <a:r>
+              <a:rPr lang="en-US" dirty="0" smtClean="0"/>
+              <a:t> and hello world scripts</a:t>
+            </a:r>
+            <a:endParaRPr lang="en-US" dirty="0"/>
+          </a:p>
+        </p:txBody>
+      </p:sp>
+    </p:spTree>
+    <p:extLst>
+      <p:ext uri="{BB962C8B-B14F-4D97-AF65-F5344CB8AC3E}">
+        <p14:creationId xmlns:p14="http://schemas.microsoft.com/office/powerpoint/2010/main" val="3073677649"/>
+      </p:ext>
+    </p:extLst>
+  </p:cSld>
+  <p:clrMapOvr>
+    <a:masterClrMapping/>
+  </p:clrMapOvr>
+  <p:timing>
+    <p:tnLst>
+      <p:par>
+        <p:cTn id="1" dur="indefinite" restart="never" nodeType="tmRoot"/>
+      </p:par>
+    </p:tnLst>
+  </p:timing>
+</p:sld>
+</file>
+
+<file path=ppt/slides/slide5.xml><?xml version="1.0" encoding="utf-8"?>
 <p:sld xmlns:a="http://schemas.openxmlformats.org/drawingml/2006/main" xmlns:r="http://schemas.openxmlformats.org/officeDocument/2006/relationships" xmlns:p="http://schemas.openxmlformats.org/presentationml/2006/main">
   <p:cSld>
     <p:spTree>
@@ -4231,270 +7799,13 @@
   <p:clrMapOvr>
     <a:masterClrMapping/>
   </p:clrMapOvr>
-</p:sld>
-</file>
-
-<file path=ppt/slides/slide3.xml><?xml version="1.0" encoding="utf-8"?>
-<p:sld xmlns:a="http://schemas.openxmlformats.org/drawingml/2006/main" xmlns:r="http://schemas.openxmlformats.org/officeDocument/2006/relationships" xmlns:p="http://schemas.openxmlformats.org/presentationml/2006/main">
-  <p:cSld>
-    <p:spTree>
-      <p:nvGrpSpPr>
-        <p:cNvPr id="1" name=""/>
-        <p:cNvGrpSpPr/>
-        <p:nvPr/>
-      </p:nvGrpSpPr>
-      <p:grpSpPr>
-        <a:xfrm>
-          <a:off x="0" y="0"/>
-          <a:ext cx="0" cy="0"/>
-          <a:chOff x="0" y="0"/>
-          <a:chExt cx="0" cy="0"/>
-        </a:xfrm>
-      </p:grpSpPr>
-      <p:sp>
-        <p:nvSpPr>
-          <p:cNvPr id="2" name="Title 1"/>
-          <p:cNvSpPr>
-            <a:spLocks noGrp="1"/>
-          </p:cNvSpPr>
-          <p:nvPr>
-            <p:ph type="title"/>
-          </p:nvPr>
-        </p:nvSpPr>
-        <p:spPr/>
-        <p:txBody>
-          <a:bodyPr/>
-          <a:lstStyle/>
-          <a:p>
-            <a:r>
-              <a:rPr lang="en-US" dirty="0" smtClean="0"/>
-              <a:t>Windows</a:t>
-            </a:r>
-            <a:endParaRPr lang="en-US" dirty="0"/>
-          </a:p>
-        </p:txBody>
-      </p:sp>
-      <p:pic>
-        <p:nvPicPr>
-          <p:cNvPr id="4" name="Content Placeholder 3" descr="Windows_logo_-_2012.png"/>
-          <p:cNvPicPr>
-            <a:picLocks noGrp="1" noChangeAspect="1"/>
-          </p:cNvPicPr>
-          <p:nvPr>
-            <p:ph idx="1"/>
-          </p:nvPr>
-        </p:nvPicPr>
-        <p:blipFill>
-          <a:blip r:embed="rId3">
-            <a:extLst>
-              <a:ext uri="{28A0092B-C50C-407E-A947-70E740481C1C}">
-                <a14:useLocalDpi xmlns:a14="http://schemas.microsoft.com/office/drawing/2010/main" val="0"/>
-              </a:ext>
-            </a:extLst>
-          </a:blip>
-          <a:srcRect l="-49674" r="-49674"/>
-          <a:stretch>
-            <a:fillRect/>
-          </a:stretch>
-        </p:blipFill>
-        <p:spPr/>
-      </p:pic>
-    </p:spTree>
-    <p:extLst>
-      <p:ext uri="{BB962C8B-B14F-4D97-AF65-F5344CB8AC3E}">
-        <p14:creationId xmlns:p14="http://schemas.microsoft.com/office/powerpoint/2010/main" val="4003632236"/>
-      </p:ext>
-    </p:extLst>
-  </p:cSld>
-  <p:clrMapOvr>
-    <a:masterClrMapping/>
-  </p:clrMapOvr>
-</p:sld>
-</file>
-
-<file path=ppt/slides/slide4.xml><?xml version="1.0" encoding="utf-8"?>
-<p:sld xmlns:a="http://schemas.openxmlformats.org/drawingml/2006/main" xmlns:r="http://schemas.openxmlformats.org/officeDocument/2006/relationships" xmlns:p="http://schemas.openxmlformats.org/presentationml/2006/main">
-  <p:cSld>
-    <p:spTree>
-      <p:nvGrpSpPr>
-        <p:cNvPr id="1" name=""/>
-        <p:cNvGrpSpPr/>
-        <p:nvPr/>
-      </p:nvGrpSpPr>
-      <p:grpSpPr>
-        <a:xfrm>
-          <a:off x="0" y="0"/>
-          <a:ext cx="0" cy="0"/>
-          <a:chOff x="0" y="0"/>
-          <a:chExt cx="0" cy="0"/>
-        </a:xfrm>
-      </p:grpSpPr>
-      <p:sp>
-        <p:nvSpPr>
-          <p:cNvPr id="2" name="Title 1"/>
-          <p:cNvSpPr>
-            <a:spLocks noGrp="1"/>
-          </p:cNvSpPr>
-          <p:nvPr>
-            <p:ph type="title"/>
-          </p:nvPr>
-        </p:nvSpPr>
-        <p:spPr/>
-        <p:txBody>
-          <a:bodyPr/>
-          <a:lstStyle/>
-          <a:p>
-            <a:r>
-              <a:rPr lang="en-US" dirty="0" smtClean="0"/>
-              <a:t>Download the Package</a:t>
-            </a:r>
-            <a:endParaRPr lang="en-US" dirty="0"/>
-          </a:p>
-        </p:txBody>
-      </p:sp>
-      <p:sp>
-        <p:nvSpPr>
-          <p:cNvPr id="3" name="Content Placeholder 2"/>
-          <p:cNvSpPr>
-            <a:spLocks noGrp="1"/>
-          </p:cNvSpPr>
-          <p:nvPr>
-            <p:ph idx="1"/>
-          </p:nvPr>
-        </p:nvSpPr>
-        <p:spPr/>
-        <p:txBody>
-          <a:bodyPr/>
-          <a:lstStyle/>
-          <a:p>
-            <a:r>
-              <a:rPr lang="en-US" dirty="0" smtClean="0"/>
-              <a:t>Includes a stripped down PHP executable</a:t>
-            </a:r>
-          </a:p>
-          <a:p>
-            <a:r>
-              <a:rPr lang="en-US" dirty="0" smtClean="0"/>
-              <a:t>Includes a batch file to run the built in server and serve from the code directory inside</a:t>
-            </a:r>
-          </a:p>
-          <a:p>
-            <a:r>
-              <a:rPr lang="en-US" dirty="0" smtClean="0"/>
-              <a:t>You can alter the code location if you choose in the batch file</a:t>
-            </a:r>
-          </a:p>
-          <a:p>
-            <a:r>
-              <a:rPr lang="en-US" dirty="0" smtClean="0"/>
-              <a:t>Includes a portable install of komodo edit and </a:t>
-            </a:r>
-            <a:r>
-              <a:rPr lang="en-US" dirty="0" err="1" smtClean="0"/>
-              <a:t>db</a:t>
-            </a:r>
-            <a:r>
-              <a:rPr lang="en-US" dirty="0" smtClean="0"/>
-              <a:t> browser for </a:t>
-            </a:r>
-            <a:r>
-              <a:rPr lang="en-US" dirty="0" err="1" smtClean="0"/>
-              <a:t>sqlite</a:t>
-            </a:r>
-            <a:endParaRPr lang="en-US" dirty="0"/>
-          </a:p>
-        </p:txBody>
-      </p:sp>
-    </p:spTree>
-    <p:extLst>
-      <p:ext uri="{BB962C8B-B14F-4D97-AF65-F5344CB8AC3E}">
-        <p14:creationId xmlns:p14="http://schemas.microsoft.com/office/powerpoint/2010/main" val="3423475601"/>
-      </p:ext>
-    </p:extLst>
-  </p:cSld>
-  <p:clrMapOvr>
-    <a:masterClrMapping/>
-  </p:clrMapOvr>
-</p:sld>
-</file>
-
-<file path=ppt/slides/slide5.xml><?xml version="1.0" encoding="utf-8"?>
-<p:sld xmlns:a="http://schemas.openxmlformats.org/drawingml/2006/main" xmlns:r="http://schemas.openxmlformats.org/officeDocument/2006/relationships" xmlns:p="http://schemas.openxmlformats.org/presentationml/2006/main">
-  <p:cSld>
-    <p:spTree>
-      <p:nvGrpSpPr>
-        <p:cNvPr id="1" name=""/>
-        <p:cNvGrpSpPr/>
-        <p:nvPr/>
-      </p:nvGrpSpPr>
-      <p:grpSpPr>
-        <a:xfrm>
-          <a:off x="0" y="0"/>
-          <a:ext cx="0" cy="0"/>
-          <a:chOff x="0" y="0"/>
-          <a:chExt cx="0" cy="0"/>
-        </a:xfrm>
-      </p:grpSpPr>
-      <p:sp>
-        <p:nvSpPr>
-          <p:cNvPr id="2" name="Title 1"/>
-          <p:cNvSpPr>
-            <a:spLocks noGrp="1"/>
-          </p:cNvSpPr>
-          <p:nvPr>
-            <p:ph type="title"/>
-          </p:nvPr>
-        </p:nvSpPr>
-        <p:spPr/>
-        <p:txBody>
-          <a:bodyPr/>
-          <a:lstStyle/>
-          <a:p>
-            <a:r>
-              <a:rPr lang="en-US" dirty="0" smtClean="0"/>
-              <a:t>Do it by hand</a:t>
-            </a:r>
-            <a:endParaRPr lang="en-US" dirty="0"/>
-          </a:p>
-        </p:txBody>
-      </p:sp>
-      <p:sp>
-        <p:nvSpPr>
-          <p:cNvPr id="3" name="Content Placeholder 2"/>
-          <p:cNvSpPr>
-            <a:spLocks noGrp="1"/>
-          </p:cNvSpPr>
-          <p:nvPr>
-            <p:ph idx="1"/>
-          </p:nvPr>
-        </p:nvSpPr>
-        <p:spPr/>
-        <p:txBody>
-          <a:bodyPr/>
-          <a:lstStyle/>
-          <a:p>
-            <a:r>
-              <a:rPr lang="en-US" dirty="0" smtClean="0"/>
-              <a:t>download komodo edit </a:t>
-            </a:r>
-            <a:r>
-              <a:rPr lang="en-US" smtClean="0"/>
-              <a:t>from http://</a:t>
-            </a:r>
-            <a:endParaRPr lang="en-US"/>
-          </a:p>
-        </p:txBody>
-      </p:sp>
-    </p:spTree>
-    <p:extLst>
-      <p:ext uri="{BB962C8B-B14F-4D97-AF65-F5344CB8AC3E}">
-        <p14:creationId xmlns:p14="http://schemas.microsoft.com/office/powerpoint/2010/main" val="3703654712"/>
-      </p:ext>
-    </p:extLst>
-  </p:cSld>
-  <p:clrMapOvr>
-    <a:masterClrMapping/>
-  </p:clrMapOvr>
+  <p:timing>
+    <p:tnLst>
+      <p:par>
+        <p:cTn id="1" dur="indefinite" restart="never" nodeType="tmRoot"/>
+      </p:par>
+    </p:tnLst>
+  </p:timing>
 </p:sld>
 </file>
 
@@ -4532,47 +7843,121 @@
           <a:p>
             <a:r>
               <a:rPr lang="en-US" dirty="0" smtClean="0"/>
-              <a:t>Linux (Ubuntu)</a:t>
+              <a:t>Installation</a:t>
             </a:r>
             <a:endParaRPr lang="en-US" dirty="0"/>
           </a:p>
         </p:txBody>
       </p:sp>
-      <p:pic>
-        <p:nvPicPr>
-          <p:cNvPr id="4" name="Content Placeholder 3" descr="Ubuntu_Logo.png"/>
-          <p:cNvPicPr>
-            <a:picLocks noGrp="1" noChangeAspect="1"/>
-          </p:cNvPicPr>
+      <p:sp>
+        <p:nvSpPr>
+          <p:cNvPr id="3" name="Content Placeholder 2"/>
+          <p:cNvSpPr>
+            <a:spLocks noGrp="1"/>
+          </p:cNvSpPr>
           <p:nvPr>
             <p:ph idx="1"/>
           </p:nvPr>
-        </p:nvPicPr>
-        <p:blipFill>
-          <a:blip r:embed="rId3">
-            <a:extLst>
-              <a:ext uri="{28A0092B-C50C-407E-A947-70E740481C1C}">
-                <a14:useLocalDpi xmlns:a14="http://schemas.microsoft.com/office/drawing/2010/main" val="0"/>
-              </a:ext>
-            </a:extLst>
-          </a:blip>
-          <a:srcRect l="-40915" r="-40915"/>
-          <a:stretch>
-            <a:fillRect/>
-          </a:stretch>
-        </p:blipFill>
-        <p:spPr/>
-      </p:pic>
+        </p:nvSpPr>
+        <p:spPr/>
+        <p:txBody>
+          <a:bodyPr/>
+          <a:lstStyle/>
+          <a:p>
+            <a:r>
+              <a:rPr lang="en-US" dirty="0" smtClean="0"/>
+              <a:t>check if </a:t>
+            </a:r>
+            <a:r>
+              <a:rPr lang="en-US" dirty="0" err="1" smtClean="0"/>
+              <a:t>php</a:t>
+            </a:r>
+            <a:r>
+              <a:rPr lang="en-US" dirty="0" smtClean="0"/>
+              <a:t> is already </a:t>
+            </a:r>
+            <a:r>
+              <a:rPr lang="en-US" dirty="0" smtClean="0"/>
+              <a:t>installed and the right version</a:t>
+            </a:r>
+            <a:endParaRPr lang="en-US" dirty="0" smtClean="0"/>
+          </a:p>
+          <a:p>
+            <a:r>
+              <a:rPr lang="en-US" dirty="0" smtClean="0"/>
+              <a:t>check if </a:t>
+            </a:r>
+            <a:r>
+              <a:rPr lang="en-US" dirty="0" err="1" smtClean="0"/>
+              <a:t>sqlite</a:t>
+            </a:r>
+            <a:r>
+              <a:rPr lang="en-US" dirty="0" smtClean="0"/>
+              <a:t> is available</a:t>
+            </a:r>
+          </a:p>
+          <a:p>
+            <a:r>
+              <a:rPr lang="en-US" dirty="0" smtClean="0"/>
+              <a:t>run the built in </a:t>
+            </a:r>
+            <a:r>
+              <a:rPr lang="en-US" dirty="0" err="1" smtClean="0"/>
+              <a:t>php</a:t>
+            </a:r>
+            <a:r>
+              <a:rPr lang="en-US" dirty="0" smtClean="0"/>
+              <a:t> webserver, make sure it works</a:t>
+            </a:r>
+          </a:p>
+          <a:p>
+            <a:r>
+              <a:rPr lang="en-US" dirty="0" smtClean="0"/>
+              <a:t>Install your text editor, if not already set up</a:t>
+            </a:r>
+          </a:p>
+          <a:p>
+            <a:r>
+              <a:rPr lang="en-US" dirty="0" smtClean="0"/>
+              <a:t>Install </a:t>
+            </a:r>
+            <a:r>
+              <a:rPr lang="en-US" dirty="0" err="1" smtClean="0"/>
+              <a:t>db</a:t>
+            </a:r>
+            <a:r>
+              <a:rPr lang="en-US" dirty="0" smtClean="0"/>
+              <a:t> browser for </a:t>
+            </a:r>
+            <a:r>
+              <a:rPr lang="en-US" dirty="0" err="1" smtClean="0"/>
+              <a:t>sqlite</a:t>
+            </a:r>
+            <a:r>
+              <a:rPr lang="en-US" dirty="0" smtClean="0"/>
+              <a:t>, if not already set up</a:t>
+            </a:r>
+            <a:endParaRPr lang="en-US" dirty="0"/>
+          </a:p>
+        </p:txBody>
+      </p:sp>
     </p:spTree>
     <p:extLst>
       <p:ext uri="{BB962C8B-B14F-4D97-AF65-F5344CB8AC3E}">
-        <p14:creationId xmlns:p14="http://schemas.microsoft.com/office/powerpoint/2010/main" val="3063094544"/>
+        <p14:creationId xmlns:p14="http://schemas.microsoft.com/office/powerpoint/2010/main" val="4043785249"/>
       </p:ext>
     </p:extLst>
   </p:cSld>
   <p:clrMapOvr>
     <a:masterClrMapping/>
   </p:clrMapOvr>
+  <p:timing>
+    <p:tnLst>
+      <p:par>
+        <p:cTn id="1" dur="indefinite" restart="never" nodeType="tmRoot"/>
+      </p:par>
+    </p:tnLst>
+  </p:timing>
 </p:sld>
 </file>
 
@@ -4610,101 +7995,54 @@
           <a:p>
             <a:r>
               <a:rPr lang="en-US" dirty="0" smtClean="0"/>
-              <a:t>Items needed</a:t>
+              <a:t>Windows</a:t>
             </a:r>
             <a:endParaRPr lang="en-US" dirty="0"/>
           </a:p>
         </p:txBody>
       </p:sp>
-      <p:sp>
-        <p:nvSpPr>
-          <p:cNvPr id="3" name="Content Placeholder 2"/>
-          <p:cNvSpPr>
-            <a:spLocks noGrp="1"/>
-          </p:cNvSpPr>
+      <p:pic>
+        <p:nvPicPr>
+          <p:cNvPr id="4" name="Content Placeholder 3" descr="Windows_logo_-_2012.png"/>
+          <p:cNvPicPr>
+            <a:picLocks noGrp="1" noChangeAspect="1"/>
+          </p:cNvPicPr>
           <p:nvPr>
             <p:ph idx="1"/>
           </p:nvPr>
-        </p:nvSpPr>
-        <p:spPr/>
-        <p:txBody>
-          <a:bodyPr/>
-          <a:lstStyle/>
-          <a:p>
-            <a:r>
-              <a:rPr lang="en-US" dirty="0" err="1" smtClean="0"/>
-              <a:t>php</a:t>
-            </a:r>
-            <a:r>
-              <a:rPr lang="en-US" dirty="0" smtClean="0"/>
-              <a:t> 5.6 (cli)</a:t>
-            </a:r>
-          </a:p>
-          <a:p>
-            <a:r>
-              <a:rPr lang="en-US" dirty="0" err="1" smtClean="0"/>
-              <a:t>pdo_sqlite</a:t>
-            </a:r>
-            <a:r>
-              <a:rPr lang="en-US" dirty="0" smtClean="0"/>
-              <a:t> extension</a:t>
-            </a:r>
-          </a:p>
-          <a:p>
-            <a:r>
-              <a:rPr lang="en-US" dirty="0" err="1" smtClean="0"/>
-              <a:t>db</a:t>
-            </a:r>
-            <a:r>
-              <a:rPr lang="en-US" dirty="0" smtClean="0"/>
-              <a:t> browser for </a:t>
-            </a:r>
-            <a:r>
-              <a:rPr lang="en-US" dirty="0" err="1" smtClean="0"/>
-              <a:t>sqlite</a:t>
-            </a:r>
-            <a:endParaRPr lang="en-US" dirty="0" smtClean="0"/>
-          </a:p>
-          <a:p>
-            <a:r>
-              <a:rPr lang="en-US" dirty="0" smtClean="0"/>
-              <a:t>komodo edit (or text editor of choice)</a:t>
-            </a:r>
-          </a:p>
-          <a:p>
-            <a:pPr lvl="1"/>
-            <a:r>
-              <a:rPr lang="en-US" dirty="0" smtClean="0"/>
-              <a:t>vim</a:t>
-            </a:r>
-          </a:p>
-          <a:p>
-            <a:pPr lvl="1"/>
-            <a:r>
-              <a:rPr lang="en-US" dirty="0" smtClean="0"/>
-              <a:t>eclipse</a:t>
-            </a:r>
-          </a:p>
-          <a:p>
-            <a:pPr lvl="1"/>
-            <a:r>
-              <a:rPr lang="en-US" dirty="0" err="1" smtClean="0"/>
-              <a:t>phpstorm</a:t>
-            </a:r>
-            <a:endParaRPr lang="en-US" dirty="0" smtClean="0"/>
-          </a:p>
-        </p:txBody>
-      </p:sp>
+        </p:nvPicPr>
+        <p:blipFill>
+          <a:blip r:embed="rId3">
+            <a:extLst>
+              <a:ext uri="{28A0092B-C50C-407E-A947-70E740481C1C}">
+                <a14:useLocalDpi xmlns:a14="http://schemas.microsoft.com/office/drawing/2010/main" val="0"/>
+              </a:ext>
+            </a:extLst>
+          </a:blip>
+          <a:srcRect l="-49674" r="-49674"/>
+          <a:stretch>
+            <a:fillRect/>
+          </a:stretch>
+        </p:blipFill>
+        <p:spPr/>
+      </p:pic>
     </p:spTree>
     <p:extLst>
       <p:ext uri="{BB962C8B-B14F-4D97-AF65-F5344CB8AC3E}">
-        <p14:creationId xmlns:p14="http://schemas.microsoft.com/office/powerpoint/2010/main" val="2211426217"/>
+        <p14:creationId xmlns:p14="http://schemas.microsoft.com/office/powerpoint/2010/main" val="4003632236"/>
       </p:ext>
     </p:extLst>
   </p:cSld>
   <p:clrMapOvr>
     <a:masterClrMapping/>
   </p:clrMapOvr>
+  <p:timing>
+    <p:tnLst>
+      <p:par>
+        <p:cTn id="1" dur="indefinite" restart="never" nodeType="tmRoot"/>
+      </p:par>
+    </p:tnLst>
+  </p:timing>
 </p:sld>
 </file>
 
@@ -4742,7 +8080,7 @@
           <a:p>
             <a:r>
               <a:rPr lang="en-US" dirty="0" smtClean="0"/>
-              <a:t>Installation</a:t>
+              <a:t>The Windows Package</a:t>
             </a:r>
             <a:endParaRPr lang="en-US" dirty="0"/>
           </a:p>
@@ -4765,71 +8103,37 @@
           <a:p>
             <a:r>
               <a:rPr lang="en-US" dirty="0" smtClean="0"/>
-              <a:t>check if </a:t>
+              <a:t>Includes a stripped down PHP executable</a:t>
+            </a:r>
+          </a:p>
+          <a:p>
+            <a:r>
+              <a:rPr lang="en-US" dirty="0" smtClean="0"/>
+              <a:t>Includes a batch file to run the built in server and serve from the code directory inside</a:t>
+            </a:r>
+          </a:p>
+          <a:p>
+            <a:r>
+              <a:rPr lang="en-US" dirty="0" smtClean="0"/>
+              <a:t>You can alter the code location if you choose in the batch file</a:t>
+            </a:r>
+          </a:p>
+          <a:p>
+            <a:r>
+              <a:rPr lang="en-US" dirty="0" smtClean="0"/>
+              <a:t>Includes a portable install of komodo edit and </a:t>
             </a:r>
             <a:r>
               <a:rPr lang="en-US" dirty="0" err="1" smtClean="0"/>
-              <a:t>php</a:t>
-            </a:r>
-            <a:r>
-              <a:rPr lang="en-US" dirty="0" smtClean="0"/>
-              <a:t> is already installed</a:t>
-            </a:r>
-          </a:p>
-          <a:p>
-            <a:r>
-              <a:rPr lang="en-US" dirty="0" smtClean="0"/>
-              <a:t>check if </a:t>
+              <a:t>db</a:t>
+            </a:r>
+            <a:r>
+              <a:rPr lang="en-US" dirty="0" smtClean="0"/>
+              <a:t> browser for </a:t>
             </a:r>
             <a:r>
               <a:rPr lang="en-US" dirty="0" err="1" smtClean="0"/>
               <a:t>sqlite</a:t>
-            </a:r>
-            <a:r>
-              <a:rPr lang="en-US" dirty="0" smtClean="0"/>
-              <a:t> is available</a:t>
-            </a:r>
-          </a:p>
-          <a:p>
-            <a:r>
-              <a:rPr lang="en-US" dirty="0" smtClean="0"/>
-              <a:t>run the built in </a:t>
-            </a:r>
-            <a:r>
-              <a:rPr lang="en-US" dirty="0" err="1" smtClean="0"/>
-              <a:t>php</a:t>
-            </a:r>
-            <a:r>
-              <a:rPr lang="en-US" dirty="0" smtClean="0"/>
-              <a:t> webserver, make sure it works</a:t>
-            </a:r>
-          </a:p>
-          <a:p>
-            <a:r>
-              <a:rPr lang="en-US" dirty="0" smtClean="0"/>
-              <a:t>Install your text editor, if not already set up</a:t>
-            </a:r>
-          </a:p>
-          <a:p>
-            <a:r>
-              <a:rPr lang="en-US" dirty="0" smtClean="0"/>
-              <a:t>Install </a:t>
-            </a:r>
-            <a:r>
-              <a:rPr lang="en-US" dirty="0" err="1" smtClean="0"/>
-              <a:t>db</a:t>
-            </a:r>
-            <a:r>
-              <a:rPr lang="en-US" dirty="0" smtClean="0"/>
-              <a:t> browser for </a:t>
-            </a:r>
-            <a:r>
-              <a:rPr lang="en-US" dirty="0" err="1" smtClean="0"/>
-              <a:t>sqlite</a:t>
-            </a:r>
-            <a:r>
-              <a:rPr lang="en-US" dirty="0" smtClean="0"/>
-              <a:t>, if not already set up</a:t>
             </a:r>
             <a:endParaRPr lang="en-US" dirty="0"/>
           </a:p>
@@ -4838,13 +8142,146 @@
     </p:spTree>
     <p:extLst>
       <p:ext uri="{BB962C8B-B14F-4D97-AF65-F5344CB8AC3E}">
-        <p14:creationId xmlns:p14="http://schemas.microsoft.com/office/powerpoint/2010/main" val="3537609734"/>
+        <p14:creationId xmlns:p14="http://schemas.microsoft.com/office/powerpoint/2010/main" val="3423475601"/>
       </p:ext>
     </p:extLst>
   </p:cSld>
   <p:clrMapOvr>
     <a:masterClrMapping/>
   </p:clrMapOvr>
+  <p:timing>
+    <p:tnLst>
+      <p:par>
+        <p:cTn id="1" dur="indefinite" restart="never" nodeType="tmRoot"/>
+      </p:par>
+    </p:tnLst>
+  </p:timing>
+</p:sld>
+</file>
+
+<file path=ppt/slides/slide9.xml><?xml version="1.0" encoding="utf-8"?>
+<p:sld xmlns:a="http://schemas.openxmlformats.org/drawingml/2006/main" xmlns:r="http://schemas.openxmlformats.org/officeDocument/2006/relationships" xmlns:p="http://schemas.openxmlformats.org/presentationml/2006/main">
+  <p:cSld>
+    <p:spTree>
+      <p:nvGrpSpPr>
+        <p:cNvPr id="1" name=""/>
+        <p:cNvGrpSpPr/>
+        <p:nvPr/>
+      </p:nvGrpSpPr>
+      <p:grpSpPr>
+        <a:xfrm>
+          <a:off x="0" y="0"/>
+          <a:ext cx="0" cy="0"/>
+          <a:chOff x="0" y="0"/>
+          <a:chExt cx="0" cy="0"/>
+        </a:xfrm>
+      </p:grpSpPr>
+      <p:sp>
+        <p:nvSpPr>
+          <p:cNvPr id="2" name="Title 1"/>
+          <p:cNvSpPr>
+            <a:spLocks noGrp="1"/>
+          </p:cNvSpPr>
+          <p:nvPr>
+            <p:ph type="title"/>
+          </p:nvPr>
+        </p:nvSpPr>
+        <p:spPr/>
+        <p:txBody>
+          <a:bodyPr/>
+          <a:lstStyle/>
+          <a:p>
+            <a:r>
+              <a:rPr lang="en-US" dirty="0" smtClean="0"/>
+              <a:t>Installing from the Package</a:t>
+            </a:r>
+            <a:endParaRPr lang="en-US" dirty="0"/>
+          </a:p>
+        </p:txBody>
+      </p:sp>
+      <p:sp>
+        <p:nvSpPr>
+          <p:cNvPr id="3" name="Content Placeholder 2"/>
+          <p:cNvSpPr>
+            <a:spLocks noGrp="1"/>
+          </p:cNvSpPr>
+          <p:nvPr>
+            <p:ph idx="1"/>
+          </p:nvPr>
+        </p:nvSpPr>
+        <p:spPr/>
+        <p:txBody>
+          <a:bodyPr>
+            <a:normAutofit lnSpcReduction="10000"/>
+          </a:bodyPr>
+          <a:lstStyle/>
+          <a:p>
+            <a:r>
+              <a:rPr lang="en-US" dirty="0" smtClean="0"/>
+              <a:t>Download the package or get from a jump drive – </a:t>
+            </a:r>
+          </a:p>
+          <a:p>
+            <a:pPr lvl="1"/>
+            <a:r>
+              <a:rPr lang="en-US" dirty="0" smtClean="0"/>
+              <a:t>link here when it's done</a:t>
+            </a:r>
+          </a:p>
+          <a:p>
+            <a:r>
+              <a:rPr lang="en-US" dirty="0" smtClean="0"/>
+              <a:t>Unzip the contents</a:t>
+            </a:r>
+          </a:p>
+          <a:p>
+            <a:r>
+              <a:rPr lang="en-US" dirty="0" smtClean="0"/>
+              <a:t>Click on the "run.bat" file</a:t>
+            </a:r>
+          </a:p>
+          <a:p>
+            <a:r>
+              <a:rPr lang="en-US" dirty="0" smtClean="0"/>
+              <a:t>It will open a window, do NOT close it, that will shut down your server</a:t>
+            </a:r>
+          </a:p>
+          <a:p>
+            <a:r>
+              <a:rPr lang="en-US" dirty="0" smtClean="0"/>
+              <a:t>Open your browser and go to </a:t>
+            </a:r>
+            <a:r>
+              <a:rPr lang="en-US" dirty="0" smtClean="0">
+                <a:hlinkClick r:id="rId3"/>
+              </a:rPr>
+              <a:t>http://localhost:8080</a:t>
+            </a:r>
+            <a:r>
+              <a:rPr lang="en-US" dirty="0" smtClean="0"/>
+              <a:t> </a:t>
+            </a:r>
+            <a:endParaRPr lang="en-US" dirty="0"/>
+          </a:p>
+        </p:txBody>
+      </p:sp>
+    </p:spTree>
+    <p:extLst>
+      <p:ext uri="{BB962C8B-B14F-4D97-AF65-F5344CB8AC3E}">
+        <p14:creationId xmlns:p14="http://schemas.microsoft.com/office/powerpoint/2010/main" val="2499706733"/>
+      </p:ext>
+    </p:extLst>
+  </p:cSld>
+  <p:clrMapOvr>
+    <a:masterClrMapping/>
+  </p:clrMapOvr>
+  <p:timing>
+    <p:tnLst>
+      <p:par>
+        <p:cTn id="1" dur="indefinite" restart="never" nodeType="tmRoot"/>
+      </p:par>
+    </p:tnLst>
+  </p:timing>
 </p:sld>
 </file>
 

</xml_diff>

<commit_message>
Setup files and exported pdf for binary release
</commit_message>
<xml_diff>
--- a/course/0 - Setup/Setup.pptx
+++ b/course/0 - Setup/Setup.pptx
@@ -5,7 +5,7 @@
     <p:sldMasterId id="2147483648" r:id="rId1"/>
   </p:sldMasterIdLst>
   <p:notesMasterIdLst>
-    <p:notesMasterId r:id="rId26"/>
+    <p:notesMasterId r:id="rId30"/>
   </p:notesMasterIdLst>
   <p:sldIdLst>
     <p:sldId id="256" r:id="rId2"/>
@@ -13,25 +13,29 @@
     <p:sldId id="273" r:id="rId4"/>
     <p:sldId id="274" r:id="rId5"/>
     <p:sldId id="257" r:id="rId6"/>
-    <p:sldId id="281" r:id="rId7"/>
-    <p:sldId id="258" r:id="rId8"/>
-    <p:sldId id="262" r:id="rId9"/>
-    <p:sldId id="267" r:id="rId10"/>
-    <p:sldId id="268" r:id="rId11"/>
-    <p:sldId id="265" r:id="rId12"/>
-    <p:sldId id="269" r:id="rId13"/>
-    <p:sldId id="270" r:id="rId14"/>
-    <p:sldId id="266" r:id="rId15"/>
-    <p:sldId id="271" r:id="rId16"/>
-    <p:sldId id="263" r:id="rId17"/>
-    <p:sldId id="264" r:id="rId18"/>
-    <p:sldId id="259" r:id="rId19"/>
-    <p:sldId id="261" r:id="rId20"/>
-    <p:sldId id="277" r:id="rId21"/>
-    <p:sldId id="278" r:id="rId22"/>
-    <p:sldId id="276" r:id="rId23"/>
-    <p:sldId id="279" r:id="rId24"/>
-    <p:sldId id="280" r:id="rId25"/>
+    <p:sldId id="285" r:id="rId7"/>
+    <p:sldId id="286" r:id="rId8"/>
+    <p:sldId id="284" r:id="rId9"/>
+    <p:sldId id="258" r:id="rId10"/>
+    <p:sldId id="262" r:id="rId11"/>
+    <p:sldId id="267" r:id="rId12"/>
+    <p:sldId id="268" r:id="rId13"/>
+    <p:sldId id="265" r:id="rId14"/>
+    <p:sldId id="269" r:id="rId15"/>
+    <p:sldId id="270" r:id="rId16"/>
+    <p:sldId id="266" r:id="rId17"/>
+    <p:sldId id="271" r:id="rId18"/>
+    <p:sldId id="263" r:id="rId19"/>
+    <p:sldId id="264" r:id="rId20"/>
+    <p:sldId id="259" r:id="rId21"/>
+    <p:sldId id="282" r:id="rId22"/>
+    <p:sldId id="283" r:id="rId23"/>
+    <p:sldId id="261" r:id="rId24"/>
+    <p:sldId id="277" r:id="rId25"/>
+    <p:sldId id="278" r:id="rId26"/>
+    <p:sldId id="276" r:id="rId27"/>
+    <p:sldId id="279" r:id="rId28"/>
+    <p:sldId id="280" r:id="rId29"/>
   </p:sldIdLst>
   <p:sldSz cx="9144000" cy="6858000" type="screen4x3"/>
   <p:notesSz cx="6858000" cy="9144000"/>
@@ -140,7 +144,9 @@
             <p14:sldId id="273"/>
             <p14:sldId id="274"/>
             <p14:sldId id="257"/>
-            <p14:sldId id="281"/>
+            <p14:sldId id="285"/>
+            <p14:sldId id="286"/>
+            <p14:sldId id="284"/>
             <p14:sldId id="258"/>
             <p14:sldId id="262"/>
             <p14:sldId id="267"/>
@@ -153,6 +159,8 @@
             <p14:sldId id="263"/>
             <p14:sldId id="264"/>
             <p14:sldId id="259"/>
+            <p14:sldId id="282"/>
+            <p14:sldId id="283"/>
             <p14:sldId id="261"/>
             <p14:sldId id="277"/>
             <p14:sldId id="278"/>
@@ -263,7 +271,7 @@
           <a:p>
             <a:fld id="{E759826C-CDF1-1343-846F-5EC65008665E}" type="datetimeFigureOut">
               <a:rPr lang="en-US" smtClean="0"/>
-              <a:t>3/28/2015</a:t>
+              <a:t>4/13/2015</a:t>
             </a:fld>
             <a:endParaRPr lang="en-US"/>
           </a:p>
@@ -697,7 +705,7 @@
     </p:spTree>
     <p:extLst>
       <p:ext uri="{BB962C8B-B14F-4D97-AF65-F5344CB8AC3E}">
-        <p14:creationId xmlns:p14="http://schemas.microsoft.com/office/powerpoint/2010/main" val="4222441541"/>
+        <p14:creationId xmlns:p14="http://schemas.microsoft.com/office/powerpoint/2010/main" val="1690993758"/>
       </p:ext>
     </p:extLst>
   </p:cSld>
@@ -781,7 +789,7 @@
     </p:spTree>
     <p:extLst>
       <p:ext uri="{BB962C8B-B14F-4D97-AF65-F5344CB8AC3E}">
-        <p14:creationId xmlns:p14="http://schemas.microsoft.com/office/powerpoint/2010/main" val="2541437675"/>
+        <p14:creationId xmlns:p14="http://schemas.microsoft.com/office/powerpoint/2010/main" val="2022242866"/>
       </p:ext>
     </p:extLst>
   </p:cSld>
@@ -865,7 +873,7 @@
     </p:spTree>
     <p:extLst>
       <p:ext uri="{BB962C8B-B14F-4D97-AF65-F5344CB8AC3E}">
-        <p14:creationId xmlns:p14="http://schemas.microsoft.com/office/powerpoint/2010/main" val="636899950"/>
+        <p14:creationId xmlns:p14="http://schemas.microsoft.com/office/powerpoint/2010/main" val="4222441541"/>
       </p:ext>
     </p:extLst>
   </p:cSld>
@@ -919,37 +927,6 @@
           <a:bodyPr/>
           <a:lstStyle/>
           <a:p>
-            <a:pPr marL="0" marR="0" indent="0" algn="l" defTabSz="457200" rtl="0" eaLnBrk="1" fontAlgn="auto" latinLnBrk="0" hangingPunct="1">
-              <a:lnSpc>
-                <a:spcPct val="100000"/>
-              </a:lnSpc>
-              <a:spcBef>
-                <a:spcPts val="0"/>
-              </a:spcBef>
-              <a:spcAft>
-                <a:spcPts val="0"/>
-              </a:spcAft>
-              <a:buClrTx/>
-              <a:buSzTx/>
-              <a:buFontTx/>
-              <a:buNone/>
-              <a:tabLst/>
-              <a:defRPr/>
-            </a:pPr>
-            <a:r>
-              <a:rPr lang="en-US" dirty="0" smtClean="0"/>
-              <a:t>(this is already present in the windows package, on </a:t>
-            </a:r>
-            <a:r>
-              <a:rPr lang="en-US" dirty="0" err="1" smtClean="0"/>
-              <a:t>linux</a:t>
-            </a:r>
-            <a:r>
-              <a:rPr lang="en-US" dirty="0" smtClean="0"/>
-              <a:t> or mac it's the path you used when you started the webserver)</a:t>
-            </a:r>
-          </a:p>
-          <a:p>
             <a:endParaRPr lang="en-US" dirty="0"/>
           </a:p>
         </p:txBody>
@@ -971,7 +948,7 @@
           <a:p>
             <a:fld id="{84A452C3-0BE2-3E46-BBC2-652C991B87BC}" type="slidenum">
               <a:rPr lang="en-US" smtClean="0"/>
-              <a:t>21</a:t>
+              <a:t>22</a:t>
             </a:fld>
             <a:endParaRPr lang="en-US"/>
           </a:p>
@@ -980,7 +957,7 @@
     </p:spTree>
     <p:extLst>
       <p:ext uri="{BB962C8B-B14F-4D97-AF65-F5344CB8AC3E}">
-        <p14:creationId xmlns:p14="http://schemas.microsoft.com/office/powerpoint/2010/main" val="3108985399"/>
+        <p14:creationId xmlns:p14="http://schemas.microsoft.com/office/powerpoint/2010/main" val="1013400182"/>
       </p:ext>
     </p:extLst>
   </p:cSld>
@@ -1035,150 +1012,30 @@
           <a:lstStyle/>
           <a:p>
             <a:r>
-              <a:rPr kumimoji="0" lang="en-US" altLang="en-US" sz="1200" b="0" i="0" u="none" strike="noStrike" cap="none" normalizeH="0" baseline="0" dirty="0" smtClean="0">
-                <a:ln>
-                  <a:noFill/>
-                </a:ln>
-                <a:solidFill>
-                  <a:srgbClr val="3F7F59"/>
-                </a:solidFill>
-                <a:effectLst/>
-                <a:latin typeface="Arial Unicode MS" panose="020B0604020202020204" pitchFamily="34" charset="-128"/>
-              </a:rPr>
-              <a:t>The first item shows assignment</a:t>
-            </a:r>
-            <a:r>
-              <a:rPr kumimoji="0" lang="en-US" altLang="en-US" sz="1200" b="0" i="0" u="none" strike="noStrike" cap="none" normalizeH="0" baseline="0" dirty="0" smtClean="0">
-                <a:ln>
-                  <a:noFill/>
-                </a:ln>
-                <a:solidFill>
-                  <a:srgbClr val="000000"/>
-                </a:solidFill>
-                <a:effectLst/>
-                <a:latin typeface="Arial Unicode MS" panose="020B0604020202020204" pitchFamily="34" charset="-128"/>
-              </a:rPr>
-              <a:t> </a:t>
-            </a:r>
-          </a:p>
-          <a:p>
-            <a:r>
-              <a:rPr kumimoji="0" lang="en-US" altLang="en-US" sz="1200" b="0" i="0" u="none" strike="noStrike" cap="none" normalizeH="0" baseline="0" dirty="0" smtClean="0">
-                <a:ln>
-                  <a:noFill/>
-                </a:ln>
-                <a:solidFill>
-                  <a:srgbClr val="3F7F59"/>
-                </a:solidFill>
-                <a:effectLst/>
-                <a:latin typeface="Arial Unicode MS" panose="020B0604020202020204" pitchFamily="34" charset="-128"/>
-              </a:rPr>
-              <a:t>This is doing something with the variable</a:t>
-            </a:r>
-          </a:p>
-          <a:p>
-            <a:r>
-              <a:rPr kumimoji="0" lang="en-US" altLang="en-US" sz="1200" b="0" i="0" u="none" strike="noStrike" cap="none" normalizeH="0" baseline="0" dirty="0" smtClean="0">
-                <a:ln>
-                  <a:noFill/>
-                </a:ln>
-                <a:solidFill>
-                  <a:srgbClr val="3F7F59"/>
-                </a:solidFill>
-                <a:effectLst/>
-                <a:latin typeface="Arial Unicode MS" panose="020B0604020202020204" pitchFamily="34" charset="-128"/>
-              </a:rPr>
-              <a:t>This will cause a PHP Notice to be show</a:t>
-            </a:r>
-            <a:r>
-              <a:rPr kumimoji="0" lang="en-US" altLang="en-US" sz="1200" b="0" i="0" u="none" strike="noStrike" cap="none" normalizeH="0" baseline="0" dirty="0" smtClean="0">
-                <a:ln>
-                  <a:noFill/>
-                </a:ln>
-                <a:solidFill>
-                  <a:schemeClr val="tx1"/>
-                </a:solidFill>
-                <a:effectLst/>
-                <a:latin typeface="+mn-lt"/>
-              </a:rPr>
-              <a:t>n</a:t>
-            </a:r>
-          </a:p>
-          <a:p>
-            <a:endParaRPr kumimoji="0" lang="en-US" altLang="en-US" sz="1200" b="0" i="0" u="none" strike="noStrike" cap="none" normalizeH="0" baseline="0" dirty="0" smtClean="0">
-              <a:ln>
-                <a:noFill/>
-              </a:ln>
-              <a:solidFill>
-                <a:schemeClr val="tx1"/>
-              </a:solidFill>
-              <a:effectLst/>
-              <a:latin typeface="+mn-lt"/>
-            </a:endParaRPr>
-          </a:p>
-          <a:p>
-            <a:r>
-              <a:rPr kumimoji="0" lang="en-US" altLang="en-US" sz="1200" b="0" i="0" u="none" strike="noStrike" cap="none" normalizeH="0" baseline="0" dirty="0" smtClean="0">
-                <a:ln>
-                  <a:noFill/>
-                </a:ln>
-                <a:solidFill>
-                  <a:schemeClr val="tx1"/>
-                </a:solidFill>
-                <a:effectLst/>
-                <a:latin typeface="+mn-lt"/>
-              </a:rPr>
-              <a:t>by default it is given a null value</a:t>
-            </a:r>
-          </a:p>
-          <a:p>
-            <a:endParaRPr kumimoji="0" lang="en-US" altLang="en-US" sz="1200" b="0" i="0" u="none" strike="noStrike" cap="none" normalizeH="0" baseline="0" dirty="0" smtClean="0">
-              <a:ln>
-                <a:noFill/>
-              </a:ln>
-              <a:solidFill>
-                <a:schemeClr val="tx1"/>
-              </a:solidFill>
-              <a:effectLst/>
-              <a:latin typeface="+mn-lt"/>
-            </a:endParaRPr>
-          </a:p>
-          <a:p>
-            <a:r>
-              <a:rPr kumimoji="0" lang="en-US" altLang="en-US" sz="1200" b="0" i="0" u="none" strike="noStrike" cap="none" normalizeH="0" baseline="0" dirty="0" smtClean="0">
-                <a:ln>
-                  <a:noFill/>
-                </a:ln>
-                <a:solidFill>
-                  <a:schemeClr val="tx1"/>
-                </a:solidFill>
-                <a:effectLst/>
-                <a:latin typeface="+mn-lt"/>
-              </a:rPr>
-              <a:t>Output:</a:t>
-            </a:r>
-          </a:p>
-          <a:p>
-            <a:r>
-              <a:rPr lang="en-US" dirty="0" smtClean="0"/>
-              <a:t>1</a:t>
-            </a:r>
-          </a:p>
-          <a:p>
-            <a:r>
-              <a:rPr lang="en-US" dirty="0" smtClean="0"/>
-              <a:t>Notice: Undefined variable: missing in {filename} on line 7</a:t>
-            </a:r>
-            <a:endParaRPr kumimoji="0" lang="en-US" altLang="en-US" sz="1200" b="0" i="0" u="none" strike="noStrike" cap="none" normalizeH="0" baseline="0" dirty="0" smtClean="0">
-              <a:ln>
-                <a:noFill/>
-              </a:ln>
-              <a:solidFill>
-                <a:schemeClr val="tx1"/>
-              </a:solidFill>
-              <a:effectLst/>
-              <a:latin typeface="Arial" panose="020B0604020202020204" pitchFamily="34" charset="0"/>
-            </a:endParaRPr>
+              <a:rPr lang="en-US" dirty="0" smtClean="0"/>
+              <a:t>There should be builds available for both these tools,</a:t>
+            </a:r>
+            <a:r>
+              <a:rPr lang="en-US" baseline="0" dirty="0" smtClean="0"/>
+              <a:t> you can build </a:t>
+            </a:r>
+            <a:r>
+              <a:rPr lang="en-US" baseline="0" dirty="0" err="1" smtClean="0"/>
+              <a:t>sqlitebrowser</a:t>
+            </a:r>
+            <a:r>
+              <a:rPr lang="en-US" baseline="0" dirty="0" smtClean="0"/>
+              <a:t> from a recent </a:t>
+            </a:r>
+            <a:r>
+              <a:rPr lang="en-US" baseline="0" dirty="0" err="1" smtClean="0"/>
+              <a:t>git</a:t>
+            </a:r>
+            <a:r>
+              <a:rPr lang="en-US" baseline="0" dirty="0" smtClean="0"/>
+              <a:t> checkout as well</a:t>
+            </a:r>
+            <a:endParaRPr lang="en-US" dirty="0"/>
           </a:p>
         </p:txBody>
       </p:sp>
@@ -1197,9 +1054,9 @@
           <a:bodyPr/>
           <a:lstStyle/>
           <a:p>
-            <a:fld id="{E51715A9-EB64-4481-89E4-A64020E86A42}" type="slidenum">
-              <a:rPr lang="en-US" smtClean="0"/>
-              <a:t>22</a:t>
+            <a:fld id="{84A452C3-0BE2-3E46-BBC2-652C991B87BC}" type="slidenum">
+              <a:rPr lang="en-US" smtClean="0"/>
+              <a:t>23</a:t>
             </a:fld>
             <a:endParaRPr lang="en-US"/>
           </a:p>
@@ -1208,7 +1065,7 @@
     </p:spTree>
     <p:extLst>
       <p:ext uri="{BB962C8B-B14F-4D97-AF65-F5344CB8AC3E}">
-        <p14:creationId xmlns:p14="http://schemas.microsoft.com/office/powerpoint/2010/main" val="84181288"/>
+        <p14:creationId xmlns:p14="http://schemas.microsoft.com/office/powerpoint/2010/main" val="2541437675"/>
       </p:ext>
     </p:extLst>
   </p:cSld>
@@ -1283,7 +1140,7 @@
           <a:p>
             <a:fld id="{84A452C3-0BE2-3E46-BBC2-652C991B87BC}" type="slidenum">
               <a:rPr lang="en-US" smtClean="0"/>
-              <a:t>23</a:t>
+              <a:t>24</a:t>
             </a:fld>
             <a:endParaRPr lang="en-US"/>
           </a:p>
@@ -1292,7 +1149,7 @@
     </p:spTree>
     <p:extLst>
       <p:ext uri="{BB962C8B-B14F-4D97-AF65-F5344CB8AC3E}">
-        <p14:creationId xmlns:p14="http://schemas.microsoft.com/office/powerpoint/2010/main" val="1259845975"/>
+        <p14:creationId xmlns:p14="http://schemas.microsoft.com/office/powerpoint/2010/main" val="636899950"/>
       </p:ext>
     </p:extLst>
   </p:cSld>
@@ -1346,6 +1203,433 @@
           <a:bodyPr/>
           <a:lstStyle/>
           <a:p>
+            <a:pPr marL="0" marR="0" indent="0" algn="l" defTabSz="457200" rtl="0" eaLnBrk="1" fontAlgn="auto" latinLnBrk="0" hangingPunct="1">
+              <a:lnSpc>
+                <a:spcPct val="100000"/>
+              </a:lnSpc>
+              <a:spcBef>
+                <a:spcPts val="0"/>
+              </a:spcBef>
+              <a:spcAft>
+                <a:spcPts val="0"/>
+              </a:spcAft>
+              <a:buClrTx/>
+              <a:buSzTx/>
+              <a:buFontTx/>
+              <a:buNone/>
+              <a:tabLst/>
+              <a:defRPr/>
+            </a:pPr>
+            <a:r>
+              <a:rPr lang="en-US" dirty="0" smtClean="0"/>
+              <a:t>(this is already present in the windows package, on </a:t>
+            </a:r>
+            <a:r>
+              <a:rPr lang="en-US" dirty="0" err="1" smtClean="0"/>
+              <a:t>linux</a:t>
+            </a:r>
+            <a:r>
+              <a:rPr lang="en-US" dirty="0" smtClean="0"/>
+              <a:t> or mac it's the path you used when you started the webserver)</a:t>
+            </a:r>
+          </a:p>
+          <a:p>
+            <a:endParaRPr lang="en-US" dirty="0"/>
+          </a:p>
+        </p:txBody>
+      </p:sp>
+      <p:sp>
+        <p:nvSpPr>
+          <p:cNvPr id="4" name="Slide Number Placeholder 3"/>
+          <p:cNvSpPr>
+            <a:spLocks noGrp="1"/>
+          </p:cNvSpPr>
+          <p:nvPr>
+            <p:ph type="sldNum" sz="quarter" idx="10"/>
+          </p:nvPr>
+        </p:nvSpPr>
+        <p:spPr/>
+        <p:txBody>
+          <a:bodyPr/>
+          <a:lstStyle/>
+          <a:p>
+            <a:fld id="{84A452C3-0BE2-3E46-BBC2-652C991B87BC}" type="slidenum">
+              <a:rPr lang="en-US" smtClean="0"/>
+              <a:t>25</a:t>
+            </a:fld>
+            <a:endParaRPr lang="en-US"/>
+          </a:p>
+        </p:txBody>
+      </p:sp>
+    </p:spTree>
+    <p:extLst>
+      <p:ext uri="{BB962C8B-B14F-4D97-AF65-F5344CB8AC3E}">
+        <p14:creationId xmlns:p14="http://schemas.microsoft.com/office/powerpoint/2010/main" val="3108985399"/>
+      </p:ext>
+    </p:extLst>
+  </p:cSld>
+  <p:clrMapOvr>
+    <a:masterClrMapping/>
+  </p:clrMapOvr>
+</p:notes>
+</file>
+
+<file path=ppt/notesSlides/notesSlide17.xml><?xml version="1.0" encoding="utf-8"?>
+<p:notes xmlns:a="http://schemas.openxmlformats.org/drawingml/2006/main" xmlns:r="http://schemas.openxmlformats.org/officeDocument/2006/relationships" xmlns:p="http://schemas.openxmlformats.org/presentationml/2006/main">
+  <p:cSld>
+    <p:spTree>
+      <p:nvGrpSpPr>
+        <p:cNvPr id="1" name=""/>
+        <p:cNvGrpSpPr/>
+        <p:nvPr/>
+      </p:nvGrpSpPr>
+      <p:grpSpPr>
+        <a:xfrm>
+          <a:off x="0" y="0"/>
+          <a:ext cx="0" cy="0"/>
+          <a:chOff x="0" y="0"/>
+          <a:chExt cx="0" cy="0"/>
+        </a:xfrm>
+      </p:grpSpPr>
+      <p:sp>
+        <p:nvSpPr>
+          <p:cNvPr id="2" name="Slide Image Placeholder 1"/>
+          <p:cNvSpPr>
+            <a:spLocks noGrp="1" noRot="1" noChangeAspect="1"/>
+          </p:cNvSpPr>
+          <p:nvPr>
+            <p:ph type="sldImg"/>
+          </p:nvPr>
+        </p:nvSpPr>
+        <p:spPr/>
+      </p:sp>
+      <p:sp>
+        <p:nvSpPr>
+          <p:cNvPr id="3" name="Notes Placeholder 2"/>
+          <p:cNvSpPr>
+            <a:spLocks noGrp="1"/>
+          </p:cNvSpPr>
+          <p:nvPr>
+            <p:ph type="body" idx="1"/>
+          </p:nvPr>
+        </p:nvSpPr>
+        <p:spPr/>
+        <p:txBody>
+          <a:bodyPr/>
+          <a:lstStyle/>
+          <a:p>
+            <a:r>
+              <a:rPr kumimoji="0" lang="en-US" altLang="en-US" sz="1200" b="0" i="0" u="none" strike="noStrike" cap="none" normalizeH="0" baseline="0" dirty="0" smtClean="0">
+                <a:ln>
+                  <a:noFill/>
+                </a:ln>
+                <a:solidFill>
+                  <a:srgbClr val="3F7F59"/>
+                </a:solidFill>
+                <a:effectLst/>
+                <a:latin typeface="Arial Unicode MS" panose="020B0604020202020204" pitchFamily="34" charset="-128"/>
+              </a:rPr>
+              <a:t>The first item shows assignment</a:t>
+            </a:r>
+            <a:r>
+              <a:rPr kumimoji="0" lang="en-US" altLang="en-US" sz="1200" b="0" i="0" u="none" strike="noStrike" cap="none" normalizeH="0" baseline="0" dirty="0" smtClean="0">
+                <a:ln>
+                  <a:noFill/>
+                </a:ln>
+                <a:solidFill>
+                  <a:srgbClr val="000000"/>
+                </a:solidFill>
+                <a:effectLst/>
+                <a:latin typeface="Arial Unicode MS" panose="020B0604020202020204" pitchFamily="34" charset="-128"/>
+              </a:rPr>
+              <a:t> </a:t>
+            </a:r>
+          </a:p>
+          <a:p>
+            <a:r>
+              <a:rPr kumimoji="0" lang="en-US" altLang="en-US" sz="1200" b="0" i="0" u="none" strike="noStrike" cap="none" normalizeH="0" baseline="0" dirty="0" smtClean="0">
+                <a:ln>
+                  <a:noFill/>
+                </a:ln>
+                <a:solidFill>
+                  <a:srgbClr val="3F7F59"/>
+                </a:solidFill>
+                <a:effectLst/>
+                <a:latin typeface="Arial Unicode MS" panose="020B0604020202020204" pitchFamily="34" charset="-128"/>
+              </a:rPr>
+              <a:t>This is doing something with the variable</a:t>
+            </a:r>
+          </a:p>
+          <a:p>
+            <a:r>
+              <a:rPr kumimoji="0" lang="en-US" altLang="en-US" sz="1200" b="0" i="0" u="none" strike="noStrike" cap="none" normalizeH="0" baseline="0" dirty="0" smtClean="0">
+                <a:ln>
+                  <a:noFill/>
+                </a:ln>
+                <a:solidFill>
+                  <a:srgbClr val="3F7F59"/>
+                </a:solidFill>
+                <a:effectLst/>
+                <a:latin typeface="Arial Unicode MS" panose="020B0604020202020204" pitchFamily="34" charset="-128"/>
+              </a:rPr>
+              <a:t>This will cause a PHP Notice to be show</a:t>
+            </a:r>
+            <a:r>
+              <a:rPr kumimoji="0" lang="en-US" altLang="en-US" sz="1200" b="0" i="0" u="none" strike="noStrike" cap="none" normalizeH="0" baseline="0" dirty="0" smtClean="0">
+                <a:ln>
+                  <a:noFill/>
+                </a:ln>
+                <a:solidFill>
+                  <a:schemeClr val="tx1"/>
+                </a:solidFill>
+                <a:effectLst/>
+                <a:latin typeface="+mn-lt"/>
+              </a:rPr>
+              <a:t>n</a:t>
+            </a:r>
+          </a:p>
+          <a:p>
+            <a:endParaRPr kumimoji="0" lang="en-US" altLang="en-US" sz="1200" b="0" i="0" u="none" strike="noStrike" cap="none" normalizeH="0" baseline="0" dirty="0" smtClean="0">
+              <a:ln>
+                <a:noFill/>
+              </a:ln>
+              <a:solidFill>
+                <a:schemeClr val="tx1"/>
+              </a:solidFill>
+              <a:effectLst/>
+              <a:latin typeface="+mn-lt"/>
+            </a:endParaRPr>
+          </a:p>
+          <a:p>
+            <a:r>
+              <a:rPr kumimoji="0" lang="en-US" altLang="en-US" sz="1200" b="0" i="0" u="none" strike="noStrike" cap="none" normalizeH="0" baseline="0" dirty="0" smtClean="0">
+                <a:ln>
+                  <a:noFill/>
+                </a:ln>
+                <a:solidFill>
+                  <a:schemeClr val="tx1"/>
+                </a:solidFill>
+                <a:effectLst/>
+                <a:latin typeface="+mn-lt"/>
+              </a:rPr>
+              <a:t>by default it is given a null value</a:t>
+            </a:r>
+          </a:p>
+          <a:p>
+            <a:endParaRPr kumimoji="0" lang="en-US" altLang="en-US" sz="1200" b="0" i="0" u="none" strike="noStrike" cap="none" normalizeH="0" baseline="0" dirty="0" smtClean="0">
+              <a:ln>
+                <a:noFill/>
+              </a:ln>
+              <a:solidFill>
+                <a:schemeClr val="tx1"/>
+              </a:solidFill>
+              <a:effectLst/>
+              <a:latin typeface="+mn-lt"/>
+            </a:endParaRPr>
+          </a:p>
+          <a:p>
+            <a:r>
+              <a:rPr kumimoji="0" lang="en-US" altLang="en-US" sz="1200" b="0" i="0" u="none" strike="noStrike" cap="none" normalizeH="0" baseline="0" dirty="0" smtClean="0">
+                <a:ln>
+                  <a:noFill/>
+                </a:ln>
+                <a:solidFill>
+                  <a:schemeClr val="tx1"/>
+                </a:solidFill>
+                <a:effectLst/>
+                <a:latin typeface="+mn-lt"/>
+              </a:rPr>
+              <a:t>Output:</a:t>
+            </a:r>
+          </a:p>
+          <a:p>
+            <a:r>
+              <a:rPr lang="en-US" dirty="0" smtClean="0"/>
+              <a:t>1</a:t>
+            </a:r>
+          </a:p>
+          <a:p>
+            <a:r>
+              <a:rPr lang="en-US" dirty="0" smtClean="0"/>
+              <a:t>Notice: Undefined variable: missing in {filename} on line 7</a:t>
+            </a:r>
+            <a:endParaRPr kumimoji="0" lang="en-US" altLang="en-US" sz="1200" b="0" i="0" u="none" strike="noStrike" cap="none" normalizeH="0" baseline="0" dirty="0" smtClean="0">
+              <a:ln>
+                <a:noFill/>
+              </a:ln>
+              <a:solidFill>
+                <a:schemeClr val="tx1"/>
+              </a:solidFill>
+              <a:effectLst/>
+              <a:latin typeface="Arial" panose="020B0604020202020204" pitchFamily="34" charset="0"/>
+            </a:endParaRPr>
+          </a:p>
+        </p:txBody>
+      </p:sp>
+      <p:sp>
+        <p:nvSpPr>
+          <p:cNvPr id="4" name="Slide Number Placeholder 3"/>
+          <p:cNvSpPr>
+            <a:spLocks noGrp="1"/>
+          </p:cNvSpPr>
+          <p:nvPr>
+            <p:ph type="sldNum" sz="quarter" idx="10"/>
+          </p:nvPr>
+        </p:nvSpPr>
+        <p:spPr/>
+        <p:txBody>
+          <a:bodyPr/>
+          <a:lstStyle/>
+          <a:p>
+            <a:fld id="{E51715A9-EB64-4481-89E4-A64020E86A42}" type="slidenum">
+              <a:rPr lang="en-US" smtClean="0"/>
+              <a:t>26</a:t>
+            </a:fld>
+            <a:endParaRPr lang="en-US"/>
+          </a:p>
+        </p:txBody>
+      </p:sp>
+    </p:spTree>
+    <p:extLst>
+      <p:ext uri="{BB962C8B-B14F-4D97-AF65-F5344CB8AC3E}">
+        <p14:creationId xmlns:p14="http://schemas.microsoft.com/office/powerpoint/2010/main" val="84181288"/>
+      </p:ext>
+    </p:extLst>
+  </p:cSld>
+  <p:clrMapOvr>
+    <a:masterClrMapping/>
+  </p:clrMapOvr>
+</p:notes>
+</file>
+
+<file path=ppt/notesSlides/notesSlide18.xml><?xml version="1.0" encoding="utf-8"?>
+<p:notes xmlns:a="http://schemas.openxmlformats.org/drawingml/2006/main" xmlns:r="http://schemas.openxmlformats.org/officeDocument/2006/relationships" xmlns:p="http://schemas.openxmlformats.org/presentationml/2006/main">
+  <p:cSld>
+    <p:spTree>
+      <p:nvGrpSpPr>
+        <p:cNvPr id="1" name=""/>
+        <p:cNvGrpSpPr/>
+        <p:nvPr/>
+      </p:nvGrpSpPr>
+      <p:grpSpPr>
+        <a:xfrm>
+          <a:off x="0" y="0"/>
+          <a:ext cx="0" cy="0"/>
+          <a:chOff x="0" y="0"/>
+          <a:chExt cx="0" cy="0"/>
+        </a:xfrm>
+      </p:grpSpPr>
+      <p:sp>
+        <p:nvSpPr>
+          <p:cNvPr id="2" name="Slide Image Placeholder 1"/>
+          <p:cNvSpPr>
+            <a:spLocks noGrp="1" noRot="1" noChangeAspect="1"/>
+          </p:cNvSpPr>
+          <p:nvPr>
+            <p:ph type="sldImg"/>
+          </p:nvPr>
+        </p:nvSpPr>
+        <p:spPr/>
+      </p:sp>
+      <p:sp>
+        <p:nvSpPr>
+          <p:cNvPr id="3" name="Notes Placeholder 2"/>
+          <p:cNvSpPr>
+            <a:spLocks noGrp="1"/>
+          </p:cNvSpPr>
+          <p:nvPr>
+            <p:ph type="body" idx="1"/>
+          </p:nvPr>
+        </p:nvSpPr>
+        <p:spPr/>
+        <p:txBody>
+          <a:bodyPr/>
+          <a:lstStyle/>
+          <a:p>
+            <a:endParaRPr lang="en-US" dirty="0"/>
+          </a:p>
+        </p:txBody>
+      </p:sp>
+      <p:sp>
+        <p:nvSpPr>
+          <p:cNvPr id="4" name="Slide Number Placeholder 3"/>
+          <p:cNvSpPr>
+            <a:spLocks noGrp="1"/>
+          </p:cNvSpPr>
+          <p:nvPr>
+            <p:ph type="sldNum" sz="quarter" idx="10"/>
+          </p:nvPr>
+        </p:nvSpPr>
+        <p:spPr/>
+        <p:txBody>
+          <a:bodyPr/>
+          <a:lstStyle/>
+          <a:p>
+            <a:fld id="{84A452C3-0BE2-3E46-BBC2-652C991B87BC}" type="slidenum">
+              <a:rPr lang="en-US" smtClean="0"/>
+              <a:t>27</a:t>
+            </a:fld>
+            <a:endParaRPr lang="en-US"/>
+          </a:p>
+        </p:txBody>
+      </p:sp>
+    </p:spTree>
+    <p:extLst>
+      <p:ext uri="{BB962C8B-B14F-4D97-AF65-F5344CB8AC3E}">
+        <p14:creationId xmlns:p14="http://schemas.microsoft.com/office/powerpoint/2010/main" val="1259845975"/>
+      </p:ext>
+    </p:extLst>
+  </p:cSld>
+  <p:clrMapOvr>
+    <a:masterClrMapping/>
+  </p:clrMapOvr>
+</p:notes>
+</file>
+
+<file path=ppt/notesSlides/notesSlide19.xml><?xml version="1.0" encoding="utf-8"?>
+<p:notes xmlns:a="http://schemas.openxmlformats.org/drawingml/2006/main" xmlns:r="http://schemas.openxmlformats.org/officeDocument/2006/relationships" xmlns:p="http://schemas.openxmlformats.org/presentationml/2006/main">
+  <p:cSld>
+    <p:spTree>
+      <p:nvGrpSpPr>
+        <p:cNvPr id="1" name=""/>
+        <p:cNvGrpSpPr/>
+        <p:nvPr/>
+      </p:nvGrpSpPr>
+      <p:grpSpPr>
+        <a:xfrm>
+          <a:off x="0" y="0"/>
+          <a:ext cx="0" cy="0"/>
+          <a:chOff x="0" y="0"/>
+          <a:chExt cx="0" cy="0"/>
+        </a:xfrm>
+      </p:grpSpPr>
+      <p:sp>
+        <p:nvSpPr>
+          <p:cNvPr id="2" name="Slide Image Placeholder 1"/>
+          <p:cNvSpPr>
+            <a:spLocks noGrp="1" noRot="1" noChangeAspect="1"/>
+          </p:cNvSpPr>
+          <p:nvPr>
+            <p:ph type="sldImg"/>
+          </p:nvPr>
+        </p:nvSpPr>
+        <p:spPr/>
+      </p:sp>
+      <p:sp>
+        <p:nvSpPr>
+          <p:cNvPr id="3" name="Notes Placeholder 2"/>
+          <p:cNvSpPr>
+            <a:spLocks noGrp="1"/>
+          </p:cNvSpPr>
+          <p:nvPr>
+            <p:ph type="body" idx="1"/>
+          </p:nvPr>
+        </p:nvSpPr>
+        <p:spPr/>
+        <p:txBody>
+          <a:bodyPr/>
+          <a:lstStyle/>
+          <a:p>
             <a:r>
               <a:rPr kumimoji="0" lang="en-US" altLang="en-US" sz="1200" b="0" i="0" u="none" strike="noStrike" cap="none" normalizeH="0" baseline="0" dirty="0" smtClean="0">
                 <a:ln>
@@ -1411,16 +1695,6 @@
               </a:rPr>
               <a:t> is working</a:t>
             </a:r>
-            <a:endParaRPr kumimoji="0" lang="en-US" altLang="en-US" sz="1200" b="0" i="0" u="none" strike="noStrike" cap="none" normalizeH="0" baseline="0" dirty="0" smtClean="0">
-              <a:ln>
-                <a:noFill/>
-              </a:ln>
-              <a:solidFill>
-                <a:schemeClr val="tx1"/>
-              </a:solidFill>
-              <a:effectLst/>
-              <a:latin typeface="Arial" panose="020B0604020202020204" pitchFamily="34" charset="0"/>
-            </a:endParaRPr>
           </a:p>
         </p:txBody>
       </p:sp>
@@ -1441,7 +1715,7 @@
           <a:p>
             <a:fld id="{E51715A9-EB64-4481-89E4-A64020E86A42}" type="slidenum">
               <a:rPr lang="en-US" smtClean="0"/>
-              <a:t>24</a:t>
+              <a:t>28</a:t>
             </a:fld>
             <a:endParaRPr lang="en-US"/>
           </a:p>
@@ -1588,6 +1862,30 @@
           <a:bodyPr/>
           <a:lstStyle/>
           <a:p>
+            <a:r>
+              <a:rPr lang="en-US" dirty="0" smtClean="0"/>
+              <a:t>komodo edit is prebuilt</a:t>
+            </a:r>
+            <a:r>
+              <a:rPr lang="en-US" baseline="0" dirty="0" smtClean="0"/>
+              <a:t> and ready to go, so is </a:t>
+            </a:r>
+            <a:r>
+              <a:rPr lang="en-US" baseline="0" dirty="0" err="1" smtClean="0"/>
+              <a:t>sqlitebrowser</a:t>
+            </a:r>
+            <a:r>
+              <a:rPr lang="en-US" baseline="0" dirty="0" smtClean="0"/>
+              <a:t> in a </a:t>
+            </a:r>
+            <a:r>
+              <a:rPr lang="en-US" baseline="0" dirty="0" err="1" smtClean="0"/>
+              <a:t>dmg</a:t>
+            </a:r>
+            <a:r>
+              <a:rPr lang="en-US" baseline="0" dirty="0" smtClean="0"/>
+              <a:t> file ready for install</a:t>
+            </a:r>
             <a:endParaRPr lang="en-US" dirty="0"/>
           </a:p>
         </p:txBody>
@@ -1609,7 +1907,7 @@
           <a:p>
             <a:fld id="{84A452C3-0BE2-3E46-BBC2-652C991B87BC}" type="slidenum">
               <a:rPr lang="en-US" smtClean="0"/>
-              <a:t>6</a:t>
+              <a:t>8</a:t>
             </a:fld>
             <a:endParaRPr lang="en-US"/>
           </a:p>
@@ -1618,7 +1916,7 @@
     </p:spTree>
     <p:extLst>
       <p:ext uri="{BB962C8B-B14F-4D97-AF65-F5344CB8AC3E}">
-        <p14:creationId xmlns:p14="http://schemas.microsoft.com/office/powerpoint/2010/main" val="3459451342"/>
+        <p14:creationId xmlns:p14="http://schemas.microsoft.com/office/powerpoint/2010/main" val="570909591"/>
       </p:ext>
     </p:extLst>
   </p:cSld>
@@ -1693,7 +1991,7 @@
           <a:p>
             <a:fld id="{84A452C3-0BE2-3E46-BBC2-652C991B87BC}" type="slidenum">
               <a:rPr lang="en-US" smtClean="0"/>
-              <a:t>7</a:t>
+              <a:t>9</a:t>
             </a:fld>
             <a:endParaRPr lang="en-US"/>
           </a:p>
@@ -1781,7 +2079,7 @@
           <a:p>
             <a:fld id="{84A452C3-0BE2-3E46-BBC2-652C991B87BC}" type="slidenum">
               <a:rPr lang="en-US" smtClean="0"/>
-              <a:t>8</a:t>
+              <a:t>10</a:t>
             </a:fld>
             <a:endParaRPr lang="en-US"/>
           </a:p>
@@ -1865,7 +2163,7 @@
           <a:p>
             <a:fld id="{84A452C3-0BE2-3E46-BBC2-652C991B87BC}" type="slidenum">
               <a:rPr lang="en-US" smtClean="0"/>
-              <a:t>9</a:t>
+              <a:t>11</a:t>
             </a:fld>
             <a:endParaRPr lang="en-US"/>
           </a:p>
@@ -1949,7 +2247,7 @@
           <a:p>
             <a:fld id="{84A452C3-0BE2-3E46-BBC2-652C991B87BC}" type="slidenum">
               <a:rPr lang="en-US" smtClean="0"/>
-              <a:t>13</a:t>
+              <a:t>12</a:t>
             </a:fld>
             <a:endParaRPr lang="en-US"/>
           </a:p>
@@ -1958,7 +2256,7 @@
     </p:spTree>
     <p:extLst>
       <p:ext uri="{BB962C8B-B14F-4D97-AF65-F5344CB8AC3E}">
-        <p14:creationId xmlns:p14="http://schemas.microsoft.com/office/powerpoint/2010/main" val="1152324146"/>
+        <p14:creationId xmlns:p14="http://schemas.microsoft.com/office/powerpoint/2010/main" val="898139180"/>
       </p:ext>
     </p:extLst>
   </p:cSld>
@@ -2033,7 +2331,7 @@
           <a:p>
             <a:fld id="{84A452C3-0BE2-3E46-BBC2-652C991B87BC}" type="slidenum">
               <a:rPr lang="en-US" smtClean="0"/>
-              <a:t>16</a:t>
+              <a:t>13</a:t>
             </a:fld>
             <a:endParaRPr lang="en-US"/>
           </a:p>
@@ -2042,7 +2340,7 @@
     </p:spTree>
     <p:extLst>
       <p:ext uri="{BB962C8B-B14F-4D97-AF65-F5344CB8AC3E}">
-        <p14:creationId xmlns:p14="http://schemas.microsoft.com/office/powerpoint/2010/main" val="1690993758"/>
+        <p14:creationId xmlns:p14="http://schemas.microsoft.com/office/powerpoint/2010/main" val="225340307"/>
       </p:ext>
     </p:extLst>
   </p:cSld>
@@ -2117,7 +2415,7 @@
           <a:p>
             <a:fld id="{84A452C3-0BE2-3E46-BBC2-652C991B87BC}" type="slidenum">
               <a:rPr lang="en-US" smtClean="0"/>
-              <a:t>17</a:t>
+              <a:t>15</a:t>
             </a:fld>
             <a:endParaRPr lang="en-US"/>
           </a:p>
@@ -2126,7 +2424,7 @@
     </p:spTree>
     <p:extLst>
       <p:ext uri="{BB962C8B-B14F-4D97-AF65-F5344CB8AC3E}">
-        <p14:creationId xmlns:p14="http://schemas.microsoft.com/office/powerpoint/2010/main" val="2022242866"/>
+        <p14:creationId xmlns:p14="http://schemas.microsoft.com/office/powerpoint/2010/main" val="1152324146"/>
       </p:ext>
     </p:extLst>
   </p:cSld>
@@ -2317,7 +2615,7 @@
           <a:p>
             <a:fld id="{ABB552BE-1EA2-CA46-B5AB-EBCC0D015347}" type="datetimeFigureOut">
               <a:rPr lang="en-US" smtClean="0"/>
-              <a:t>3/28/2015</a:t>
+              <a:t>4/13/2015</a:t>
             </a:fld>
             <a:endParaRPr lang="en-US"/>
           </a:p>
@@ -2487,7 +2785,7 @@
           <a:p>
             <a:fld id="{ABB552BE-1EA2-CA46-B5AB-EBCC0D015347}" type="datetimeFigureOut">
               <a:rPr lang="en-US" smtClean="0"/>
-              <a:t>3/28/2015</a:t>
+              <a:t>4/13/2015</a:t>
             </a:fld>
             <a:endParaRPr lang="en-US"/>
           </a:p>
@@ -2667,7 +2965,7 @@
           <a:p>
             <a:fld id="{ABB552BE-1EA2-CA46-B5AB-EBCC0D015347}" type="datetimeFigureOut">
               <a:rPr lang="en-US" smtClean="0"/>
-              <a:t>3/28/2015</a:t>
+              <a:t>4/13/2015</a:t>
             </a:fld>
             <a:endParaRPr lang="en-US"/>
           </a:p>
@@ -2837,7 +3135,7 @@
           <a:p>
             <a:fld id="{ABB552BE-1EA2-CA46-B5AB-EBCC0D015347}" type="datetimeFigureOut">
               <a:rPr lang="en-US" smtClean="0"/>
-              <a:t>3/28/2015</a:t>
+              <a:t>4/13/2015</a:t>
             </a:fld>
             <a:endParaRPr lang="en-US"/>
           </a:p>
@@ -3083,7 +3381,7 @@
           <a:p>
             <a:fld id="{ABB552BE-1EA2-CA46-B5AB-EBCC0D015347}" type="datetimeFigureOut">
               <a:rPr lang="en-US" smtClean="0"/>
-              <a:t>3/28/2015</a:t>
+              <a:t>4/13/2015</a:t>
             </a:fld>
             <a:endParaRPr lang="en-US"/>
           </a:p>
@@ -3371,7 +3669,7 @@
           <a:p>
             <a:fld id="{ABB552BE-1EA2-CA46-B5AB-EBCC0D015347}" type="datetimeFigureOut">
               <a:rPr lang="en-US" smtClean="0"/>
-              <a:t>3/28/2015</a:t>
+              <a:t>4/13/2015</a:t>
             </a:fld>
             <a:endParaRPr lang="en-US"/>
           </a:p>
@@ -3793,7 +4091,7 @@
           <a:p>
             <a:fld id="{ABB552BE-1EA2-CA46-B5AB-EBCC0D015347}" type="datetimeFigureOut">
               <a:rPr lang="en-US" smtClean="0"/>
-              <a:t>3/28/2015</a:t>
+              <a:t>4/13/2015</a:t>
             </a:fld>
             <a:endParaRPr lang="en-US"/>
           </a:p>
@@ -3911,7 +4209,7 @@
           <a:p>
             <a:fld id="{ABB552BE-1EA2-CA46-B5AB-EBCC0D015347}" type="datetimeFigureOut">
               <a:rPr lang="en-US" smtClean="0"/>
-              <a:t>3/28/2015</a:t>
+              <a:t>4/13/2015</a:t>
             </a:fld>
             <a:endParaRPr lang="en-US"/>
           </a:p>
@@ -4006,7 +4304,7 @@
           <a:p>
             <a:fld id="{ABB552BE-1EA2-CA46-B5AB-EBCC0D015347}" type="datetimeFigureOut">
               <a:rPr lang="en-US" smtClean="0"/>
-              <a:t>3/28/2015</a:t>
+              <a:t>4/13/2015</a:t>
             </a:fld>
             <a:endParaRPr lang="en-US"/>
           </a:p>
@@ -4283,7 +4581,7 @@
           <a:p>
             <a:fld id="{ABB552BE-1EA2-CA46-B5AB-EBCC0D015347}" type="datetimeFigureOut">
               <a:rPr lang="en-US" smtClean="0"/>
-              <a:t>3/28/2015</a:t>
+              <a:t>4/13/2015</a:t>
             </a:fld>
             <a:endParaRPr lang="en-US"/>
           </a:p>
@@ -4536,7 +4834,7 @@
           <a:p>
             <a:fld id="{ABB552BE-1EA2-CA46-B5AB-EBCC0D015347}" type="datetimeFigureOut">
               <a:rPr lang="en-US" smtClean="0"/>
-              <a:t>3/28/2015</a:t>
+              <a:t>4/13/2015</a:t>
             </a:fld>
             <a:endParaRPr lang="en-US"/>
           </a:p>
@@ -4749,7 +5047,7 @@
           <a:p>
             <a:fld id="{ABB552BE-1EA2-CA46-B5AB-EBCC0D015347}" type="datetimeFigureOut">
               <a:rPr lang="en-US" smtClean="0"/>
-              <a:t>3/28/2015</a:t>
+              <a:t>4/13/2015</a:t>
             </a:fld>
             <a:endParaRPr lang="en-US"/>
           </a:p>
@@ -5224,7 +5522,7 @@
           <a:p>
             <a:r>
               <a:rPr lang="en-US" dirty="0" smtClean="0"/>
-              <a:t>Installing by Hand</a:t>
+              <a:t>The Windows Package</a:t>
             </a:r>
             <a:endParaRPr lang="en-US" dirty="0"/>
           </a:p>
@@ -5247,27 +5545,29 @@
           <a:p>
             <a:r>
               <a:rPr lang="en-US" dirty="0" smtClean="0"/>
-              <a:t>The editing and </a:t>
+              <a:t>Includes a stripped down PHP executable</a:t>
+            </a:r>
+          </a:p>
+          <a:p>
+            <a:r>
+              <a:rPr lang="en-US" dirty="0" smtClean="0"/>
+              <a:t>Includes a batch file to run the built in server and serve from the code directory inside</a:t>
+            </a:r>
+          </a:p>
+          <a:p>
+            <a:r>
+              <a:rPr lang="en-US" dirty="0" smtClean="0"/>
+              <a:t>You can alter the code location if you choose in the batch file</a:t>
+            </a:r>
+          </a:p>
+          <a:p>
+            <a:r>
+              <a:rPr lang="en-US" dirty="0" smtClean="0"/>
+              <a:t>Includes installers for komodo edit and </a:t>
             </a:r>
             <a:r>
               <a:rPr lang="en-US" dirty="0" err="1" smtClean="0"/>
-              <a:t>sql</a:t>
-            </a:r>
-            <a:r>
-              <a:rPr lang="en-US" dirty="0" smtClean="0"/>
-              <a:t> tools will be part of your system, not portable apps</a:t>
-            </a:r>
-          </a:p>
-          <a:p>
-            <a:r>
-              <a:rPr lang="en-US" dirty="0" smtClean="0"/>
-              <a:t>PHP will be wherever you put it</a:t>
-            </a:r>
-          </a:p>
-          <a:p>
-            <a:r>
-              <a:rPr lang="en-US" dirty="0" smtClean="0"/>
-              <a:t>You can still use the run.bat file if you would like to avoid doing command line stuff</a:t>
+              <a:t>sqlitebrowser</a:t>
             </a:r>
             <a:endParaRPr lang="en-US" dirty="0"/>
           </a:p>
@@ -5276,7 +5576,7 @@
     </p:spTree>
     <p:extLst>
       <p:ext uri="{BB962C8B-B14F-4D97-AF65-F5344CB8AC3E}">
-        <p14:creationId xmlns:p14="http://schemas.microsoft.com/office/powerpoint/2010/main" val="3321136829"/>
+        <p14:creationId xmlns:p14="http://schemas.microsoft.com/office/powerpoint/2010/main" val="3423475601"/>
       </p:ext>
     </p:extLst>
   </p:cSld>
@@ -5327,7 +5627,15 @@
           <a:p>
             <a:r>
               <a:rPr lang="en-US" dirty="0" smtClean="0"/>
-              <a:t>Installing PHP</a:t>
+              <a:t>Installing </a:t>
+            </a:r>
+            <a:r>
+              <a:rPr lang="en-US" dirty="0" smtClean="0"/>
+              <a:t>PHP from </a:t>
+            </a:r>
+            <a:r>
+              <a:rPr lang="en-US" dirty="0" smtClean="0"/>
+              <a:t>the Package</a:t>
             </a:r>
             <a:endParaRPr lang="en-US" dirty="0"/>
           </a:p>
@@ -5346,54 +5654,81 @@
         <p:spPr/>
         <p:txBody>
           <a:bodyPr>
-            <a:normAutofit/>
+            <a:normAutofit fontScale="92500" lnSpcReduction="10000"/>
           </a:bodyPr>
           <a:lstStyle/>
           <a:p>
             <a:r>
               <a:rPr lang="en-US" dirty="0" smtClean="0"/>
-              <a:t>Download PHP –</a:t>
-            </a:r>
-          </a:p>
-          <a:p>
-            <a:pPr lvl="1"/>
+              <a:t>Download the package or get from a jump drive – </a:t>
+            </a:r>
+            <a:r>
+              <a:rPr lang="en-US" dirty="0">
+                <a:hlinkClick r:id="rId3"/>
+              </a:rPr>
+              <a:t>https://</a:t>
+            </a:r>
             <a:r>
               <a:rPr lang="en-US" dirty="0" smtClean="0">
-                <a:hlinkClick r:id="rId2"/>
+                <a:hlinkClick r:id="rId3"/>
               </a:rPr>
-              <a:t>http://windows.php.net/download</a:t>
+              <a:t>github.com/PHPEmbark/packages/releases</a:t>
+            </a:r>
+            <a:endParaRPr lang="en-US" dirty="0" smtClean="0"/>
+          </a:p>
+          <a:p>
+            <a:r>
+              <a:rPr lang="en-US" dirty="0" smtClean="0"/>
+              <a:t>Unzip </a:t>
+            </a:r>
+            <a:r>
+              <a:rPr lang="en-US" dirty="0" smtClean="0"/>
+              <a:t>the contents</a:t>
+            </a:r>
+          </a:p>
+          <a:p>
+            <a:r>
+              <a:rPr lang="en-US" dirty="0" smtClean="0"/>
+              <a:t>Double c</a:t>
+            </a:r>
+            <a:r>
+              <a:rPr lang="en-US" dirty="0" smtClean="0"/>
+              <a:t>lick </a:t>
+            </a:r>
+            <a:r>
+              <a:rPr lang="en-US" dirty="0" smtClean="0"/>
+              <a:t>on the "run.bat" file</a:t>
+            </a:r>
+          </a:p>
+          <a:p>
+            <a:r>
+              <a:rPr lang="en-US" dirty="0" smtClean="0"/>
+              <a:t>It will open a window, do NOT close it, that will shut down your server</a:t>
+            </a:r>
+          </a:p>
+          <a:p>
+            <a:r>
+              <a:rPr lang="en-US" dirty="0" smtClean="0"/>
+              <a:t>Open your browser and go to </a:t>
+            </a:r>
+            <a:r>
+              <a:rPr lang="en-US" dirty="0" smtClean="0">
+                <a:hlinkClick r:id="rId4"/>
+              </a:rPr>
+              <a:t>http://localhost:8080</a:t>
             </a:r>
             <a:r>
               <a:rPr lang="en-US" dirty="0" smtClean="0"/>
               <a:t> </a:t>
             </a:r>
-          </a:p>
-          <a:p>
-            <a:pPr lvl="1"/>
-            <a:r>
-              <a:rPr lang="en-US" dirty="0"/>
-              <a:t>VC11 x86 Non Thread Safe</a:t>
-            </a:r>
-          </a:p>
-          <a:p>
-            <a:r>
-              <a:rPr lang="en-US" dirty="0" smtClean="0"/>
-              <a:t>Unzip to a location of your choice </a:t>
-            </a:r>
-          </a:p>
-          <a:p>
-            <a:pPr lvl="1"/>
-            <a:r>
-              <a:rPr lang="en-US" dirty="0" smtClean="0"/>
-              <a:t>c:\php works</a:t>
-            </a:r>
+            <a:endParaRPr lang="en-US" dirty="0"/>
           </a:p>
         </p:txBody>
       </p:sp>
     </p:spTree>
     <p:extLst>
       <p:ext uri="{BB962C8B-B14F-4D97-AF65-F5344CB8AC3E}">
-        <p14:creationId xmlns:p14="http://schemas.microsoft.com/office/powerpoint/2010/main" val="3987006042"/>
+        <p14:creationId xmlns:p14="http://schemas.microsoft.com/office/powerpoint/2010/main" val="2499706733"/>
       </p:ext>
     </p:extLst>
   </p:cSld>
@@ -5444,7 +5779,15 @@
           <a:p>
             <a:r>
               <a:rPr lang="en-US" dirty="0" smtClean="0"/>
-              <a:t>Configure PHP</a:t>
+              <a:t>Installing </a:t>
+            </a:r>
+            <a:r>
+              <a:rPr lang="en-US" dirty="0" smtClean="0"/>
+              <a:t>PHP by </a:t>
+            </a:r>
+            <a:r>
+              <a:rPr lang="en-US" dirty="0" smtClean="0"/>
+              <a:t>Hand</a:t>
             </a:r>
             <a:endParaRPr lang="en-US" dirty="0"/>
           </a:p>
@@ -5467,70 +5810,28 @@
           <a:p>
             <a:r>
               <a:rPr lang="en-US" dirty="0" smtClean="0"/>
-              <a:t>open your </a:t>
-            </a:r>
-            <a:r>
-              <a:rPr lang="en-US" dirty="0" err="1" smtClean="0"/>
-              <a:t>php</a:t>
-            </a:r>
-            <a:r>
-              <a:rPr lang="en-US" dirty="0" smtClean="0"/>
-              <a:t> directory</a:t>
-            </a:r>
-          </a:p>
-          <a:p>
-            <a:r>
-              <a:rPr lang="en-US" dirty="0" smtClean="0"/>
-              <a:t>rename </a:t>
-            </a:r>
-            <a:r>
-              <a:rPr lang="en-US" dirty="0"/>
-              <a:t>php.ini-development to php.ini</a:t>
-            </a:r>
-          </a:p>
-          <a:p>
-            <a:r>
-              <a:rPr lang="en-US" dirty="0" smtClean="0"/>
-              <a:t>open your new php.ini file</a:t>
-            </a:r>
-          </a:p>
-          <a:p>
-            <a:r>
-              <a:rPr lang="en-US" dirty="0" smtClean="0"/>
-              <a:t>uncomment </a:t>
-            </a:r>
-            <a:r>
-              <a:rPr lang="en-US" dirty="0" err="1"/>
-              <a:t>extension_dir</a:t>
-            </a:r>
-            <a:r>
-              <a:rPr lang="en-US" dirty="0"/>
-              <a:t> = "</a:t>
-            </a:r>
-            <a:r>
-              <a:rPr lang="en-US" dirty="0" err="1"/>
-              <a:t>ext</a:t>
-            </a:r>
-            <a:r>
-              <a:rPr lang="en-US" dirty="0"/>
-              <a:t>"</a:t>
-            </a:r>
-          </a:p>
-          <a:p>
-            <a:r>
-              <a:rPr lang="en-US" dirty="0"/>
-              <a:t>uncomment extension=php_pdo_sqlite.dll </a:t>
-            </a:r>
-            <a:endParaRPr lang="en-US" dirty="0" smtClean="0"/>
-          </a:p>
-          <a:p>
-            <a:r>
-              <a:rPr lang="en-US" dirty="0" smtClean="0"/>
-              <a:t>save the changes</a:t>
-            </a:r>
-            <a:endParaRPr lang="en-US" dirty="0"/>
-          </a:p>
-          <a:p>
+              <a:t>PHP will be wherever you put it</a:t>
+            </a:r>
+          </a:p>
+          <a:p>
+            <a:r>
+              <a:rPr lang="en-US" dirty="0" smtClean="0"/>
+              <a:t>You </a:t>
+            </a:r>
+            <a:r>
+              <a:rPr lang="en-US" dirty="0" smtClean="0"/>
+              <a:t>can still use the run.bat file if you would like to avoid doing command line </a:t>
+            </a:r>
+            <a:r>
+              <a:rPr lang="en-US" dirty="0" smtClean="0"/>
+              <a:t>stuff</a:t>
+            </a:r>
+          </a:p>
+          <a:p>
+            <a:r>
+              <a:rPr lang="en-US" dirty="0" smtClean="0"/>
+              <a:t>You can drag and drop a directory onto the run.bat file to use it as your base directory</a:t>
+            </a:r>
             <a:endParaRPr lang="en-US" dirty="0"/>
           </a:p>
         </p:txBody>
@@ -5538,7 +5839,7 @@
     </p:spTree>
     <p:extLst>
       <p:ext uri="{BB962C8B-B14F-4D97-AF65-F5344CB8AC3E}">
-        <p14:creationId xmlns:p14="http://schemas.microsoft.com/office/powerpoint/2010/main" val="3015649681"/>
+        <p14:creationId xmlns:p14="http://schemas.microsoft.com/office/powerpoint/2010/main" val="3321136829"/>
       </p:ext>
     </p:extLst>
   </p:cSld>
@@ -5589,7 +5890,292 @@
           <a:p>
             <a:r>
               <a:rPr lang="en-US" dirty="0" smtClean="0"/>
-              <a:t>Checking PHP</a:t>
+              <a:t>Installing PHP</a:t>
+            </a:r>
+            <a:endParaRPr lang="en-US" dirty="0"/>
+          </a:p>
+        </p:txBody>
+      </p:sp>
+      <p:sp>
+        <p:nvSpPr>
+          <p:cNvPr id="3" name="Content Placeholder 2"/>
+          <p:cNvSpPr>
+            <a:spLocks noGrp="1"/>
+          </p:cNvSpPr>
+          <p:nvPr>
+            <p:ph idx="1"/>
+          </p:nvPr>
+        </p:nvSpPr>
+        <p:spPr/>
+        <p:txBody>
+          <a:bodyPr>
+            <a:normAutofit/>
+          </a:bodyPr>
+          <a:lstStyle/>
+          <a:p>
+            <a:r>
+              <a:rPr lang="en-US" dirty="0" smtClean="0"/>
+              <a:t>Download PHP –</a:t>
+            </a:r>
+          </a:p>
+          <a:p>
+            <a:pPr lvl="1"/>
+            <a:r>
+              <a:rPr lang="en-US" dirty="0" smtClean="0">
+                <a:hlinkClick r:id="rId3"/>
+              </a:rPr>
+              <a:t>http://windows.php.net/download</a:t>
+            </a:r>
+            <a:r>
+              <a:rPr lang="en-US" dirty="0" smtClean="0"/>
+              <a:t> </a:t>
+            </a:r>
+          </a:p>
+          <a:p>
+            <a:pPr lvl="1"/>
+            <a:r>
+              <a:rPr lang="en-US" dirty="0"/>
+              <a:t>VC11 x86 Non Thread Safe</a:t>
+            </a:r>
+          </a:p>
+          <a:p>
+            <a:r>
+              <a:rPr lang="en-US" dirty="0" smtClean="0"/>
+              <a:t>Unzip to a location of your choice </a:t>
+            </a:r>
+          </a:p>
+          <a:p>
+            <a:pPr lvl="1"/>
+            <a:r>
+              <a:rPr lang="en-US" dirty="0" smtClean="0"/>
+              <a:t>c:\php </a:t>
+            </a:r>
+            <a:r>
+              <a:rPr lang="en-US" dirty="0" smtClean="0"/>
+              <a:t>works</a:t>
+            </a:r>
+          </a:p>
+          <a:p>
+            <a:r>
+              <a:rPr lang="en-US" dirty="0"/>
+              <a:t>Grab </a:t>
+            </a:r>
+            <a:r>
+              <a:rPr lang="en-US" dirty="0" smtClean="0"/>
+              <a:t>the code.zip package </a:t>
+            </a:r>
+            <a:r>
+              <a:rPr lang="en-US" dirty="0"/>
+              <a:t>from https://github.com/PHPEmbark/packages/releases</a:t>
+            </a:r>
+            <a:endParaRPr lang="en-US" dirty="0" smtClean="0"/>
+          </a:p>
+        </p:txBody>
+      </p:sp>
+    </p:spTree>
+    <p:extLst>
+      <p:ext uri="{BB962C8B-B14F-4D97-AF65-F5344CB8AC3E}">
+        <p14:creationId xmlns:p14="http://schemas.microsoft.com/office/powerpoint/2010/main" val="3987006042"/>
+      </p:ext>
+    </p:extLst>
+  </p:cSld>
+  <p:clrMapOvr>
+    <a:masterClrMapping/>
+  </p:clrMapOvr>
+  <p:timing>
+    <p:tnLst>
+      <p:par>
+        <p:cTn id="1" dur="indefinite" restart="never" nodeType="tmRoot"/>
+      </p:par>
+    </p:tnLst>
+  </p:timing>
+</p:sld>
+</file>
+
+<file path=ppt/slides/slide14.xml><?xml version="1.0" encoding="utf-8"?>
+<p:sld xmlns:a="http://schemas.openxmlformats.org/drawingml/2006/main" xmlns:r="http://schemas.openxmlformats.org/officeDocument/2006/relationships" xmlns:p="http://schemas.openxmlformats.org/presentationml/2006/main">
+  <p:cSld>
+    <p:spTree>
+      <p:nvGrpSpPr>
+        <p:cNvPr id="1" name=""/>
+        <p:cNvGrpSpPr/>
+        <p:nvPr/>
+      </p:nvGrpSpPr>
+      <p:grpSpPr>
+        <a:xfrm>
+          <a:off x="0" y="0"/>
+          <a:ext cx="0" cy="0"/>
+          <a:chOff x="0" y="0"/>
+          <a:chExt cx="0" cy="0"/>
+        </a:xfrm>
+      </p:grpSpPr>
+      <p:sp>
+        <p:nvSpPr>
+          <p:cNvPr id="2" name="Title 1"/>
+          <p:cNvSpPr>
+            <a:spLocks noGrp="1"/>
+          </p:cNvSpPr>
+          <p:nvPr>
+            <p:ph type="title"/>
+          </p:nvPr>
+        </p:nvSpPr>
+        <p:spPr/>
+        <p:txBody>
+          <a:bodyPr/>
+          <a:lstStyle/>
+          <a:p>
+            <a:r>
+              <a:rPr lang="en-US" dirty="0" smtClean="0"/>
+              <a:t>Configure PHP</a:t>
+            </a:r>
+            <a:endParaRPr lang="en-US" dirty="0"/>
+          </a:p>
+        </p:txBody>
+      </p:sp>
+      <p:sp>
+        <p:nvSpPr>
+          <p:cNvPr id="3" name="Content Placeholder 2"/>
+          <p:cNvSpPr>
+            <a:spLocks noGrp="1"/>
+          </p:cNvSpPr>
+          <p:nvPr>
+            <p:ph idx="1"/>
+          </p:nvPr>
+        </p:nvSpPr>
+        <p:spPr/>
+        <p:txBody>
+          <a:bodyPr/>
+          <a:lstStyle/>
+          <a:p>
+            <a:r>
+              <a:rPr lang="en-US" dirty="0" smtClean="0"/>
+              <a:t>open your </a:t>
+            </a:r>
+            <a:r>
+              <a:rPr lang="en-US" dirty="0" err="1" smtClean="0"/>
+              <a:t>php</a:t>
+            </a:r>
+            <a:r>
+              <a:rPr lang="en-US" dirty="0" smtClean="0"/>
+              <a:t> directory</a:t>
+            </a:r>
+          </a:p>
+          <a:p>
+            <a:r>
+              <a:rPr lang="en-US" dirty="0" smtClean="0"/>
+              <a:t>rename </a:t>
+            </a:r>
+            <a:r>
+              <a:rPr lang="en-US" dirty="0"/>
+              <a:t>php.ini-development to php.ini</a:t>
+            </a:r>
+          </a:p>
+          <a:p>
+            <a:r>
+              <a:rPr lang="en-US" dirty="0" smtClean="0"/>
+              <a:t>open your new php.ini file</a:t>
+            </a:r>
+          </a:p>
+          <a:p>
+            <a:r>
+              <a:rPr lang="en-US" dirty="0" smtClean="0"/>
+              <a:t>uncomment </a:t>
+            </a:r>
+            <a:r>
+              <a:rPr lang="en-US" dirty="0" err="1"/>
+              <a:t>extension_dir</a:t>
+            </a:r>
+            <a:r>
+              <a:rPr lang="en-US" dirty="0"/>
+              <a:t> = "</a:t>
+            </a:r>
+            <a:r>
+              <a:rPr lang="en-US" dirty="0" err="1"/>
+              <a:t>ext</a:t>
+            </a:r>
+            <a:r>
+              <a:rPr lang="en-US" dirty="0"/>
+              <a:t>"</a:t>
+            </a:r>
+          </a:p>
+          <a:p>
+            <a:r>
+              <a:rPr lang="en-US" dirty="0"/>
+              <a:t>uncomment extension=php_pdo_sqlite.dll </a:t>
+            </a:r>
+            <a:endParaRPr lang="en-US" dirty="0" smtClean="0"/>
+          </a:p>
+          <a:p>
+            <a:r>
+              <a:rPr lang="en-US" dirty="0" smtClean="0"/>
+              <a:t>save the changes</a:t>
+            </a:r>
+            <a:endParaRPr lang="en-US" dirty="0"/>
+          </a:p>
+          <a:p>
+            <a:endParaRPr lang="en-US" dirty="0"/>
+          </a:p>
+        </p:txBody>
+      </p:sp>
+    </p:spTree>
+    <p:extLst>
+      <p:ext uri="{BB962C8B-B14F-4D97-AF65-F5344CB8AC3E}">
+        <p14:creationId xmlns:p14="http://schemas.microsoft.com/office/powerpoint/2010/main" val="3015649681"/>
+      </p:ext>
+    </p:extLst>
+  </p:cSld>
+  <p:clrMapOvr>
+    <a:masterClrMapping/>
+  </p:clrMapOvr>
+  <p:timing>
+    <p:tnLst>
+      <p:par>
+        <p:cTn id="1" dur="indefinite" restart="never" nodeType="tmRoot"/>
+      </p:par>
+    </p:tnLst>
+  </p:timing>
+</p:sld>
+</file>
+
+<file path=ppt/slides/slide15.xml><?xml version="1.0" encoding="utf-8"?>
+<p:sld xmlns:a="http://schemas.openxmlformats.org/drawingml/2006/main" xmlns:r="http://schemas.openxmlformats.org/officeDocument/2006/relationships" xmlns:p="http://schemas.openxmlformats.org/presentationml/2006/main">
+  <p:cSld>
+    <p:spTree>
+      <p:nvGrpSpPr>
+        <p:cNvPr id="1" name=""/>
+        <p:cNvGrpSpPr/>
+        <p:nvPr/>
+      </p:nvGrpSpPr>
+      <p:grpSpPr>
+        <a:xfrm>
+          <a:off x="0" y="0"/>
+          <a:ext cx="0" cy="0"/>
+          <a:chOff x="0" y="0"/>
+          <a:chExt cx="0" cy="0"/>
+        </a:xfrm>
+      </p:grpSpPr>
+      <p:sp>
+        <p:nvSpPr>
+          <p:cNvPr id="2" name="Title 1"/>
+          <p:cNvSpPr>
+            <a:spLocks noGrp="1"/>
+          </p:cNvSpPr>
+          <p:nvPr>
+            <p:ph type="title"/>
+          </p:nvPr>
+        </p:nvSpPr>
+        <p:spPr/>
+        <p:txBody>
+          <a:bodyPr/>
+          <a:lstStyle/>
+          <a:p>
+            <a:r>
+              <a:rPr lang="en-US" dirty="0" smtClean="0"/>
+              <a:t>Checking </a:t>
+            </a:r>
+            <a:r>
+              <a:rPr lang="en-US" dirty="0" smtClean="0"/>
+              <a:t>PHP if you know CLI</a:t>
             </a:r>
             <a:endParaRPr lang="en-US" dirty="0"/>
           </a:p>
@@ -5760,7 +6346,7 @@
 </p:sld>
 </file>
 
-<file path=ppt/slides/slide14.xml><?xml version="1.0" encoding="utf-8"?>
+<file path=ppt/slides/slide16.xml><?xml version="1.0" encoding="utf-8"?>
 <p:sld xmlns:a="http://schemas.openxmlformats.org/drawingml/2006/main" xmlns:r="http://schemas.openxmlformats.org/officeDocument/2006/relationships" xmlns:p="http://schemas.openxmlformats.org/presentationml/2006/main">
   <p:cSld>
     <p:spTree>
@@ -5933,7 +6519,7 @@
 </p:sld>
 </file>
 
-<file path=ppt/slides/slide15.xml><?xml version="1.0" encoding="utf-8"?>
+<file path=ppt/slides/slide17.xml><?xml version="1.0" encoding="utf-8"?>
 <p:sld xmlns:a="http://schemas.openxmlformats.org/drawingml/2006/main" xmlns:r="http://schemas.openxmlformats.org/officeDocument/2006/relationships" xmlns:p="http://schemas.openxmlformats.org/presentationml/2006/main">
   <p:cSld>
     <p:spTree>
@@ -6030,7 +6616,7 @@
 </p:sld>
 </file>
 
-<file path=ppt/slides/slide16.xml><?xml version="1.0" encoding="utf-8"?>
+<file path=ppt/slides/slide18.xml><?xml version="1.0" encoding="utf-8"?>
 <p:sld xmlns:a="http://schemas.openxmlformats.org/drawingml/2006/main" xmlns:r="http://schemas.openxmlformats.org/officeDocument/2006/relationships" xmlns:p="http://schemas.openxmlformats.org/presentationml/2006/main">
   <p:cSld>
     <p:spTree>
@@ -6179,7 +6765,7 @@
 </p:sld>
 </file>
 
-<file path=ppt/slides/slide17.xml><?xml version="1.0" encoding="utf-8"?>
+<file path=ppt/slides/slide19.xml><?xml version="1.0" encoding="utf-8"?>
 <p:sld xmlns:a="http://schemas.openxmlformats.org/drawingml/2006/main" xmlns:r="http://schemas.openxmlformats.org/officeDocument/2006/relationships" xmlns:p="http://schemas.openxmlformats.org/presentationml/2006/main">
   <p:cSld>
     <p:spTree>
@@ -6333,238 +6919,6 @@
 </p:sld>
 </file>
 
-<file path=ppt/slides/slide18.xml><?xml version="1.0" encoding="utf-8"?>
-<p:sld xmlns:a="http://schemas.openxmlformats.org/drawingml/2006/main" xmlns:r="http://schemas.openxmlformats.org/officeDocument/2006/relationships" xmlns:p="http://schemas.openxmlformats.org/presentationml/2006/main">
-  <p:cSld>
-    <p:spTree>
-      <p:nvGrpSpPr>
-        <p:cNvPr id="1" name=""/>
-        <p:cNvGrpSpPr/>
-        <p:nvPr/>
-      </p:nvGrpSpPr>
-      <p:grpSpPr>
-        <a:xfrm>
-          <a:off x="0" y="0"/>
-          <a:ext cx="0" cy="0"/>
-          <a:chOff x="0" y="0"/>
-          <a:chExt cx="0" cy="0"/>
-        </a:xfrm>
-      </p:grpSpPr>
-      <p:sp>
-        <p:nvSpPr>
-          <p:cNvPr id="2" name="Title 1"/>
-          <p:cNvSpPr>
-            <a:spLocks noGrp="1"/>
-          </p:cNvSpPr>
-          <p:nvPr>
-            <p:ph type="title"/>
-          </p:nvPr>
-        </p:nvSpPr>
-        <p:spPr/>
-        <p:txBody>
-          <a:bodyPr/>
-          <a:lstStyle/>
-          <a:p>
-            <a:r>
-              <a:rPr lang="en-US" dirty="0" smtClean="0"/>
-              <a:t>Linux (Ubuntu)</a:t>
-            </a:r>
-            <a:endParaRPr lang="en-US" dirty="0"/>
-          </a:p>
-        </p:txBody>
-      </p:sp>
-      <p:pic>
-        <p:nvPicPr>
-          <p:cNvPr id="4" name="Content Placeholder 3" descr="Ubuntu_Logo.png"/>
-          <p:cNvPicPr>
-            <a:picLocks noGrp="1" noChangeAspect="1"/>
-          </p:cNvPicPr>
-          <p:nvPr>
-            <p:ph idx="1"/>
-          </p:nvPr>
-        </p:nvPicPr>
-        <p:blipFill>
-          <a:blip r:embed="rId3">
-            <a:extLst>
-              <a:ext uri="{28A0092B-C50C-407E-A947-70E740481C1C}">
-                <a14:useLocalDpi xmlns:a14="http://schemas.microsoft.com/office/drawing/2010/main" val="0"/>
-              </a:ext>
-            </a:extLst>
-          </a:blip>
-          <a:srcRect l="-40915" r="-40915"/>
-          <a:stretch>
-            <a:fillRect/>
-          </a:stretch>
-        </p:blipFill>
-        <p:spPr/>
-      </p:pic>
-    </p:spTree>
-    <p:extLst>
-      <p:ext uri="{BB962C8B-B14F-4D97-AF65-F5344CB8AC3E}">
-        <p14:creationId xmlns:p14="http://schemas.microsoft.com/office/powerpoint/2010/main" val="3063094544"/>
-      </p:ext>
-    </p:extLst>
-  </p:cSld>
-  <p:clrMapOvr>
-    <a:masterClrMapping/>
-  </p:clrMapOvr>
-  <p:timing>
-    <p:tnLst>
-      <p:par>
-        <p:cTn id="1" dur="indefinite" restart="never" nodeType="tmRoot"/>
-      </p:par>
-    </p:tnLst>
-  </p:timing>
-</p:sld>
-</file>
-
-<file path=ppt/slides/slide19.xml><?xml version="1.0" encoding="utf-8"?>
-<p:sld xmlns:a="http://schemas.openxmlformats.org/drawingml/2006/main" xmlns:r="http://schemas.openxmlformats.org/officeDocument/2006/relationships" xmlns:p="http://schemas.openxmlformats.org/presentationml/2006/main">
-  <p:cSld>
-    <p:spTree>
-      <p:nvGrpSpPr>
-        <p:cNvPr id="1" name=""/>
-        <p:cNvGrpSpPr/>
-        <p:nvPr/>
-      </p:nvGrpSpPr>
-      <p:grpSpPr>
-        <a:xfrm>
-          <a:off x="0" y="0"/>
-          <a:ext cx="0" cy="0"/>
-          <a:chOff x="0" y="0"/>
-          <a:chExt cx="0" cy="0"/>
-        </a:xfrm>
-      </p:grpSpPr>
-      <p:sp>
-        <p:nvSpPr>
-          <p:cNvPr id="2" name="Title 1"/>
-          <p:cNvSpPr>
-            <a:spLocks noGrp="1"/>
-          </p:cNvSpPr>
-          <p:nvPr>
-            <p:ph type="title"/>
-          </p:nvPr>
-        </p:nvSpPr>
-        <p:spPr/>
-        <p:txBody>
-          <a:bodyPr/>
-          <a:lstStyle/>
-          <a:p>
-            <a:r>
-              <a:rPr lang="en-US" dirty="0" smtClean="0"/>
-              <a:t>Installation</a:t>
-            </a:r>
-            <a:endParaRPr lang="en-US" dirty="0"/>
-          </a:p>
-        </p:txBody>
-      </p:sp>
-      <p:sp>
-        <p:nvSpPr>
-          <p:cNvPr id="3" name="Content Placeholder 2"/>
-          <p:cNvSpPr>
-            <a:spLocks noGrp="1"/>
-          </p:cNvSpPr>
-          <p:nvPr>
-            <p:ph idx="1"/>
-          </p:nvPr>
-        </p:nvSpPr>
-        <p:spPr/>
-        <p:txBody>
-          <a:bodyPr/>
-          <a:lstStyle/>
-          <a:p>
-            <a:r>
-              <a:rPr lang="en-US" dirty="0" smtClean="0"/>
-              <a:t>check if </a:t>
-            </a:r>
-            <a:r>
-              <a:rPr lang="en-US" dirty="0" err="1" smtClean="0"/>
-              <a:t>php</a:t>
-            </a:r>
-            <a:r>
-              <a:rPr lang="en-US" dirty="0" smtClean="0"/>
-              <a:t> is already installed</a:t>
-            </a:r>
-          </a:p>
-          <a:p>
-            <a:r>
-              <a:rPr lang="en-US" dirty="0" smtClean="0"/>
-              <a:t>check if </a:t>
-            </a:r>
-            <a:r>
-              <a:rPr lang="en-US" dirty="0" err="1" smtClean="0"/>
-              <a:t>sqlite</a:t>
-            </a:r>
-            <a:r>
-              <a:rPr lang="en-US" dirty="0" smtClean="0"/>
-              <a:t> is available</a:t>
-            </a:r>
-          </a:p>
-          <a:p>
-            <a:r>
-              <a:rPr lang="en-US" dirty="0" smtClean="0"/>
-              <a:t>run the built in </a:t>
-            </a:r>
-            <a:r>
-              <a:rPr lang="en-US" dirty="0" err="1" smtClean="0"/>
-              <a:t>php</a:t>
-            </a:r>
-            <a:r>
-              <a:rPr lang="en-US" dirty="0" smtClean="0"/>
-              <a:t> webserver, make sure it works</a:t>
-            </a:r>
-          </a:p>
-          <a:p>
-            <a:r>
-              <a:rPr lang="en-US" dirty="0" smtClean="0"/>
-              <a:t>Install your text editor, if not already set up</a:t>
-            </a:r>
-          </a:p>
-          <a:p>
-            <a:r>
-              <a:rPr lang="en-US" dirty="0" smtClean="0"/>
-              <a:t>Install </a:t>
-            </a:r>
-            <a:r>
-              <a:rPr lang="en-US" dirty="0" err="1" smtClean="0"/>
-              <a:t>db</a:t>
-            </a:r>
-            <a:r>
-              <a:rPr lang="en-US" dirty="0" smtClean="0"/>
-              <a:t> browser for </a:t>
-            </a:r>
-            <a:r>
-              <a:rPr lang="en-US" dirty="0" err="1" smtClean="0"/>
-              <a:t>sqlite</a:t>
-            </a:r>
-            <a:r>
-              <a:rPr lang="en-US" dirty="0" smtClean="0"/>
-              <a:t>, if not already set up</a:t>
-            </a:r>
-            <a:endParaRPr lang="en-US" dirty="0"/>
-          </a:p>
-        </p:txBody>
-      </p:sp>
-    </p:spTree>
-    <p:extLst>
-      <p:ext uri="{BB962C8B-B14F-4D97-AF65-F5344CB8AC3E}">
-        <p14:creationId xmlns:p14="http://schemas.microsoft.com/office/powerpoint/2010/main" val="3537609734"/>
-      </p:ext>
-    </p:extLst>
-  </p:cSld>
-  <p:clrMapOvr>
-    <a:masterClrMapping/>
-  </p:clrMapOvr>
-  <p:timing>
-    <p:tnLst>
-      <p:par>
-        <p:cTn id="1" dur="indefinite" restart="never" nodeType="tmRoot"/>
-      </p:par>
-    </p:tnLst>
-  </p:timing>
-</p:sld>
-</file>
-
 <file path=ppt/slides/slide2.xml><?xml version="1.0" encoding="utf-8"?>
 <p:sld xmlns:a="http://schemas.openxmlformats.org/drawingml/2006/main" xmlns:r="http://schemas.openxmlformats.org/officeDocument/2006/relationships" xmlns:p="http://schemas.openxmlformats.org/presentationml/2006/main">
   <p:cSld>
@@ -6683,7 +7037,7 @@
       </p:grpSpPr>
       <p:sp>
         <p:nvSpPr>
-          <p:cNvPr id="4" name="Title 3"/>
+          <p:cNvPr id="2" name="Title 1"/>
           <p:cNvSpPr>
             <a:spLocks noGrp="1"/>
           </p:cNvSpPr>
@@ -6698,39 +7052,41 @@
           <a:p>
             <a:r>
               <a:rPr lang="en-US" dirty="0" smtClean="0"/>
-              <a:t>Hello World</a:t>
+              <a:t>Linux (Ubuntu)</a:t>
             </a:r>
             <a:endParaRPr lang="en-US" dirty="0"/>
           </a:p>
         </p:txBody>
       </p:sp>
-      <p:sp>
-        <p:nvSpPr>
-          <p:cNvPr id="5" name="Text Placeholder 4"/>
-          <p:cNvSpPr>
-            <a:spLocks noGrp="1"/>
-          </p:cNvSpPr>
-          <p:nvPr>
-            <p:ph type="body" idx="1"/>
-          </p:nvPr>
-        </p:nvSpPr>
-        <p:spPr/>
-        <p:txBody>
-          <a:bodyPr/>
-          <a:lstStyle/>
-          <a:p>
-            <a:r>
-              <a:rPr lang="en-US" dirty="0" smtClean="0"/>
-              <a:t>Making sure we can run PHP code</a:t>
-            </a:r>
-            <a:endParaRPr lang="en-US" dirty="0"/>
-          </a:p>
-        </p:txBody>
-      </p:sp>
+      <p:pic>
+        <p:nvPicPr>
+          <p:cNvPr id="4" name="Content Placeholder 3" descr="Ubuntu_Logo.png"/>
+          <p:cNvPicPr>
+            <a:picLocks noGrp="1" noChangeAspect="1"/>
+          </p:cNvPicPr>
+          <p:nvPr>
+            <p:ph idx="1"/>
+          </p:nvPr>
+        </p:nvPicPr>
+        <p:blipFill>
+          <a:blip r:embed="rId3">
+            <a:extLst>
+              <a:ext uri="{28A0092B-C50C-407E-A947-70E740481C1C}">
+                <a14:useLocalDpi xmlns:a14="http://schemas.microsoft.com/office/drawing/2010/main" val="0"/>
+              </a:ext>
+            </a:extLst>
+          </a:blip>
+          <a:srcRect l="-40915" r="-40915"/>
+          <a:stretch>
+            <a:fillRect/>
+          </a:stretch>
+        </p:blipFill>
+        <p:spPr/>
+      </p:pic>
     </p:spTree>
     <p:extLst>
       <p:ext uri="{BB962C8B-B14F-4D97-AF65-F5344CB8AC3E}">
-        <p14:creationId xmlns:p14="http://schemas.microsoft.com/office/powerpoint/2010/main" val="1020605476"/>
+        <p14:creationId xmlns:p14="http://schemas.microsoft.com/office/powerpoint/2010/main" val="3063094544"/>
       </p:ext>
     </p:extLst>
   </p:cSld>
@@ -6766,6 +7122,447 @@
       </p:grpSpPr>
       <p:sp>
         <p:nvSpPr>
+          <p:cNvPr id="2" name="Title 1"/>
+          <p:cNvSpPr>
+            <a:spLocks noGrp="1"/>
+          </p:cNvSpPr>
+          <p:nvPr>
+            <p:ph type="title"/>
+          </p:nvPr>
+        </p:nvSpPr>
+        <p:spPr/>
+        <p:txBody>
+          <a:bodyPr/>
+          <a:lstStyle/>
+          <a:p>
+            <a:r>
+              <a:rPr lang="en-US" dirty="0" smtClean="0"/>
+              <a:t>Installing PHP 5.6</a:t>
+            </a:r>
+            <a:endParaRPr lang="en-US" dirty="0"/>
+          </a:p>
+        </p:txBody>
+      </p:sp>
+      <p:sp>
+        <p:nvSpPr>
+          <p:cNvPr id="3" name="Content Placeholder 2"/>
+          <p:cNvSpPr>
+            <a:spLocks noGrp="1"/>
+          </p:cNvSpPr>
+          <p:nvPr>
+            <p:ph idx="1"/>
+          </p:nvPr>
+        </p:nvSpPr>
+        <p:spPr/>
+        <p:txBody>
+          <a:bodyPr/>
+          <a:lstStyle/>
+          <a:p>
+            <a:r>
+              <a:rPr lang="en-US" dirty="0" smtClean="0"/>
+              <a:t>Open terminal and check for PHP 5.6</a:t>
+            </a:r>
+          </a:p>
+          <a:p>
+            <a:pPr lvl="1"/>
+            <a:r>
+              <a:rPr lang="en-US" dirty="0" err="1" smtClean="0"/>
+              <a:t>php</a:t>
+            </a:r>
+            <a:r>
+              <a:rPr lang="en-US" dirty="0" smtClean="0"/>
+              <a:t> –v</a:t>
+            </a:r>
+          </a:p>
+          <a:p>
+            <a:r>
+              <a:rPr lang="en-US" dirty="0" smtClean="0"/>
+              <a:t>Check for </a:t>
+            </a:r>
+            <a:r>
+              <a:rPr lang="en-US" dirty="0" err="1" smtClean="0"/>
+              <a:t>pdo_sqlite</a:t>
+            </a:r>
+            <a:endParaRPr lang="en-US" dirty="0" smtClean="0"/>
+          </a:p>
+          <a:p>
+            <a:pPr lvl="1"/>
+            <a:r>
+              <a:rPr lang="en-US" dirty="0" err="1" smtClean="0"/>
+              <a:t>php</a:t>
+            </a:r>
+            <a:r>
+              <a:rPr lang="en-US" dirty="0" smtClean="0"/>
+              <a:t> -m</a:t>
+            </a:r>
+            <a:endParaRPr lang="en-US" dirty="0"/>
+          </a:p>
+        </p:txBody>
+      </p:sp>
+    </p:spTree>
+    <p:extLst>
+      <p:ext uri="{BB962C8B-B14F-4D97-AF65-F5344CB8AC3E}">
+        <p14:creationId xmlns:p14="http://schemas.microsoft.com/office/powerpoint/2010/main" val="2296202029"/>
+      </p:ext>
+    </p:extLst>
+  </p:cSld>
+  <p:clrMapOvr>
+    <a:masterClrMapping/>
+  </p:clrMapOvr>
+</p:sld>
+</file>
+
+<file path=ppt/slides/slide22.xml><?xml version="1.0" encoding="utf-8"?>
+<p:sld xmlns:a="http://schemas.openxmlformats.org/drawingml/2006/main" xmlns:r="http://schemas.openxmlformats.org/officeDocument/2006/relationships" xmlns:p="http://schemas.openxmlformats.org/presentationml/2006/main">
+  <p:cSld>
+    <p:spTree>
+      <p:nvGrpSpPr>
+        <p:cNvPr id="1" name=""/>
+        <p:cNvGrpSpPr/>
+        <p:nvPr/>
+      </p:nvGrpSpPr>
+      <p:grpSpPr>
+        <a:xfrm>
+          <a:off x="0" y="0"/>
+          <a:ext cx="0" cy="0"/>
+          <a:chOff x="0" y="0"/>
+          <a:chExt cx="0" cy="0"/>
+        </a:xfrm>
+      </p:grpSpPr>
+      <p:sp>
+        <p:nvSpPr>
+          <p:cNvPr id="2" name="Title 1"/>
+          <p:cNvSpPr>
+            <a:spLocks noGrp="1"/>
+          </p:cNvSpPr>
+          <p:nvPr>
+            <p:ph type="title"/>
+          </p:nvPr>
+        </p:nvSpPr>
+        <p:spPr/>
+        <p:txBody>
+          <a:bodyPr/>
+          <a:lstStyle/>
+          <a:p>
+            <a:r>
+              <a:rPr lang="en-US" dirty="0" smtClean="0"/>
+              <a:t>Installing PHP 5.6</a:t>
+            </a:r>
+            <a:endParaRPr lang="en-US" dirty="0"/>
+          </a:p>
+        </p:txBody>
+      </p:sp>
+      <p:sp>
+        <p:nvSpPr>
+          <p:cNvPr id="3" name="Content Placeholder 2"/>
+          <p:cNvSpPr>
+            <a:spLocks noGrp="1"/>
+          </p:cNvSpPr>
+          <p:nvPr>
+            <p:ph idx="1"/>
+          </p:nvPr>
+        </p:nvSpPr>
+        <p:spPr/>
+        <p:txBody>
+          <a:bodyPr>
+            <a:normAutofit lnSpcReduction="10000"/>
+          </a:bodyPr>
+          <a:lstStyle/>
+          <a:p>
+            <a:pPr marL="0" indent="0">
+              <a:buNone/>
+            </a:pPr>
+            <a:r>
+              <a:rPr lang="en-US" dirty="0" err="1"/>
+              <a:t>sudo</a:t>
+            </a:r>
+            <a:r>
+              <a:rPr lang="en-US" dirty="0"/>
+              <a:t> apt-get </a:t>
+            </a:r>
+            <a:r>
+              <a:rPr lang="en-US" dirty="0" smtClean="0"/>
+              <a:t>update</a:t>
+            </a:r>
+          </a:p>
+          <a:p>
+            <a:pPr marL="0" indent="0">
+              <a:buNone/>
+            </a:pPr>
+            <a:r>
+              <a:rPr lang="en-US" dirty="0" err="1" smtClean="0"/>
+              <a:t>sudo</a:t>
+            </a:r>
+            <a:r>
+              <a:rPr lang="en-US" dirty="0" smtClean="0"/>
+              <a:t> </a:t>
+            </a:r>
+            <a:r>
+              <a:rPr lang="en-US" dirty="0"/>
+              <a:t>apt-get install </a:t>
+            </a:r>
+            <a:r>
+              <a:rPr lang="en-US" dirty="0" smtClean="0"/>
+              <a:t>python-software-properties</a:t>
+            </a:r>
+          </a:p>
+          <a:p>
+            <a:pPr marL="0" indent="0">
+              <a:buNone/>
+            </a:pPr>
+            <a:r>
+              <a:rPr lang="en-US" dirty="0" err="1"/>
+              <a:t>sudo</a:t>
+            </a:r>
+            <a:r>
+              <a:rPr lang="en-US" dirty="0"/>
+              <a:t> add-apt-repository </a:t>
+            </a:r>
+            <a:r>
+              <a:rPr lang="en-US" dirty="0" err="1" smtClean="0"/>
+              <a:t>ppa:ondrej</a:t>
+            </a:r>
+            <a:r>
+              <a:rPr lang="en-US" dirty="0" smtClean="0"/>
+              <a:t>/php5-5.6</a:t>
+            </a:r>
+          </a:p>
+          <a:p>
+            <a:pPr marL="0" indent="0">
+              <a:buNone/>
+            </a:pPr>
+            <a:r>
+              <a:rPr lang="en-US" dirty="0" err="1"/>
+              <a:t>sudo</a:t>
+            </a:r>
+            <a:r>
+              <a:rPr lang="en-US" dirty="0"/>
+              <a:t> apt-get update</a:t>
+            </a:r>
+          </a:p>
+          <a:p>
+            <a:pPr marL="0" indent="0">
+              <a:buNone/>
+            </a:pPr>
+            <a:r>
+              <a:rPr lang="en-US" dirty="0" err="1"/>
+              <a:t>sudo</a:t>
+            </a:r>
+            <a:r>
+              <a:rPr lang="en-US" dirty="0"/>
+              <a:t> apt-get </a:t>
+            </a:r>
+            <a:r>
+              <a:rPr lang="en-US" dirty="0" err="1" smtClean="0"/>
+              <a:t>dist</a:t>
+            </a:r>
+            <a:r>
+              <a:rPr lang="en-US" dirty="0" smtClean="0"/>
+              <a:t>-upgrade</a:t>
+            </a:r>
+          </a:p>
+          <a:p>
+            <a:pPr marL="0" indent="0">
+              <a:buNone/>
+            </a:pPr>
+            <a:r>
+              <a:rPr lang="en-US" dirty="0" err="1"/>
+              <a:t>sudo</a:t>
+            </a:r>
+            <a:r>
+              <a:rPr lang="en-US" dirty="0"/>
+              <a:t> apt-get install </a:t>
+            </a:r>
+            <a:r>
+              <a:rPr lang="en-US" dirty="0" smtClean="0"/>
+              <a:t>php5 </a:t>
+            </a:r>
+            <a:r>
+              <a:rPr lang="en-US" dirty="0" err="1" smtClean="0"/>
+              <a:t>php-sqlite</a:t>
+            </a:r>
+            <a:endParaRPr lang="en-US" dirty="0" smtClean="0"/>
+          </a:p>
+          <a:p>
+            <a:pPr marL="0" indent="0">
+              <a:buNone/>
+            </a:pPr>
+            <a:r>
+              <a:rPr lang="en-US" dirty="0" err="1" smtClean="0"/>
+              <a:t>php</a:t>
+            </a:r>
+            <a:r>
+              <a:rPr lang="en-US" dirty="0" smtClean="0"/>
+              <a:t> –v</a:t>
+            </a:r>
+          </a:p>
+          <a:p>
+            <a:pPr marL="0" indent="0">
+              <a:buNone/>
+            </a:pPr>
+            <a:r>
+              <a:rPr lang="en-US" dirty="0" err="1" smtClean="0"/>
+              <a:t>php</a:t>
+            </a:r>
+            <a:r>
+              <a:rPr lang="en-US" dirty="0" smtClean="0"/>
+              <a:t> -m</a:t>
+            </a:r>
+            <a:endParaRPr lang="en-US" dirty="0"/>
+          </a:p>
+        </p:txBody>
+      </p:sp>
+    </p:spTree>
+    <p:extLst>
+      <p:ext uri="{BB962C8B-B14F-4D97-AF65-F5344CB8AC3E}">
+        <p14:creationId xmlns:p14="http://schemas.microsoft.com/office/powerpoint/2010/main" val="2214356901"/>
+      </p:ext>
+    </p:extLst>
+  </p:cSld>
+  <p:clrMapOvr>
+    <a:masterClrMapping/>
+  </p:clrMapOvr>
+</p:sld>
+</file>
+
+<file path=ppt/slides/slide23.xml><?xml version="1.0" encoding="utf-8"?>
+<p:sld xmlns:a="http://schemas.openxmlformats.org/drawingml/2006/main" xmlns:r="http://schemas.openxmlformats.org/officeDocument/2006/relationships" xmlns:p="http://schemas.openxmlformats.org/presentationml/2006/main">
+  <p:cSld>
+    <p:spTree>
+      <p:nvGrpSpPr>
+        <p:cNvPr id="1" name=""/>
+        <p:cNvGrpSpPr/>
+        <p:nvPr/>
+      </p:nvGrpSpPr>
+      <p:grpSpPr>
+        <a:xfrm>
+          <a:off x="0" y="0"/>
+          <a:ext cx="0" cy="0"/>
+          <a:chOff x="0" y="0"/>
+          <a:chExt cx="0" cy="0"/>
+        </a:xfrm>
+      </p:grpSpPr>
+      <p:sp>
+        <p:nvSpPr>
+          <p:cNvPr id="2" name="Title 1"/>
+          <p:cNvSpPr>
+            <a:spLocks noGrp="1"/>
+          </p:cNvSpPr>
+          <p:nvPr>
+            <p:ph type="title"/>
+          </p:nvPr>
+        </p:nvSpPr>
+        <p:spPr/>
+        <p:txBody>
+          <a:bodyPr/>
+          <a:lstStyle/>
+          <a:p>
+            <a:r>
+              <a:rPr lang="en-US" dirty="0" smtClean="0"/>
+              <a:t>Tools</a:t>
+            </a:r>
+            <a:endParaRPr lang="en-US" dirty="0"/>
+          </a:p>
+        </p:txBody>
+      </p:sp>
+      <p:sp>
+        <p:nvSpPr>
+          <p:cNvPr id="3" name="Content Placeholder 2"/>
+          <p:cNvSpPr>
+            <a:spLocks noGrp="1"/>
+          </p:cNvSpPr>
+          <p:nvPr>
+            <p:ph idx="1"/>
+          </p:nvPr>
+        </p:nvSpPr>
+        <p:spPr/>
+        <p:txBody>
+          <a:bodyPr/>
+          <a:lstStyle/>
+          <a:p>
+            <a:r>
+              <a:rPr lang="en-US" dirty="0">
+                <a:hlinkClick r:id="rId3"/>
+              </a:rPr>
+              <a:t>https://apps.ubuntu.com/cat/applications/sqlitebrowser</a:t>
+            </a:r>
+            <a:r>
+              <a:rPr lang="en-US" dirty="0" smtClean="0">
+                <a:hlinkClick r:id="rId3"/>
+              </a:rPr>
+              <a:t>/</a:t>
+            </a:r>
+            <a:endParaRPr lang="en-US" dirty="0" smtClean="0"/>
+          </a:p>
+          <a:p>
+            <a:r>
+              <a:rPr lang="en-US" dirty="0">
+                <a:hlinkClick r:id="rId4"/>
+              </a:rPr>
+              <a:t>http://komodoide.com/komodo-edit</a:t>
+            </a:r>
+            <a:r>
+              <a:rPr lang="en-US" dirty="0" smtClean="0">
+                <a:hlinkClick r:id="rId4"/>
+              </a:rPr>
+              <a:t>/</a:t>
+            </a:r>
+            <a:r>
+              <a:rPr lang="en-US" dirty="0" smtClean="0"/>
+              <a:t> </a:t>
+            </a:r>
+          </a:p>
+          <a:p>
+            <a:endParaRPr lang="en-US" dirty="0"/>
+          </a:p>
+          <a:p>
+            <a:r>
+              <a:rPr lang="en-US" dirty="0" smtClean="0"/>
+              <a:t>These should have installers, be available via apt-get or Ubuntu's software store, or you can compile them</a:t>
+            </a:r>
+            <a:endParaRPr lang="en-US" dirty="0"/>
+          </a:p>
+        </p:txBody>
+      </p:sp>
+    </p:spTree>
+    <p:extLst>
+      <p:ext uri="{BB962C8B-B14F-4D97-AF65-F5344CB8AC3E}">
+        <p14:creationId xmlns:p14="http://schemas.microsoft.com/office/powerpoint/2010/main" val="3537609734"/>
+      </p:ext>
+    </p:extLst>
+  </p:cSld>
+  <p:clrMapOvr>
+    <a:masterClrMapping/>
+  </p:clrMapOvr>
+  <p:timing>
+    <p:tnLst>
+      <p:par>
+        <p:cTn id="1" dur="indefinite" restart="never" nodeType="tmRoot"/>
+      </p:par>
+    </p:tnLst>
+  </p:timing>
+</p:sld>
+</file>
+
+<file path=ppt/slides/slide24.xml><?xml version="1.0" encoding="utf-8"?>
+<p:sld xmlns:a="http://schemas.openxmlformats.org/drawingml/2006/main" xmlns:r="http://schemas.openxmlformats.org/officeDocument/2006/relationships" xmlns:p="http://schemas.openxmlformats.org/presentationml/2006/main">
+  <p:cSld>
+    <p:spTree>
+      <p:nvGrpSpPr>
+        <p:cNvPr id="1" name=""/>
+        <p:cNvGrpSpPr/>
+        <p:nvPr/>
+      </p:nvGrpSpPr>
+      <p:grpSpPr>
+        <a:xfrm>
+          <a:off x="0" y="0"/>
+          <a:ext cx="0" cy="0"/>
+          <a:chOff x="0" y="0"/>
+          <a:chExt cx="0" cy="0"/>
+        </a:xfrm>
+      </p:grpSpPr>
+      <p:sp>
+        <p:nvSpPr>
           <p:cNvPr id="4" name="Title 3"/>
           <p:cNvSpPr>
             <a:spLocks noGrp="1"/>
@@ -6781,6 +7578,89 @@
           <a:p>
             <a:r>
               <a:rPr lang="en-US" dirty="0" smtClean="0"/>
+              <a:t>Hello World</a:t>
+            </a:r>
+            <a:endParaRPr lang="en-US" dirty="0"/>
+          </a:p>
+        </p:txBody>
+      </p:sp>
+      <p:sp>
+        <p:nvSpPr>
+          <p:cNvPr id="5" name="Text Placeholder 4"/>
+          <p:cNvSpPr>
+            <a:spLocks noGrp="1"/>
+          </p:cNvSpPr>
+          <p:nvPr>
+            <p:ph type="body" idx="1"/>
+          </p:nvPr>
+        </p:nvSpPr>
+        <p:spPr/>
+        <p:txBody>
+          <a:bodyPr/>
+          <a:lstStyle/>
+          <a:p>
+            <a:r>
+              <a:rPr lang="en-US" dirty="0" smtClean="0"/>
+              <a:t>Making sure we can run PHP code</a:t>
+            </a:r>
+            <a:endParaRPr lang="en-US" dirty="0"/>
+          </a:p>
+        </p:txBody>
+      </p:sp>
+    </p:spTree>
+    <p:extLst>
+      <p:ext uri="{BB962C8B-B14F-4D97-AF65-F5344CB8AC3E}">
+        <p14:creationId xmlns:p14="http://schemas.microsoft.com/office/powerpoint/2010/main" val="1020605476"/>
+      </p:ext>
+    </p:extLst>
+  </p:cSld>
+  <p:clrMapOvr>
+    <a:masterClrMapping/>
+  </p:clrMapOvr>
+  <p:timing>
+    <p:tnLst>
+      <p:par>
+        <p:cTn id="1" dur="indefinite" restart="never" nodeType="tmRoot"/>
+      </p:par>
+    </p:tnLst>
+  </p:timing>
+</p:sld>
+</file>
+
+<file path=ppt/slides/slide25.xml><?xml version="1.0" encoding="utf-8"?>
+<p:sld xmlns:a="http://schemas.openxmlformats.org/drawingml/2006/main" xmlns:r="http://schemas.openxmlformats.org/officeDocument/2006/relationships" xmlns:p="http://schemas.openxmlformats.org/presentationml/2006/main">
+  <p:cSld>
+    <p:spTree>
+      <p:nvGrpSpPr>
+        <p:cNvPr id="1" name=""/>
+        <p:cNvGrpSpPr/>
+        <p:nvPr/>
+      </p:nvGrpSpPr>
+      <p:grpSpPr>
+        <a:xfrm>
+          <a:off x="0" y="0"/>
+          <a:ext cx="0" cy="0"/>
+          <a:chOff x="0" y="0"/>
+          <a:chExt cx="0" cy="0"/>
+        </a:xfrm>
+      </p:grpSpPr>
+      <p:sp>
+        <p:nvSpPr>
+          <p:cNvPr id="4" name="Title 3"/>
+          <p:cNvSpPr>
+            <a:spLocks noGrp="1"/>
+          </p:cNvSpPr>
+          <p:nvPr>
+            <p:ph type="title"/>
+          </p:nvPr>
+        </p:nvSpPr>
+        <p:spPr/>
+        <p:txBody>
+          <a:bodyPr/>
+          <a:lstStyle/>
+          <a:p>
+            <a:r>
+              <a:rPr lang="en-US" dirty="0" smtClean="0"/>
               <a:t>Testing PHP Configuration</a:t>
             </a:r>
             <a:endParaRPr lang="en-US" dirty="0"/>
@@ -6800,7 +7680,7 @@
         <p:spPr/>
         <p:txBody>
           <a:bodyPr>
-            <a:normAutofit/>
+            <a:normAutofit fontScale="92500" lnSpcReduction="20000"/>
           </a:bodyPr>
           <a:lstStyle/>
           <a:p>
@@ -6814,8 +7694,29 @@
             </a:r>
             <a:r>
               <a:rPr lang="en-US" dirty="0" smtClean="0"/>
-              <a:t> in your document root</a:t>
-            </a:r>
+              <a:t> in your document </a:t>
+            </a:r>
+            <a:r>
+              <a:rPr lang="en-US" dirty="0" smtClean="0"/>
+              <a:t>root ( </a:t>
+            </a:r>
+            <a:r>
+              <a:rPr lang="en-US" dirty="0"/>
+              <a:t>or download </a:t>
+            </a:r>
+            <a:r>
+              <a:rPr lang="en-US" dirty="0" smtClean="0"/>
+              <a:t>code.zip from https</a:t>
+            </a:r>
+            <a:r>
+              <a:rPr lang="en-US" dirty="0"/>
+              <a:t>://</a:t>
+            </a:r>
+            <a:r>
+              <a:rPr lang="en-US" dirty="0" smtClean="0"/>
+              <a:t>github.com/PHPEmbark/packages/releases)</a:t>
+            </a:r>
+            <a:endParaRPr lang="en-US" dirty="0" smtClean="0"/>
           </a:p>
           <a:p>
             <a:r>
@@ -6889,7 +7790,7 @@
 </p:sld>
 </file>
 
-<file path=ppt/slides/slide22.xml><?xml version="1.0" encoding="utf-8"?>
+<file path=ppt/slides/slide26.xml><?xml version="1.0" encoding="utf-8"?>
 <p:sld xmlns:a="http://schemas.openxmlformats.org/drawingml/2006/main" xmlns:r="http://schemas.openxmlformats.org/officeDocument/2006/relationships" xmlns:p="http://schemas.openxmlformats.org/presentationml/2006/main">
   <p:cSld>
     <p:spTree>
@@ -7121,7 +8022,7 @@
 </p:sld>
 </file>
 
-<file path=ppt/slides/slide23.xml><?xml version="1.0" encoding="utf-8"?>
+<file path=ppt/slides/slide27.xml><?xml version="1.0" encoding="utf-8"?>
 <p:sld xmlns:a="http://schemas.openxmlformats.org/drawingml/2006/main" xmlns:r="http://schemas.openxmlformats.org/officeDocument/2006/relationships" xmlns:p="http://schemas.openxmlformats.org/presentationml/2006/main">
   <p:cSld>
     <p:spTree>
@@ -7255,7 +8156,7 @@
 </p:sld>
 </file>
 
-<file path=ppt/slides/slide24.xml><?xml version="1.0" encoding="utf-8"?>
+<file path=ppt/slides/slide28.xml><?xml version="1.0" encoding="utf-8"?>
 <p:sld xmlns:a="http://schemas.openxmlformats.org/drawingml/2006/main" xmlns:r="http://schemas.openxmlformats.org/officeDocument/2006/relationships" xmlns:p="http://schemas.openxmlformats.org/presentationml/2006/main">
   <p:cSld>
     <p:spTree>
@@ -7693,7 +8594,31 @@
             </a:r>
             <a:r>
               <a:rPr lang="en-US" dirty="0" smtClean="0"/>
-              <a:t> and hello world scripts</a:t>
+              <a:t> and hello world </a:t>
+            </a:r>
+            <a:r>
+              <a:rPr lang="en-US" dirty="0" smtClean="0"/>
+              <a:t>scripts</a:t>
+            </a:r>
+          </a:p>
+          <a:p>
+            <a:r>
+              <a:rPr lang="en-US" dirty="0" smtClean="0"/>
+              <a:t>A tool to edit text files that supports PHP syntax highlighting</a:t>
+            </a:r>
+          </a:p>
+          <a:p>
+            <a:r>
+              <a:rPr lang="en-US" dirty="0" smtClean="0"/>
+              <a:t>A tool to edit </a:t>
+            </a:r>
+            <a:r>
+              <a:rPr lang="en-US" dirty="0" err="1" smtClean="0"/>
+              <a:t>sqlite</a:t>
+            </a:r>
+            <a:r>
+              <a:rPr lang="en-US" dirty="0" smtClean="0"/>
+              <a:t> databases</a:t>
             </a:r>
             <a:endParaRPr lang="en-US" dirty="0"/>
           </a:p>
@@ -7843,7 +8768,7 @@
           <a:p>
             <a:r>
               <a:rPr lang="en-US" dirty="0" smtClean="0"/>
-              <a:t>Installation</a:t>
+              <a:t>Installing PHP 5.6</a:t>
             </a:r>
             <a:endParaRPr lang="en-US" dirty="0"/>
           </a:p>
@@ -7866,76 +8791,40 @@
           <a:p>
             <a:r>
               <a:rPr lang="en-US" dirty="0" smtClean="0"/>
-              <a:t>check if </a:t>
-            </a:r>
+              <a:t>Open terminal and check for PHP 5.6</a:t>
+            </a:r>
+          </a:p>
+          <a:p>
+            <a:pPr lvl="1"/>
             <a:r>
               <a:rPr lang="en-US" dirty="0" err="1" smtClean="0"/>
               <a:t>php</a:t>
             </a:r>
             <a:r>
               <a:rPr lang="en-US" dirty="0" smtClean="0"/>
-              <a:t> is already </a:t>
-            </a:r>
-            <a:r>
-              <a:rPr lang="en-US" dirty="0" smtClean="0"/>
-              <a:t>installed and the right version</a:t>
+              <a:t> –v</a:t>
+            </a:r>
+          </a:p>
+          <a:p>
+            <a:r>
+              <a:rPr lang="en-US" dirty="0" smtClean="0"/>
+              <a:t>Check for </a:t>
+            </a:r>
+            <a:r>
+              <a:rPr lang="en-US" dirty="0" err="1" smtClean="0"/>
+              <a:t>pdo_sqlite</a:t>
             </a:r>
             <a:endParaRPr lang="en-US" dirty="0" smtClean="0"/>
           </a:p>
           <a:p>
-            <a:r>
-              <a:rPr lang="en-US" dirty="0" smtClean="0"/>
-              <a:t>check if </a:t>
-            </a:r>
-            <a:r>
-              <a:rPr lang="en-US" dirty="0" err="1" smtClean="0"/>
-              <a:t>sqlite</a:t>
-            </a:r>
-            <a:r>
-              <a:rPr lang="en-US" dirty="0" smtClean="0"/>
-              <a:t> is available</a:t>
-            </a:r>
-          </a:p>
-          <a:p>
-            <a:r>
-              <a:rPr lang="en-US" dirty="0" smtClean="0"/>
-              <a:t>run the built in </a:t>
-            </a:r>
+            <a:pPr lvl="1"/>
             <a:r>
               <a:rPr lang="en-US" dirty="0" err="1" smtClean="0"/>
               <a:t>php</a:t>
             </a:r>
             <a:r>
               <a:rPr lang="en-US" dirty="0" smtClean="0"/>
-              <a:t> webserver, make sure it works</a:t>
-            </a:r>
-          </a:p>
-          <a:p>
-            <a:r>
-              <a:rPr lang="en-US" dirty="0" smtClean="0"/>
-              <a:t>Install your text editor, if not already set up</a:t>
-            </a:r>
-          </a:p>
-          <a:p>
-            <a:r>
-              <a:rPr lang="en-US" dirty="0" smtClean="0"/>
-              <a:t>Install </a:t>
-            </a:r>
-            <a:r>
-              <a:rPr lang="en-US" dirty="0" err="1" smtClean="0"/>
-              <a:t>db</a:t>
-            </a:r>
-            <a:r>
-              <a:rPr lang="en-US" dirty="0" smtClean="0"/>
-              <a:t> browser for </a:t>
-            </a:r>
-            <a:r>
-              <a:rPr lang="en-US" dirty="0" err="1" smtClean="0"/>
-              <a:t>sqlite</a:t>
-            </a:r>
-            <a:r>
-              <a:rPr lang="en-US" dirty="0" smtClean="0"/>
-              <a:t>, if not already set up</a:t>
+              <a:t> -m</a:t>
             </a:r>
             <a:endParaRPr lang="en-US" dirty="0"/>
           </a:p>
@@ -7944,20 +8833,13 @@
     </p:spTree>
     <p:extLst>
       <p:ext uri="{BB962C8B-B14F-4D97-AF65-F5344CB8AC3E}">
-        <p14:creationId xmlns:p14="http://schemas.microsoft.com/office/powerpoint/2010/main" val="4043785249"/>
+        <p14:creationId xmlns:p14="http://schemas.microsoft.com/office/powerpoint/2010/main" val="2234148892"/>
       </p:ext>
     </p:extLst>
   </p:cSld>
   <p:clrMapOvr>
     <a:masterClrMapping/>
   </p:clrMapOvr>
-  <p:timing>
-    <p:tnLst>
-      <p:par>
-        <p:cTn id="1" dur="indefinite" restart="never" nodeType="tmRoot"/>
-      </p:par>
-    </p:tnLst>
-  </p:timing>
 </p:sld>
 </file>
 
@@ -7995,54 +8877,77 @@
           <a:p>
             <a:r>
               <a:rPr lang="en-US" dirty="0" smtClean="0"/>
-              <a:t>Windows</a:t>
+              <a:t>Update your version</a:t>
             </a:r>
             <a:endParaRPr lang="en-US" dirty="0"/>
           </a:p>
         </p:txBody>
       </p:sp>
-      <p:pic>
-        <p:nvPicPr>
-          <p:cNvPr id="4" name="Content Placeholder 3" descr="Windows_logo_-_2012.png"/>
-          <p:cNvPicPr>
-            <a:picLocks noGrp="1" noChangeAspect="1"/>
-          </p:cNvPicPr>
+      <p:sp>
+        <p:nvSpPr>
+          <p:cNvPr id="3" name="Content Placeholder 2"/>
+          <p:cNvSpPr>
+            <a:spLocks noGrp="1"/>
+          </p:cNvSpPr>
           <p:nvPr>
             <p:ph idx="1"/>
           </p:nvPr>
-        </p:nvPicPr>
-        <p:blipFill>
-          <a:blip r:embed="rId3">
-            <a:extLst>
-              <a:ext uri="{28A0092B-C50C-407E-A947-70E740481C1C}">
-                <a14:useLocalDpi xmlns:a14="http://schemas.microsoft.com/office/drawing/2010/main" val="0"/>
-              </a:ext>
-            </a:extLst>
-          </a:blip>
-          <a:srcRect l="-49674" r="-49674"/>
-          <a:stretch>
-            <a:fillRect/>
-          </a:stretch>
-        </p:blipFill>
-        <p:spPr/>
-      </p:pic>
+        </p:nvSpPr>
+        <p:spPr/>
+        <p:txBody>
+          <a:bodyPr/>
+          <a:lstStyle/>
+          <a:p>
+            <a:r>
+              <a:rPr lang="en-US" dirty="0">
+                <a:hlinkClick r:id="rId2"/>
+              </a:rPr>
+              <a:t>http://php-osx.liip.ch</a:t>
+            </a:r>
+            <a:r>
+              <a:rPr lang="en-US" dirty="0" smtClean="0">
+                <a:hlinkClick r:id="rId2"/>
+              </a:rPr>
+              <a:t>/</a:t>
+            </a:r>
+            <a:endParaRPr lang="en-US" dirty="0" smtClean="0"/>
+          </a:p>
+          <a:p>
+            <a:r>
+              <a:rPr lang="en-US" dirty="0" smtClean="0"/>
+              <a:t>homebrew</a:t>
+            </a:r>
+          </a:p>
+          <a:p>
+            <a:pPr lvl="1"/>
+            <a:r>
+              <a:rPr lang="en-US" dirty="0"/>
+              <a:t>brew options </a:t>
+            </a:r>
+            <a:r>
+              <a:rPr lang="en-US" dirty="0" smtClean="0"/>
+              <a:t>php56</a:t>
+            </a:r>
+          </a:p>
+          <a:p>
+            <a:pPr lvl="1"/>
+            <a:r>
+              <a:rPr lang="en-US" dirty="0"/>
+              <a:t>brew install php56</a:t>
+            </a:r>
+          </a:p>
+        </p:txBody>
+      </p:sp>
     </p:spTree>
     <p:extLst>
       <p:ext uri="{BB962C8B-B14F-4D97-AF65-F5344CB8AC3E}">
-        <p14:creationId xmlns:p14="http://schemas.microsoft.com/office/powerpoint/2010/main" val="4003632236"/>
+        <p14:creationId xmlns:p14="http://schemas.microsoft.com/office/powerpoint/2010/main" val="500324419"/>
       </p:ext>
     </p:extLst>
   </p:cSld>
   <p:clrMapOvr>
     <a:masterClrMapping/>
   </p:clrMapOvr>
-  <p:timing>
-    <p:tnLst>
-      <p:par>
-        <p:cTn id="1" dur="indefinite" restart="never" nodeType="tmRoot"/>
-      </p:par>
-    </p:tnLst>
-  </p:timing>
 </p:sld>
 </file>
 
@@ -8080,7 +8985,7 @@
           <a:p>
             <a:r>
               <a:rPr lang="en-US" dirty="0" smtClean="0"/>
-              <a:t>The Windows Package</a:t>
+              <a:t>Tools</a:t>
             </a:r>
             <a:endParaRPr lang="en-US" dirty="0"/>
           </a:p>
@@ -8102,38 +9007,58 @@
           <a:lstStyle/>
           <a:p>
             <a:r>
-              <a:rPr lang="en-US" dirty="0" smtClean="0"/>
-              <a:t>Includes a stripped down PHP executable</a:t>
-            </a:r>
-          </a:p>
-          <a:p>
-            <a:r>
-              <a:rPr lang="en-US" dirty="0" smtClean="0"/>
-              <a:t>Includes a batch file to run the built in server and serve from the code directory inside</a:t>
-            </a:r>
-          </a:p>
-          <a:p>
-            <a:r>
-              <a:rPr lang="en-US" dirty="0" smtClean="0"/>
-              <a:t>You can alter the code location if you choose in the batch file</a:t>
-            </a:r>
-          </a:p>
-          <a:p>
-            <a:r>
-              <a:rPr lang="en-US" dirty="0" smtClean="0"/>
-              <a:t>Includes a portable install of komodo edit and </a:t>
+              <a:rPr lang="en-US" dirty="0">
+                <a:hlinkClick r:id="rId3"/>
+              </a:rPr>
+              <a:t>https://</a:t>
+            </a:r>
+            <a:r>
+              <a:rPr lang="en-US" dirty="0" smtClean="0">
+                <a:hlinkClick r:id="rId3"/>
+              </a:rPr>
+              <a:t>github.com/sqlitebrowser/sqlitebrowser/releases</a:t>
+            </a:r>
+            <a:endParaRPr lang="en-US" dirty="0" smtClean="0"/>
+          </a:p>
+          <a:p>
+            <a:r>
+              <a:rPr lang="en-US" dirty="0" smtClean="0">
+                <a:hlinkClick r:id="rId4"/>
+              </a:rPr>
+              <a:t>http</a:t>
+            </a:r>
+            <a:r>
+              <a:rPr lang="en-US" dirty="0">
+                <a:hlinkClick r:id="rId4"/>
+              </a:rPr>
+              <a:t>://komodoide.com/komodo-edit</a:t>
+            </a:r>
+            <a:r>
+              <a:rPr lang="en-US" dirty="0" smtClean="0">
+                <a:hlinkClick r:id="rId4"/>
+              </a:rPr>
+              <a:t>/</a:t>
+            </a:r>
+            <a:r>
+              <a:rPr lang="en-US" dirty="0" smtClean="0"/>
+              <a:t> </a:t>
+            </a:r>
+          </a:p>
+          <a:p>
+            <a:endParaRPr lang="en-US" dirty="0"/>
+          </a:p>
+          <a:p>
+            <a:r>
+              <a:rPr lang="en-US" dirty="0" smtClean="0"/>
+              <a:t>Both have </a:t>
             </a:r>
             <a:r>
               <a:rPr lang="en-US" dirty="0" err="1" smtClean="0"/>
-              <a:t>db</a:t>
-            </a:r>
-            <a:r>
-              <a:rPr lang="en-US" dirty="0" smtClean="0"/>
-              <a:t> browser for </a:t>
-            </a:r>
-            <a:r>
-              <a:rPr lang="en-US" dirty="0" err="1" smtClean="0"/>
-              <a:t>sqlite</a:t>
+              <a:t>dmg</a:t>
+            </a:r>
+            <a:r>
+              <a:rPr lang="en-US" dirty="0" smtClean="0"/>
+              <a:t> packages for installation on mac</a:t>
             </a:r>
             <a:endParaRPr lang="en-US" dirty="0"/>
           </a:p>
@@ -8142,7 +9067,7 @@
     </p:spTree>
     <p:extLst>
       <p:ext uri="{BB962C8B-B14F-4D97-AF65-F5344CB8AC3E}">
-        <p14:creationId xmlns:p14="http://schemas.microsoft.com/office/powerpoint/2010/main" val="3423475601"/>
+        <p14:creationId xmlns:p14="http://schemas.microsoft.com/office/powerpoint/2010/main" val="2164129045"/>
       </p:ext>
     </p:extLst>
   </p:cSld>
@@ -8193,82 +9118,41 @@
           <a:p>
             <a:r>
               <a:rPr lang="en-US" dirty="0" smtClean="0"/>
-              <a:t>Installing from the Package</a:t>
+              <a:t>Windows</a:t>
             </a:r>
             <a:endParaRPr lang="en-US" dirty="0"/>
           </a:p>
         </p:txBody>
       </p:sp>
-      <p:sp>
-        <p:nvSpPr>
-          <p:cNvPr id="3" name="Content Placeholder 2"/>
-          <p:cNvSpPr>
-            <a:spLocks noGrp="1"/>
-          </p:cNvSpPr>
+      <p:pic>
+        <p:nvPicPr>
+          <p:cNvPr id="4" name="Content Placeholder 3" descr="Windows_logo_-_2012.png"/>
+          <p:cNvPicPr>
+            <a:picLocks noGrp="1" noChangeAspect="1"/>
+          </p:cNvPicPr>
           <p:nvPr>
             <p:ph idx="1"/>
           </p:nvPr>
-        </p:nvSpPr>
-        <p:spPr/>
-        <p:txBody>
-          <a:bodyPr>
-            <a:normAutofit lnSpcReduction="10000"/>
-          </a:bodyPr>
-          <a:lstStyle/>
-          <a:p>
-            <a:r>
-              <a:rPr lang="en-US" dirty="0" smtClean="0"/>
-              <a:t>Download the package or get from a jump drive – </a:t>
-            </a:r>
-          </a:p>
-          <a:p>
-            <a:pPr lvl="1"/>
-            <a:r>
-              <a:rPr lang="en-US" dirty="0" smtClean="0"/>
-              <a:t>link here when it's done</a:t>
-            </a:r>
-          </a:p>
-          <a:p>
-            <a:r>
-              <a:rPr lang="en-US" dirty="0" smtClean="0"/>
-              <a:t>Unzip the contents</a:t>
-            </a:r>
-          </a:p>
-          <a:p>
-            <a:r>
-              <a:rPr lang="en-US" dirty="0" smtClean="0"/>
-              <a:t>Click on the "run.bat" file</a:t>
-            </a:r>
-          </a:p>
-          <a:p>
-            <a:r>
-              <a:rPr lang="en-US" dirty="0" smtClean="0"/>
-              <a:t>It will open a window, do NOT close it, that will shut down your server</a:t>
-            </a:r>
-          </a:p>
-          <a:p>
-            <a:r>
-              <a:rPr lang="en-US" dirty="0" smtClean="0"/>
-              <a:t>Open your browser and go to </a:t>
-            </a:r>
-            <a:r>
-              <a:rPr lang="en-US" dirty="0" smtClean="0">
-                <a:hlinkClick r:id="rId3"/>
-              </a:rPr>
-              <a:t>http://localhost:8080</a:t>
-            </a:r>
-            <a:r>
-              <a:rPr lang="en-US" dirty="0" smtClean="0"/>
-              <a:t> </a:t>
-            </a:r>
-            <a:endParaRPr lang="en-US" dirty="0"/>
-          </a:p>
-        </p:txBody>
-      </p:sp>
+        </p:nvPicPr>
+        <p:blipFill>
+          <a:blip r:embed="rId3">
+            <a:extLst>
+              <a:ext uri="{28A0092B-C50C-407E-A947-70E740481C1C}">
+                <a14:useLocalDpi xmlns:a14="http://schemas.microsoft.com/office/drawing/2010/main" val="0"/>
+              </a:ext>
+            </a:extLst>
+          </a:blip>
+          <a:srcRect l="-49674" r="-49674"/>
+          <a:stretch>
+            <a:fillRect/>
+          </a:stretch>
+        </p:blipFill>
+        <p:spPr/>
+      </p:pic>
     </p:spTree>
     <p:extLst>
       <p:ext uri="{BB962C8B-B14F-4D97-AF65-F5344CB8AC3E}">
-        <p14:creationId xmlns:p14="http://schemas.microsoft.com/office/powerpoint/2010/main" val="2499706733"/>
+        <p14:creationId xmlns:p14="http://schemas.microsoft.com/office/powerpoint/2010/main" val="4003632236"/>
       </p:ext>
     </p:extLst>
   </p:cSld>

</xml_diff>

<commit_message>
Pdf version of programming slides
</commit_message>
<xml_diff>
--- a/course/0 - Setup/Setup.pptx
+++ b/course/0 - Setup/Setup.pptx
@@ -172,7 +172,7 @@
       </p14:sectionLst>
     </p:ext>
     <p:ext uri="{EFAFB233-063F-42B5-8137-9DF3F51BA10A}">
-      <p15:sldGuideLst xmlns:p15="http://schemas.microsoft.com/office/powerpoint/2012/main">
+      <p15:sldGuideLst xmlns:p15="http://schemas.microsoft.com/office/powerpoint/2012/main" xmlns="">
         <p15:guide id="1" orient="horz" pos="2160">
           <p15:clr>
             <a:srgbClr val="A4A3A4"/>
@@ -271,7 +271,7 @@
           <a:p>
             <a:fld id="{E759826C-CDF1-1343-846F-5EC65008665E}" type="datetimeFigureOut">
               <a:rPr lang="en-US" smtClean="0"/>
-              <a:t>4/13/2015</a:t>
+              <a:t>4/15/15</a:t>
             </a:fld>
             <a:endParaRPr lang="en-US"/>
           </a:p>
@@ -1641,33 +1641,7 @@
                 <a:effectLst/>
                 <a:latin typeface="Arial" panose="020B0604020202020204" pitchFamily="34" charset="0"/>
               </a:rPr>
-              <a:t>This is a very </a:t>
-            </a:r>
-            <a:r>
-              <a:rPr kumimoji="0" lang="en-US" altLang="en-US" sz="1200" b="0" i="0" u="none" strike="noStrike" cap="none" normalizeH="0" baseline="0" dirty="0" err="1" smtClean="0">
-                <a:ln>
-                  <a:noFill/>
-                </a:ln>
-                <a:solidFill>
-                  <a:schemeClr val="tx1"/>
-                </a:solidFill>
-                <a:effectLst/>
-                <a:latin typeface="Arial" panose="020B0604020202020204" pitchFamily="34" charset="0"/>
-              </a:rPr>
-              <a:t>very</a:t>
-            </a:r>
-            <a:r>
-              <a:rPr kumimoji="0" lang="en-US" altLang="en-US" sz="1200" b="0" i="0" u="none" strike="noStrike" cap="none" normalizeH="0" baseline="0" dirty="0" smtClean="0">
-                <a:ln>
-                  <a:noFill/>
-                </a:ln>
-                <a:solidFill>
-                  <a:schemeClr val="tx1"/>
-                </a:solidFill>
-                <a:effectLst/>
-                <a:latin typeface="Arial" panose="020B0604020202020204" pitchFamily="34" charset="0"/>
-              </a:rPr>
-              <a:t> simple test to make sure </a:t>
+              <a:t>This is a very very simple test to make sure </a:t>
             </a:r>
             <a:r>
               <a:rPr kumimoji="0" lang="en-US" altLang="en-US" sz="1200" b="0" i="0" u="none" strike="noStrike" cap="none" normalizeH="0" baseline="0" dirty="0" err="1" smtClean="0">
@@ -1693,8 +1667,116 @@
                 <a:effectLst/>
                 <a:latin typeface="Arial" panose="020B0604020202020204" pitchFamily="34" charset="0"/>
               </a:rPr>
-              <a:t> is working</a:t>
-            </a:r>
+              <a:t> is </a:t>
+            </a:r>
+            <a:r>
+              <a:rPr kumimoji="0" lang="en-US" altLang="en-US" sz="1200" b="0" i="0" u="none" strike="noStrike" cap="none" normalizeH="0" baseline="0" dirty="0" smtClean="0">
+                <a:ln>
+                  <a:noFill/>
+                </a:ln>
+                <a:solidFill>
+                  <a:schemeClr val="tx1"/>
+                </a:solidFill>
+                <a:effectLst/>
+                <a:latin typeface="Arial" panose="020B0604020202020204" pitchFamily="34" charset="0"/>
+              </a:rPr>
+              <a:t>working</a:t>
+            </a:r>
+          </a:p>
+          <a:p>
+            <a:endParaRPr kumimoji="0" lang="en-US" altLang="en-US" sz="1200" b="0" i="0" u="none" strike="noStrike" cap="none" normalizeH="0" baseline="0" dirty="0" smtClean="0">
+              <a:ln>
+                <a:noFill/>
+              </a:ln>
+              <a:solidFill>
+                <a:schemeClr val="tx1"/>
+              </a:solidFill>
+              <a:effectLst/>
+              <a:latin typeface="Arial" panose="020B0604020202020204" pitchFamily="34" charset="0"/>
+            </a:endParaRPr>
+          </a:p>
+          <a:p>
+            <a:r>
+              <a:rPr kumimoji="0" lang="en-US" altLang="en-US" sz="1200" b="0" i="0" u="none" strike="noStrike" cap="none" normalizeH="0" baseline="0" dirty="0" err="1" smtClean="0">
+                <a:ln>
+                  <a:noFill/>
+                </a:ln>
+                <a:solidFill>
+                  <a:schemeClr val="tx1"/>
+                </a:solidFill>
+                <a:effectLst/>
+                <a:latin typeface="Arial" panose="020B0604020202020204" pitchFamily="34" charset="0"/>
+              </a:rPr>
+              <a:t>php</a:t>
+            </a:r>
+            <a:r>
+              <a:rPr kumimoji="0" lang="en-US" altLang="en-US" sz="1200" b="0" i="0" u="none" strike="noStrike" cap="none" normalizeH="0" baseline="0" dirty="0" smtClean="0">
+                <a:ln>
+                  <a:noFill/>
+                </a:ln>
+                <a:solidFill>
+                  <a:schemeClr val="tx1"/>
+                </a:solidFill>
+                <a:effectLst/>
+                <a:latin typeface="Arial" panose="020B0604020202020204" pitchFamily="34" charset="0"/>
+              </a:rPr>
+              <a:t> tags</a:t>
+            </a:r>
+          </a:p>
+          <a:p>
+            <a:r>
+              <a:rPr kumimoji="0" lang="en-US" altLang="en-US" sz="1200" b="0" i="0" u="none" strike="noStrike" cap="none" normalizeH="0" baseline="0" dirty="0" smtClean="0">
+                <a:ln>
+                  <a:noFill/>
+                </a:ln>
+                <a:solidFill>
+                  <a:schemeClr val="tx1"/>
+                </a:solidFill>
+                <a:effectLst/>
+                <a:latin typeface="Arial" panose="020B0604020202020204" pitchFamily="34" charset="0"/>
+              </a:rPr>
+              <a:t>echo means “show this to me”</a:t>
+            </a:r>
+          </a:p>
+          <a:p>
+            <a:r>
+              <a:rPr kumimoji="0" lang="en-US" altLang="en-US" sz="1200" b="0" i="0" u="none" strike="noStrike" cap="none" normalizeH="0" baseline="0" dirty="0" smtClean="0">
+                <a:ln>
+                  <a:noFill/>
+                </a:ln>
+                <a:solidFill>
+                  <a:schemeClr val="tx1"/>
+                </a:solidFill>
+                <a:effectLst/>
+                <a:latin typeface="Arial" panose="020B0604020202020204" pitchFamily="34" charset="0"/>
+              </a:rPr>
+              <a:t>don’t necessarily </a:t>
+            </a:r>
+            <a:r>
+              <a:rPr kumimoji="0" lang="en-US" altLang="en-US" sz="1200" b="0" i="0" u="none" strike="noStrike" cap="none" normalizeH="0" baseline="0" smtClean="0">
+                <a:ln>
+                  <a:noFill/>
+                </a:ln>
+                <a:solidFill>
+                  <a:schemeClr val="tx1"/>
+                </a:solidFill>
+                <a:effectLst/>
+                <a:latin typeface="Arial" panose="020B0604020202020204" pitchFamily="34" charset="0"/>
+              </a:rPr>
+              <a:t>need closing tags</a:t>
+            </a:r>
+          </a:p>
+          <a:p>
+            <a:endParaRPr kumimoji="0" lang="en-US" altLang="en-US" sz="1200" b="0" i="0" u="none" strike="noStrike" cap="none" normalizeH="0" baseline="0" dirty="0" smtClean="0">
+              <a:ln>
+                <a:noFill/>
+              </a:ln>
+              <a:solidFill>
+                <a:schemeClr val="tx1"/>
+              </a:solidFill>
+              <a:effectLst/>
+              <a:latin typeface="Arial" panose="020B0604020202020204" pitchFamily="34" charset="0"/>
+            </a:endParaRPr>
           </a:p>
         </p:txBody>
       </p:sp>
@@ -2615,7 +2697,7 @@
           <a:p>
             <a:fld id="{ABB552BE-1EA2-CA46-B5AB-EBCC0D015347}" type="datetimeFigureOut">
               <a:rPr lang="en-US" smtClean="0"/>
-              <a:t>4/13/2015</a:t>
+              <a:t>4/15/15</a:t>
             </a:fld>
             <a:endParaRPr lang="en-US"/>
           </a:p>
@@ -2785,7 +2867,7 @@
           <a:p>
             <a:fld id="{ABB552BE-1EA2-CA46-B5AB-EBCC0D015347}" type="datetimeFigureOut">
               <a:rPr lang="en-US" smtClean="0"/>
-              <a:t>4/13/2015</a:t>
+              <a:t>4/15/15</a:t>
             </a:fld>
             <a:endParaRPr lang="en-US"/>
           </a:p>
@@ -2965,7 +3047,7 @@
           <a:p>
             <a:fld id="{ABB552BE-1EA2-CA46-B5AB-EBCC0D015347}" type="datetimeFigureOut">
               <a:rPr lang="en-US" smtClean="0"/>
-              <a:t>4/13/2015</a:t>
+              <a:t>4/15/15</a:t>
             </a:fld>
             <a:endParaRPr lang="en-US"/>
           </a:p>
@@ -3135,7 +3217,7 @@
           <a:p>
             <a:fld id="{ABB552BE-1EA2-CA46-B5AB-EBCC0D015347}" type="datetimeFigureOut">
               <a:rPr lang="en-US" smtClean="0"/>
-              <a:t>4/13/2015</a:t>
+              <a:t>4/15/15</a:t>
             </a:fld>
             <a:endParaRPr lang="en-US"/>
           </a:p>
@@ -3381,7 +3463,7 @@
           <a:p>
             <a:fld id="{ABB552BE-1EA2-CA46-B5AB-EBCC0D015347}" type="datetimeFigureOut">
               <a:rPr lang="en-US" smtClean="0"/>
-              <a:t>4/13/2015</a:t>
+              <a:t>4/15/15</a:t>
             </a:fld>
             <a:endParaRPr lang="en-US"/>
           </a:p>
@@ -3669,7 +3751,7 @@
           <a:p>
             <a:fld id="{ABB552BE-1EA2-CA46-B5AB-EBCC0D015347}" type="datetimeFigureOut">
               <a:rPr lang="en-US" smtClean="0"/>
-              <a:t>4/13/2015</a:t>
+              <a:t>4/15/15</a:t>
             </a:fld>
             <a:endParaRPr lang="en-US"/>
           </a:p>
@@ -4091,7 +4173,7 @@
           <a:p>
             <a:fld id="{ABB552BE-1EA2-CA46-B5AB-EBCC0D015347}" type="datetimeFigureOut">
               <a:rPr lang="en-US" smtClean="0"/>
-              <a:t>4/13/2015</a:t>
+              <a:t>4/15/15</a:t>
             </a:fld>
             <a:endParaRPr lang="en-US"/>
           </a:p>
@@ -4209,7 +4291,7 @@
           <a:p>
             <a:fld id="{ABB552BE-1EA2-CA46-B5AB-EBCC0D015347}" type="datetimeFigureOut">
               <a:rPr lang="en-US" smtClean="0"/>
-              <a:t>4/13/2015</a:t>
+              <a:t>4/15/15</a:t>
             </a:fld>
             <a:endParaRPr lang="en-US"/>
           </a:p>
@@ -4304,7 +4386,7 @@
           <a:p>
             <a:fld id="{ABB552BE-1EA2-CA46-B5AB-EBCC0D015347}" type="datetimeFigureOut">
               <a:rPr lang="en-US" smtClean="0"/>
-              <a:t>4/13/2015</a:t>
+              <a:t>4/15/15</a:t>
             </a:fld>
             <a:endParaRPr lang="en-US"/>
           </a:p>
@@ -4581,7 +4663,7 @@
           <a:p>
             <a:fld id="{ABB552BE-1EA2-CA46-B5AB-EBCC0D015347}" type="datetimeFigureOut">
               <a:rPr lang="en-US" smtClean="0"/>
-              <a:t>4/13/2015</a:t>
+              <a:t>4/15/15</a:t>
             </a:fld>
             <a:endParaRPr lang="en-US"/>
           </a:p>
@@ -4834,7 +4916,7 @@
           <a:p>
             <a:fld id="{ABB552BE-1EA2-CA46-B5AB-EBCC0D015347}" type="datetimeFigureOut">
               <a:rPr lang="en-US" smtClean="0"/>
-              <a:t>4/13/2015</a:t>
+              <a:t>4/15/15</a:t>
             </a:fld>
             <a:endParaRPr lang="en-US"/>
           </a:p>
@@ -5047,7 +5129,7 @@
           <a:p>
             <a:fld id="{ABB552BE-1EA2-CA46-B5AB-EBCC0D015347}" type="datetimeFigureOut">
               <a:rPr lang="en-US" smtClean="0"/>
-              <a:t>4/13/2015</a:t>
+              <a:t>4/15/15</a:t>
             </a:fld>
             <a:endParaRPr lang="en-US"/>
           </a:p>
@@ -5481,7 +5563,7 @@
   <p:timing>
     <p:tnLst>
       <p:par>
-        <p:cTn id="1" dur="indefinite" restart="never" nodeType="tmRoot"/>
+        <p:cTn xmlns:p14="http://schemas.microsoft.com/office/powerpoint/2010/main" id="1" dur="indefinite" restart="never" nodeType="tmRoot"/>
       </p:par>
     </p:tnLst>
   </p:timing>
@@ -5586,7 +5668,7 @@
   <p:timing>
     <p:tnLst>
       <p:par>
-        <p:cTn id="1" dur="indefinite" restart="never" nodeType="tmRoot"/>
+        <p:cTn xmlns:p14="http://schemas.microsoft.com/office/powerpoint/2010/main" id="1" dur="indefinite" restart="never" nodeType="tmRoot"/>
       </p:par>
     </p:tnLst>
   </p:timing>
@@ -5627,15 +5709,7 @@
           <a:p>
             <a:r>
               <a:rPr lang="en-US" dirty="0" smtClean="0"/>
-              <a:t>Installing </a:t>
-            </a:r>
-            <a:r>
-              <a:rPr lang="en-US" dirty="0" smtClean="0"/>
-              <a:t>PHP from </a:t>
-            </a:r>
-            <a:r>
-              <a:rPr lang="en-US" dirty="0" smtClean="0"/>
-              <a:t>the Package</a:t>
+              <a:t>Installing PHP from the Package</a:t>
             </a:r>
             <a:endParaRPr lang="en-US" dirty="0"/>
           </a:p>
@@ -5679,25 +5753,13 @@
           <a:p>
             <a:r>
               <a:rPr lang="en-US" dirty="0" smtClean="0"/>
-              <a:t>Unzip </a:t>
-            </a:r>
-            <a:r>
-              <a:rPr lang="en-US" dirty="0" smtClean="0"/>
-              <a:t>the contents</a:t>
-            </a:r>
-          </a:p>
-          <a:p>
-            <a:r>
-              <a:rPr lang="en-US" dirty="0" smtClean="0"/>
-              <a:t>Double c</a:t>
-            </a:r>
-            <a:r>
-              <a:rPr lang="en-US" dirty="0" smtClean="0"/>
-              <a:t>lick </a:t>
-            </a:r>
-            <a:r>
-              <a:rPr lang="en-US" dirty="0" smtClean="0"/>
-              <a:t>on the "run.bat" file</a:t>
+              <a:t>Unzip the contents</a:t>
+            </a:r>
+          </a:p>
+          <a:p>
+            <a:r>
+              <a:rPr lang="en-US" dirty="0" smtClean="0"/>
+              <a:t>Double click on the "run.bat" file</a:t>
             </a:r>
           </a:p>
           <a:p>
@@ -5738,7 +5800,7 @@
   <p:timing>
     <p:tnLst>
       <p:par>
-        <p:cTn id="1" dur="indefinite" restart="never" nodeType="tmRoot"/>
+        <p:cTn xmlns:p14="http://schemas.microsoft.com/office/powerpoint/2010/main" id="1" dur="indefinite" restart="never" nodeType="tmRoot"/>
       </p:par>
     </p:tnLst>
   </p:timing>
@@ -5779,15 +5841,7 @@
           <a:p>
             <a:r>
               <a:rPr lang="en-US" dirty="0" smtClean="0"/>
-              <a:t>Installing </a:t>
-            </a:r>
-            <a:r>
-              <a:rPr lang="en-US" dirty="0" smtClean="0"/>
-              <a:t>PHP by </a:t>
-            </a:r>
-            <a:r>
-              <a:rPr lang="en-US" dirty="0" smtClean="0"/>
-              <a:t>Hand</a:t>
+              <a:t>Installing PHP by Hand</a:t>
             </a:r>
             <a:endParaRPr lang="en-US" dirty="0"/>
           </a:p>
@@ -5816,15 +5870,7 @@
           <a:p>
             <a:r>
               <a:rPr lang="en-US" dirty="0" smtClean="0"/>
-              <a:t>You </a:t>
-            </a:r>
-            <a:r>
-              <a:rPr lang="en-US" dirty="0" smtClean="0"/>
-              <a:t>can still use the run.bat file if you would like to avoid doing command line </a:t>
-            </a:r>
-            <a:r>
-              <a:rPr lang="en-US" dirty="0" smtClean="0"/>
-              <a:t>stuff</a:t>
+              <a:t>You can still use the run.bat file if you would like to avoid doing command line stuff</a:t>
             </a:r>
           </a:p>
           <a:p>
@@ -5849,7 +5895,7 @@
   <p:timing>
     <p:tnLst>
       <p:par>
-        <p:cTn id="1" dur="indefinite" restart="never" nodeType="tmRoot"/>
+        <p:cTn xmlns:p14="http://schemas.microsoft.com/office/powerpoint/2010/main" id="1" dur="indefinite" restart="never" nodeType="tmRoot"/>
       </p:par>
     </p:tnLst>
   </p:timing>
@@ -5948,11 +5994,7 @@
             <a:pPr lvl="1"/>
             <a:r>
               <a:rPr lang="en-US" dirty="0" smtClean="0"/>
-              <a:t>c:\php </a:t>
-            </a:r>
-            <a:r>
-              <a:rPr lang="en-US" dirty="0" smtClean="0"/>
-              <a:t>works</a:t>
+              <a:t>c:\php works</a:t>
             </a:r>
           </a:p>
           <a:p>
@@ -5985,7 +6027,7 @@
   <p:timing>
     <p:tnLst>
       <p:par>
-        <p:cTn id="1" dur="indefinite" restart="never" nodeType="tmRoot"/>
+        <p:cTn xmlns:p14="http://schemas.microsoft.com/office/powerpoint/2010/main" id="1" dur="indefinite" restart="never" nodeType="tmRoot"/>
       </p:par>
     </p:tnLst>
   </p:timing>
@@ -6130,7 +6172,7 @@
   <p:timing>
     <p:tnLst>
       <p:par>
-        <p:cTn id="1" dur="indefinite" restart="never" nodeType="tmRoot"/>
+        <p:cTn xmlns:p14="http://schemas.microsoft.com/office/powerpoint/2010/main" id="1" dur="indefinite" restart="never" nodeType="tmRoot"/>
       </p:par>
     </p:tnLst>
   </p:timing>
@@ -6171,11 +6213,7 @@
           <a:p>
             <a:r>
               <a:rPr lang="en-US" dirty="0" smtClean="0"/>
-              <a:t>Checking </a:t>
-            </a:r>
-            <a:r>
-              <a:rPr lang="en-US" dirty="0" smtClean="0"/>
-              <a:t>PHP if you know CLI</a:t>
+              <a:t>Checking PHP if you know CLI</a:t>
             </a:r>
             <a:endParaRPr lang="en-US" dirty="0"/>
           </a:p>
@@ -6339,7 +6377,7 @@
   <p:timing>
     <p:tnLst>
       <p:par>
-        <p:cTn id="1" dur="indefinite" restart="never" nodeType="tmRoot"/>
+        <p:cTn xmlns:p14="http://schemas.microsoft.com/office/powerpoint/2010/main" id="1" dur="indefinite" restart="never" nodeType="tmRoot"/>
       </p:par>
     </p:tnLst>
   </p:timing>
@@ -6512,7 +6550,7 @@
   <p:timing>
     <p:tnLst>
       <p:par>
-        <p:cTn id="1" dur="indefinite" restart="never" nodeType="tmRoot"/>
+        <p:cTn xmlns:p14="http://schemas.microsoft.com/office/powerpoint/2010/main" id="1" dur="indefinite" restart="never" nodeType="tmRoot"/>
       </p:par>
     </p:tnLst>
   </p:timing>
@@ -6609,7 +6647,7 @@
   <p:timing>
     <p:tnLst>
       <p:par>
-        <p:cTn id="1" dur="indefinite" restart="never" nodeType="tmRoot"/>
+        <p:cTn xmlns:p14="http://schemas.microsoft.com/office/powerpoint/2010/main" id="1" dur="indefinite" restart="never" nodeType="tmRoot"/>
       </p:par>
     </p:tnLst>
   </p:timing>
@@ -6758,7 +6796,7 @@
   <p:timing>
     <p:tnLst>
       <p:par>
-        <p:cTn id="1" dur="indefinite" restart="never" nodeType="tmRoot"/>
+        <p:cTn xmlns:p14="http://schemas.microsoft.com/office/powerpoint/2010/main" id="1" dur="indefinite" restart="never" nodeType="tmRoot"/>
       </p:par>
     </p:tnLst>
   </p:timing>
@@ -6912,7 +6950,7 @@
   <p:timing>
     <p:tnLst>
       <p:par>
-        <p:cTn id="1" dur="indefinite" restart="never" nodeType="tmRoot"/>
+        <p:cTn xmlns:p14="http://schemas.microsoft.com/office/powerpoint/2010/main" id="1" dur="indefinite" restart="never" nodeType="tmRoot"/>
       </p:par>
     </p:tnLst>
   </p:timing>
@@ -7011,7 +7049,7 @@
   <p:timing>
     <p:tnLst>
       <p:par>
-        <p:cTn id="1" dur="indefinite" restart="never" nodeType="tmRoot"/>
+        <p:cTn xmlns:p14="http://schemas.microsoft.com/office/powerpoint/2010/main" id="1" dur="indefinite" restart="never" nodeType="tmRoot"/>
       </p:par>
     </p:tnLst>
   </p:timing>
@@ -7096,7 +7134,7 @@
   <p:timing>
     <p:tnLst>
       <p:par>
-        <p:cTn id="1" dur="indefinite" restart="never" nodeType="tmRoot"/>
+        <p:cTn xmlns:p14="http://schemas.microsoft.com/office/powerpoint/2010/main" id="1" dur="indefinite" restart="never" nodeType="tmRoot"/>
       </p:par>
     </p:tnLst>
   </p:timing>
@@ -7537,7 +7575,7 @@
   <p:timing>
     <p:tnLst>
       <p:par>
-        <p:cTn id="1" dur="indefinite" restart="never" nodeType="tmRoot"/>
+        <p:cTn xmlns:p14="http://schemas.microsoft.com/office/powerpoint/2010/main" id="1" dur="indefinite" restart="never" nodeType="tmRoot"/>
       </p:par>
     </p:tnLst>
   </p:timing>
@@ -7620,7 +7658,7 @@
   <p:timing>
     <p:tnLst>
       <p:par>
-        <p:cTn id="1" dur="indefinite" restart="never" nodeType="tmRoot"/>
+        <p:cTn xmlns:p14="http://schemas.microsoft.com/office/powerpoint/2010/main" id="1" dur="indefinite" restart="never" nodeType="tmRoot"/>
       </p:par>
     </p:tnLst>
   </p:timing>
@@ -7680,7 +7718,7 @@
         <p:spPr/>
         <p:txBody>
           <a:bodyPr>
-            <a:normAutofit fontScale="92500" lnSpcReduction="20000"/>
+            <a:normAutofit fontScale="92500" lnSpcReduction="10000"/>
           </a:bodyPr>
           <a:lstStyle/>
           <a:p>
@@ -7694,11 +7732,7 @@
             </a:r>
             <a:r>
               <a:rPr lang="en-US" dirty="0" smtClean="0"/>
-              <a:t> in your document </a:t>
-            </a:r>
-            <a:r>
-              <a:rPr lang="en-US" dirty="0" smtClean="0"/>
-              <a:t>root ( </a:t>
+              <a:t> in your document root ( </a:t>
             </a:r>
             <a:r>
               <a:rPr lang="en-US" dirty="0"/>
@@ -7716,7 +7750,6 @@
               <a:rPr lang="en-US" dirty="0" smtClean="0"/>
               <a:t>github.com/PHPEmbark/packages/releases)</a:t>
             </a:r>
-            <a:endParaRPr lang="en-US" dirty="0" smtClean="0"/>
           </a:p>
           <a:p>
             <a:r>
@@ -7783,7 +7816,7 @@
   <p:timing>
     <p:tnLst>
       <p:par>
-        <p:cTn id="1" dur="indefinite" restart="never" nodeType="tmRoot"/>
+        <p:cTn xmlns:p14="http://schemas.microsoft.com/office/powerpoint/2010/main" id="1" dur="indefinite" restart="never" nodeType="tmRoot"/>
       </p:par>
     </p:tnLst>
   </p:timing>
@@ -8015,7 +8048,7 @@
   <p:timing>
     <p:tnLst>
       <p:par>
-        <p:cTn id="1" dur="indefinite" restart="never" nodeType="tmRoot"/>
+        <p:cTn xmlns:p14="http://schemas.microsoft.com/office/powerpoint/2010/main" id="1" dur="indefinite" restart="never" nodeType="tmRoot"/>
       </p:par>
     </p:tnLst>
   </p:timing>
@@ -8149,7 +8182,7 @@
   <p:timing>
     <p:tnLst>
       <p:par>
-        <p:cTn id="1" dur="indefinite" restart="never" nodeType="tmRoot"/>
+        <p:cTn xmlns:p14="http://schemas.microsoft.com/office/powerpoint/2010/main" id="1" dur="indefinite" restart="never" nodeType="tmRoot"/>
       </p:par>
     </p:tnLst>
   </p:timing>
@@ -8372,7 +8405,7 @@
   <p:timing>
     <p:tnLst>
       <p:par>
-        <p:cTn id="1" dur="indefinite" restart="never" nodeType="tmRoot"/>
+        <p:cTn xmlns:p14="http://schemas.microsoft.com/office/powerpoint/2010/main" id="1" dur="indefinite" restart="never" nodeType="tmRoot"/>
       </p:par>
     </p:tnLst>
   </p:timing>
@@ -8510,7 +8543,7 @@
   <p:timing>
     <p:tnLst>
       <p:par>
-        <p:cTn id="1" dur="indefinite" restart="never" nodeType="tmRoot"/>
+        <p:cTn xmlns:p14="http://schemas.microsoft.com/office/powerpoint/2010/main" id="1" dur="indefinite" restart="never" nodeType="tmRoot"/>
       </p:par>
     </p:tnLst>
   </p:timing>
@@ -8594,11 +8627,7 @@
             </a:r>
             <a:r>
               <a:rPr lang="en-US" dirty="0" smtClean="0"/>
-              <a:t> and hello world </a:t>
-            </a:r>
-            <a:r>
-              <a:rPr lang="en-US" dirty="0" smtClean="0"/>
-              <a:t>scripts</a:t>
+              <a:t> and hello world scripts</a:t>
             </a:r>
           </a:p>
           <a:p>
@@ -8637,7 +8666,7 @@
   <p:timing>
     <p:tnLst>
       <p:par>
-        <p:cTn id="1" dur="indefinite" restart="never" nodeType="tmRoot"/>
+        <p:cTn xmlns:p14="http://schemas.microsoft.com/office/powerpoint/2010/main" id="1" dur="indefinite" restart="never" nodeType="tmRoot"/>
       </p:par>
     </p:tnLst>
   </p:timing>
@@ -8727,7 +8756,7 @@
   <p:timing>
     <p:tnLst>
       <p:par>
-        <p:cTn id="1" dur="indefinite" restart="never" nodeType="tmRoot"/>
+        <p:cTn xmlns:p14="http://schemas.microsoft.com/office/powerpoint/2010/main" id="1" dur="indefinite" restart="never" nodeType="tmRoot"/>
       </p:par>
     </p:tnLst>
   </p:timing>
@@ -9077,7 +9106,7 @@
   <p:timing>
     <p:tnLst>
       <p:par>
-        <p:cTn id="1" dur="indefinite" restart="never" nodeType="tmRoot"/>
+        <p:cTn xmlns:p14="http://schemas.microsoft.com/office/powerpoint/2010/main" id="1" dur="indefinite" restart="never" nodeType="tmRoot"/>
       </p:par>
     </p:tnLst>
   </p:timing>
@@ -9162,7 +9191,7 @@
   <p:timing>
     <p:tnLst>
       <p:par>
-        <p:cTn id="1" dur="indefinite" restart="never" nodeType="tmRoot"/>
+        <p:cTn xmlns:p14="http://schemas.microsoft.com/office/powerpoint/2010/main" id="1" dur="indefinite" restart="never" nodeType="tmRoot"/>
       </p:par>
     </p:tnLst>
   </p:timing>

</xml_diff>